<commit_message>
add README.md progress to 60%
</commit_message>
<xml_diff>
--- a/Case_Presentation_1/ppt/case1.pptx
+++ b/Case_Presentation_1/ppt/case1.pptx
@@ -5505,7 +5505,7 @@
                 <a16:creationId xmlns:a16="http://schemas.microsoft.com/office/drawing/2014/main" id="{683F1FFD-1AA8-4EC2-97B9-FEC7564F489B}"/>
               </a:ext>
               <a:ext uri="{C183D7F6-B498-43B3-948B-1728B52AA6E4}">
-                <adec:decorative xmlns="" xmlns:adec="http://schemas.microsoft.com/office/drawing/2017/decorative" val="1"/>
+                <adec:decorative xmlns:adec="http://schemas.microsoft.com/office/drawing/2017/decorative" xmlns="" val="1"/>
               </a:ext>
             </a:extLst>
           </p:cNvPr>
@@ -5603,7 +5603,7 @@
                 <a16:creationId xmlns:a16="http://schemas.microsoft.com/office/drawing/2014/main" id="{8FF0F8A7-C9E3-49D9-A67E-09FF582C7821}"/>
               </a:ext>
               <a:ext uri="{C183D7F6-B498-43B3-948B-1728B52AA6E4}">
-                <adec:decorative xmlns="" xmlns:adec="http://schemas.microsoft.com/office/drawing/2017/decorative" val="1"/>
+                <adec:decorative xmlns:adec="http://schemas.microsoft.com/office/drawing/2017/decorative" xmlns="" val="1"/>
               </a:ext>
             </a:extLst>
           </p:cNvPr>
@@ -5869,7 +5869,7 @@
                 <a16:creationId xmlns:a16="http://schemas.microsoft.com/office/drawing/2014/main" id="{A4274C20-A98B-4AC3-B16A-B7F41CB582DC}"/>
               </a:ext>
               <a:ext uri="{C183D7F6-B498-43B3-948B-1728B52AA6E4}">
-                <adec:decorative xmlns="" xmlns:adec="http://schemas.microsoft.com/office/drawing/2017/decorative" val="1"/>
+                <adec:decorative xmlns:adec="http://schemas.microsoft.com/office/drawing/2017/decorative" xmlns="" val="1"/>
               </a:ext>
             </a:extLst>
           </p:cNvPr>
@@ -5900,7 +5900,7 @@
                   <a16:creationId xmlns:a16="http://schemas.microsoft.com/office/drawing/2014/main" id="{43ECC69B-2243-424A-8237-CF490F8B06C1}"/>
                 </a:ext>
                 <a:ext uri="{C183D7F6-B498-43B3-948B-1728B52AA6E4}">
-                  <adec:decorative xmlns="" xmlns:adec="http://schemas.microsoft.com/office/drawing/2017/decorative" val="1"/>
+                  <adec:decorative xmlns:adec="http://schemas.microsoft.com/office/drawing/2017/decorative" xmlns="" val="1"/>
                 </a:ext>
               </a:extLst>
             </p:cNvPr>
@@ -5952,7 +5952,7 @@
                   <a16:creationId xmlns:a16="http://schemas.microsoft.com/office/drawing/2014/main" id="{6D2EA3B9-3D17-4510-8464-E74F67267C00}"/>
                 </a:ext>
                 <a:ext uri="{C183D7F6-B498-43B3-948B-1728B52AA6E4}">
-                  <adec:decorative xmlns="" xmlns:adec="http://schemas.microsoft.com/office/drawing/2017/decorative" val="1"/>
+                  <adec:decorative xmlns:adec="http://schemas.microsoft.com/office/drawing/2017/decorative" xmlns="" val="1"/>
                 </a:ext>
               </a:extLst>
             </p:cNvPr>
@@ -6004,7 +6004,7 @@
                   <a16:creationId xmlns:a16="http://schemas.microsoft.com/office/drawing/2014/main" id="{AA5DFA43-F31D-4C31-8826-6B40A21CF9AD}"/>
                 </a:ext>
                 <a:ext uri="{C183D7F6-B498-43B3-948B-1728B52AA6E4}">
-                  <adec:decorative xmlns="" xmlns:adec="http://schemas.microsoft.com/office/drawing/2017/decorative" val="1"/>
+                  <adec:decorative xmlns:adec="http://schemas.microsoft.com/office/drawing/2017/decorative" xmlns="" val="1"/>
                 </a:ext>
               </a:extLst>
             </p:cNvPr>
@@ -8668,14 +8668,14 @@
           <p:nvPr>
             <p:extLst>
               <p:ext uri="{D42A27DB-BD31-4B8C-83A1-F6EECF244321}">
-                <p14:modId xmlns:p14="http://schemas.microsoft.com/office/powerpoint/2010/main" val="3504684908"/>
+                <p14:modId xmlns:p14="http://schemas.microsoft.com/office/powerpoint/2010/main" val="2433706965"/>
               </p:ext>
             </p:extLst>
           </p:nvPr>
         </p:nvGraphicFramePr>
         <p:xfrm>
           <a:off x="3047000" y="4566887"/>
-          <a:ext cx="2175934" cy="1371600"/>
+          <a:ext cx="2175934" cy="548640"/>
         </p:xfrm>
         <a:graphic>
           <a:graphicData uri="http://schemas.openxmlformats.org/drawingml/2006/table">
@@ -8723,99 +8723,6 @@
                 <a:extLst>
                   <a:ext uri="{0D108BD9-81ED-4DB2-BD59-A6C34878D82A}">
                     <a16:rowId xmlns:a16="http://schemas.microsoft.com/office/drawing/2014/main" val="469500916"/>
-                  </a:ext>
-                </a:extLst>
-              </a:tr>
-              <a:tr h="121507">
-                <a:tc>
-                  <a:txBody>
-                    <a:bodyPr/>
-                    <a:lstStyle/>
-                    <a:p>
-                      <a:r>
-                        <a:rPr lang="en-US" altLang="zh-TW" sz="1200" dirty="0" smtClean="0"/>
-                        <a:t>Precision</a:t>
-                      </a:r>
-                      <a:endParaRPr lang="zh-TW" altLang="en-US" sz="1200" dirty="0"/>
-                    </a:p>
-                  </a:txBody>
-                  <a:tcPr/>
-                </a:tc>
-                <a:tc>
-                  <a:txBody>
-                    <a:bodyPr/>
-                    <a:lstStyle/>
-                    <a:p>
-                      <a:endParaRPr lang="zh-TW" altLang="en-US" sz="1200" dirty="0"/>
-                    </a:p>
-                  </a:txBody>
-                  <a:tcPr/>
-                </a:tc>
-                <a:extLst>
-                  <a:ext uri="{0D108BD9-81ED-4DB2-BD59-A6C34878D82A}">
-                    <a16:rowId xmlns:a16="http://schemas.microsoft.com/office/drawing/2014/main" val="3642463612"/>
-                  </a:ext>
-                </a:extLst>
-              </a:tr>
-              <a:tr h="121507">
-                <a:tc>
-                  <a:txBody>
-                    <a:bodyPr/>
-                    <a:lstStyle/>
-                    <a:p>
-                      <a:r>
-                        <a:rPr lang="en-US" altLang="zh-TW" sz="1200" dirty="0" smtClean="0"/>
-                        <a:t>Recall</a:t>
-                      </a:r>
-                      <a:endParaRPr lang="zh-TW" altLang="en-US" sz="1200" dirty="0"/>
-                    </a:p>
-                  </a:txBody>
-                  <a:tcPr/>
-                </a:tc>
-                <a:tc>
-                  <a:txBody>
-                    <a:bodyPr/>
-                    <a:lstStyle/>
-                    <a:p>
-                      <a:endParaRPr lang="zh-TW" altLang="en-US" sz="1200" dirty="0"/>
-                    </a:p>
-                  </a:txBody>
-                  <a:tcPr/>
-                </a:tc>
-                <a:extLst>
-                  <a:ext uri="{0D108BD9-81ED-4DB2-BD59-A6C34878D82A}">
-                    <a16:rowId xmlns:a16="http://schemas.microsoft.com/office/drawing/2014/main" val="468655977"/>
-                  </a:ext>
-                </a:extLst>
-              </a:tr>
-              <a:tr h="121507">
-                <a:tc>
-                  <a:txBody>
-                    <a:bodyPr/>
-                    <a:lstStyle/>
-                    <a:p>
-                      <a:r>
-                        <a:rPr lang="en-US" altLang="zh-TW" sz="1200" dirty="0" smtClean="0"/>
-                        <a:t>Accuracy</a:t>
-                      </a:r>
-                      <a:endParaRPr lang="zh-TW" altLang="en-US" sz="1200" dirty="0"/>
-                    </a:p>
-                  </a:txBody>
-                  <a:tcPr/>
-                </a:tc>
-                <a:tc>
-                  <a:txBody>
-                    <a:bodyPr/>
-                    <a:lstStyle/>
-                    <a:p>
-                      <a:endParaRPr lang="zh-TW" altLang="en-US" sz="1200" dirty="0"/>
-                    </a:p>
-                  </a:txBody>
-                  <a:tcPr/>
-                </a:tc>
-                <a:extLst>
-                  <a:ext uri="{0D108BD9-81ED-4DB2-BD59-A6C34878D82A}">
-                    <a16:rowId xmlns:a16="http://schemas.microsoft.com/office/drawing/2014/main" val="2042429446"/>
                   </a:ext>
                 </a:extLst>
               </a:tr>
@@ -12075,7 +11982,7 @@
           <p:nvPr>
             <p:extLst>
               <p:ext uri="{D42A27DB-BD31-4B8C-83A1-F6EECF244321}">
-                <p14:modId xmlns:p14="http://schemas.microsoft.com/office/powerpoint/2010/main" val="3229261356"/>
+                <p14:modId xmlns:p14="http://schemas.microsoft.com/office/powerpoint/2010/main" val="1218356262"/>
               </p:ext>
             </p:extLst>
           </p:nvPr>
@@ -15393,14 +15300,7 @@
                   <a:latin typeface="Microsoft JhengHei UI" panose="020B0604030504040204" pitchFamily="34" charset="-120"/>
                   <a:ea typeface="Microsoft JhengHei UI" panose="020B0604030504040204" pitchFamily="34" charset="-120"/>
                 </a:rPr>
-                <a:t> </a:t>
-              </a:r>
-              <a:r>
-                <a:rPr lang="en-US" sz="2000" dirty="0" smtClean="0">
-                  <a:latin typeface="Microsoft JhengHei UI" panose="020B0604030504040204" pitchFamily="34" charset="-120"/>
-                  <a:ea typeface="Microsoft JhengHei UI" panose="020B0604030504040204" pitchFamily="34" charset="-120"/>
-                </a:rPr>
-                <a:t>Advantage</a:t>
+                <a:t> Advantage</a:t>
               </a:r>
               <a:endParaRPr lang="en-US" sz="2000" kern="1200" noProof="0" dirty="0">
                 <a:solidFill>
@@ -18113,15 +18013,6 @@
 </file>
 
 <file path=customXml/item1.xml><?xml version="1.0" encoding="utf-8"?>
-<?mso-contentType ?>
-<FormTemplates xmlns="http://schemas.microsoft.com/sharepoint/v3/contenttype/forms">
-  <Display>DocumentLibraryForm</Display>
-  <Edit>DocumentLibraryForm</Edit>
-  <New>DocumentLibraryForm</New>
-</FormTemplates>
-</file>
-
-<file path=customXml/item2.xml><?xml version="1.0" encoding="utf-8"?>
 <ct:contentTypeSchema xmlns:ct="http://schemas.microsoft.com/office/2006/metadata/contentType" xmlns:ma="http://schemas.microsoft.com/office/2006/metadata/properties/metaAttributes" ct:_="" ma:_="" ma:contentTypeName="Document" ma:contentTypeID="0x01010079F111ED35F8CC479449609E8A0923A6" ma:contentTypeVersion="11" ma:contentTypeDescription="Create a new document." ma:contentTypeScope="" ma:versionID="9677210f24a1be23c92c90fd886aa0aa">
   <xsd:schema xmlns:xsd="http://www.w3.org/2001/XMLSchema" xmlns:xs="http://www.w3.org/2001/XMLSchema" xmlns:p="http://schemas.microsoft.com/office/2006/metadata/properties" xmlns:ns2="71af3243-3dd4-4a8d-8c0d-dd76da1f02a5" xmlns:ns3="16c05727-aa75-4e4a-9b5f-8a80a1165891" targetNamespace="http://schemas.microsoft.com/office/2006/metadata/properties" ma:root="true" ma:fieldsID="60e05723c5c1908df1a1a4ebf11d344e" ns2:_="" ns3:_="">
     <xsd:import namespace="71af3243-3dd4-4a8d-8c0d-dd76da1f02a5"/>
@@ -18332,6 +18223,15 @@
 </ct:contentTypeSchema>
 </file>
 
+<file path=customXml/item2.xml><?xml version="1.0" encoding="utf-8"?>
+<?mso-contentType ?>
+<FormTemplates xmlns="http://schemas.microsoft.com/sharepoint/v3/contenttype/forms">
+  <Display>DocumentLibraryForm</Display>
+  <Edit>DocumentLibraryForm</Edit>
+  <New>DocumentLibraryForm</New>
+</FormTemplates>
+</file>
+
 <file path=customXml/item3.xml><?xml version="1.0" encoding="utf-8"?>
 <p:properties xmlns:p="http://schemas.microsoft.com/office/2006/metadata/properties" xmlns:xsi="http://www.w3.org/2001/XMLSchema-instance" xmlns:pc="http://schemas.microsoft.com/office/infopath/2007/PartnerControls">
   <documentManagement>
@@ -18341,14 +18241,6 @@
 </file>
 
 <file path=customXml/itemProps1.xml><?xml version="1.0" encoding="utf-8"?>
-<ds:datastoreItem xmlns:ds="http://schemas.openxmlformats.org/officeDocument/2006/customXml" ds:itemID="{D1CAB62D-49E5-4271-85C6-1466970BAB69}">
-  <ds:schemaRefs>
-    <ds:schemaRef ds:uri="http://schemas.microsoft.com/sharepoint/v3/contenttype/forms"/>
-  </ds:schemaRefs>
-</ds:datastoreItem>
-</file>
-
-<file path=customXml/itemProps2.xml><?xml version="1.0" encoding="utf-8"?>
 <ds:datastoreItem xmlns:ds="http://schemas.openxmlformats.org/officeDocument/2006/customXml" ds:itemID="{D5A32ED2-6DBA-4E14-851E-DE5772C902F3}">
   <ds:schemaRefs>
     <ds:schemaRef ds:uri="http://schemas.microsoft.com/office/2006/metadata/contentType"/>
@@ -18367,6 +18259,14 @@
 </ds:datastoreItem>
 </file>
 
+<file path=customXml/itemProps2.xml><?xml version="1.0" encoding="utf-8"?>
+<ds:datastoreItem xmlns:ds="http://schemas.openxmlformats.org/officeDocument/2006/customXml" ds:itemID="{D1CAB62D-49E5-4271-85C6-1466970BAB69}">
+  <ds:schemaRefs>
+    <ds:schemaRef ds:uri="http://schemas.microsoft.com/sharepoint/v3/contenttype/forms"/>
+  </ds:schemaRefs>
+</ds:datastoreItem>
+</file>
+
 <file path=customXml/itemProps3.xml><?xml version="1.0" encoding="utf-8"?>
 <ds:datastoreItem xmlns:ds="http://schemas.openxmlformats.org/officeDocument/2006/customXml" ds:itemID="{AA7F0652-397B-4F71-B75E-207A80EB2786}">
   <ds:schemaRefs>

</xml_diff>

<commit_message>
add ppt progress to 80%
</commit_message>
<xml_diff>
--- a/Case_Presentation_1/ppt/case1.pptx
+++ b/Case_Presentation_1/ppt/case1.pptx
@@ -5,10 +5,10 @@
     <p:sldMasterId id="2147483648" r:id="rId4"/>
   </p:sldMasterIdLst>
   <p:notesMasterIdLst>
-    <p:notesMasterId r:id="rId26"/>
+    <p:notesMasterId r:id="rId28"/>
   </p:notesMasterIdLst>
   <p:handoutMasterIdLst>
-    <p:handoutMasterId r:id="rId27"/>
+    <p:handoutMasterId r:id="rId29"/>
   </p:handoutMasterIdLst>
   <p:sldIdLst>
     <p:sldId id="262" r:id="rId5"/>
@@ -21,17 +21,19 @@
     <p:sldId id="282" r:id="rId12"/>
     <p:sldId id="267" r:id="rId13"/>
     <p:sldId id="277" r:id="rId14"/>
-    <p:sldId id="278" r:id="rId15"/>
-    <p:sldId id="268" r:id="rId16"/>
-    <p:sldId id="279" r:id="rId17"/>
-    <p:sldId id="280" r:id="rId18"/>
-    <p:sldId id="269" r:id="rId19"/>
-    <p:sldId id="270" r:id="rId20"/>
-    <p:sldId id="284" r:id="rId21"/>
-    <p:sldId id="271" r:id="rId22"/>
-    <p:sldId id="281" r:id="rId23"/>
-    <p:sldId id="272" r:id="rId24"/>
-    <p:sldId id="283" r:id="rId25"/>
+    <p:sldId id="286" r:id="rId15"/>
+    <p:sldId id="278" r:id="rId16"/>
+    <p:sldId id="268" r:id="rId17"/>
+    <p:sldId id="279" r:id="rId18"/>
+    <p:sldId id="280" r:id="rId19"/>
+    <p:sldId id="269" r:id="rId20"/>
+    <p:sldId id="270" r:id="rId21"/>
+    <p:sldId id="284" r:id="rId22"/>
+    <p:sldId id="271" r:id="rId23"/>
+    <p:sldId id="281" r:id="rId24"/>
+    <p:sldId id="285" r:id="rId25"/>
+    <p:sldId id="272" r:id="rId26"/>
+    <p:sldId id="283" r:id="rId27"/>
   </p:sldIdLst>
   <p:sldSz cx="12192000" cy="6858000"/>
   <p:notesSz cx="6858000" cy="9144000"/>
@@ -231,7 +233,7 @@
                 <a:latin typeface="Microsoft JhengHei UI" panose="020B0604030504040204" pitchFamily="34" charset="-120"/>
                 <a:ea typeface="Microsoft JhengHei UI" panose="020B0604030504040204" pitchFamily="34" charset="-120"/>
               </a:rPr>
-              <a:t>2021/10/14</a:t>
+              <a:t>2021/10/17</a:t>
             </a:fld>
             <a:endParaRPr lang="zh-TW" altLang="en-US" dirty="0">
               <a:latin typeface="Microsoft JhengHei UI" panose="020B0604030504040204" pitchFamily="34" charset="-120"/>
@@ -417,7 +419,7 @@
           <a:p>
             <a:fld id="{BBB6D878-1482-46B1-B594-315C7A27685A}" type="datetime1">
               <a:rPr lang="zh-TW" altLang="en-US" noProof="0" smtClean="0"/>
-              <a:t>2021/10/14</a:t>
+              <a:t>2021/10/17</a:t>
             </a:fld>
             <a:endParaRPr lang="zh-TW" altLang="en-US" noProof="0" dirty="0"/>
           </a:p>
@@ -861,7 +863,7 @@
                 <a:latin typeface="Microsoft JhengHei UI" panose="020B0604030504040204" pitchFamily="34" charset="-120"/>
                 <a:ea typeface="Microsoft JhengHei UI" panose="020B0604030504040204" pitchFamily="34" charset="-120"/>
               </a:rPr>
-              <a:t>19</a:t>
+              <a:t>15</a:t>
             </a:fld>
             <a:endParaRPr lang="zh-TW" altLang="en-US" dirty="0">
               <a:latin typeface="Microsoft JhengHei UI" panose="020B0604030504040204" pitchFamily="34" charset="-120"/>
@@ -873,7 +875,7 @@
     </p:spTree>
     <p:extLst>
       <p:ext uri="{BB962C8B-B14F-4D97-AF65-F5344CB8AC3E}">
-        <p14:creationId xmlns:p14="http://schemas.microsoft.com/office/powerpoint/2010/main" val="179594298"/>
+        <p14:creationId xmlns:p14="http://schemas.microsoft.com/office/powerpoint/2010/main" val="647864458"/>
       </p:ext>
     </p:extLst>
   </p:cSld>
@@ -956,7 +958,197 @@
                 <a:latin typeface="Microsoft JhengHei UI" panose="020B0604030504040204" pitchFamily="34" charset="-120"/>
                 <a:ea typeface="Microsoft JhengHei UI" panose="020B0604030504040204" pitchFamily="34" charset="-120"/>
               </a:rPr>
+              <a:t>20</a:t>
+            </a:fld>
+            <a:endParaRPr lang="zh-TW" altLang="en-US" dirty="0">
+              <a:latin typeface="Microsoft JhengHei UI" panose="020B0604030504040204" pitchFamily="34" charset="-120"/>
+              <a:ea typeface="Microsoft JhengHei UI" panose="020B0604030504040204" pitchFamily="34" charset="-120"/>
+            </a:endParaRPr>
+          </a:p>
+        </p:txBody>
+      </p:sp>
+    </p:spTree>
+    <p:extLst>
+      <p:ext uri="{BB962C8B-B14F-4D97-AF65-F5344CB8AC3E}">
+        <p14:creationId xmlns:p14="http://schemas.microsoft.com/office/powerpoint/2010/main" val="179594298"/>
+      </p:ext>
+    </p:extLst>
+  </p:cSld>
+  <p:clrMapOvr>
+    <a:masterClrMapping/>
+  </p:clrMapOvr>
+</p:notes>
+</file>
+
+<file path=ppt/notesSlides/notesSlide12.xml><?xml version="1.0" encoding="utf-8"?>
+<p:notes xmlns:a="http://schemas.openxmlformats.org/drawingml/2006/main" xmlns:r="http://schemas.openxmlformats.org/officeDocument/2006/relationships" xmlns:p="http://schemas.openxmlformats.org/presentationml/2006/main">
+  <p:cSld>
+    <p:spTree>
+      <p:nvGrpSpPr>
+        <p:cNvPr id="1" name=""/>
+        <p:cNvGrpSpPr/>
+        <p:nvPr/>
+      </p:nvGrpSpPr>
+      <p:grpSpPr>
+        <a:xfrm>
+          <a:off x="0" y="0"/>
+          <a:ext cx="0" cy="0"/>
+          <a:chOff x="0" y="0"/>
+          <a:chExt cx="0" cy="0"/>
+        </a:xfrm>
+      </p:grpSpPr>
+      <p:sp>
+        <p:nvSpPr>
+          <p:cNvPr id="2" name="投影片影像預留位置 1"/>
+          <p:cNvSpPr>
+            <a:spLocks noGrp="1" noRot="1" noChangeAspect="1"/>
+          </p:cNvSpPr>
+          <p:nvPr>
+            <p:ph type="sldImg"/>
+          </p:nvPr>
+        </p:nvSpPr>
+        <p:spPr/>
+      </p:sp>
+      <p:sp>
+        <p:nvSpPr>
+          <p:cNvPr id="3" name="備忘稿預留位置 2"/>
+          <p:cNvSpPr>
+            <a:spLocks noGrp="1"/>
+          </p:cNvSpPr>
+          <p:nvPr>
+            <p:ph type="body" idx="1"/>
+          </p:nvPr>
+        </p:nvSpPr>
+        <p:spPr/>
+        <p:txBody>
+          <a:bodyPr rtlCol="0"/>
+          <a:lstStyle/>
+          <a:p>
+            <a:pPr rtl="0"/>
+            <a:endParaRPr lang="zh-TW" altLang="en-US" dirty="0">
+              <a:latin typeface="Microsoft JhengHei UI" panose="020B0604030504040204" pitchFamily="34" charset="-120"/>
+              <a:ea typeface="Microsoft JhengHei UI" panose="020B0604030504040204" pitchFamily="34" charset="-120"/>
+            </a:endParaRPr>
+          </a:p>
+        </p:txBody>
+      </p:sp>
+      <p:sp>
+        <p:nvSpPr>
+          <p:cNvPr id="4" name="投影片編號預留位置 3"/>
+          <p:cNvSpPr>
+            <a:spLocks noGrp="1"/>
+          </p:cNvSpPr>
+          <p:nvPr>
+            <p:ph type="sldNum" sz="quarter" idx="10"/>
+          </p:nvPr>
+        </p:nvSpPr>
+        <p:spPr/>
+        <p:txBody>
+          <a:bodyPr rtlCol="0"/>
+          <a:lstStyle/>
+          <a:p>
+            <a:pPr rtl="0"/>
+            <a:fld id="{017142BC-A7BD-4276-975D-6351998F7C85}" type="slidenum">
+              <a:rPr lang="en-US" altLang="zh-TW" smtClean="0">
+                <a:latin typeface="Microsoft JhengHei UI" panose="020B0604030504040204" pitchFamily="34" charset="-120"/>
+                <a:ea typeface="Microsoft JhengHei UI" panose="020B0604030504040204" pitchFamily="34" charset="-120"/>
+              </a:rPr>
               <a:t>21</a:t>
+            </a:fld>
+            <a:endParaRPr lang="zh-TW" altLang="en-US" dirty="0">
+              <a:latin typeface="Microsoft JhengHei UI" panose="020B0604030504040204" pitchFamily="34" charset="-120"/>
+              <a:ea typeface="Microsoft JhengHei UI" panose="020B0604030504040204" pitchFamily="34" charset="-120"/>
+            </a:endParaRPr>
+          </a:p>
+        </p:txBody>
+      </p:sp>
+    </p:spTree>
+    <p:extLst>
+      <p:ext uri="{BB962C8B-B14F-4D97-AF65-F5344CB8AC3E}">
+        <p14:creationId xmlns:p14="http://schemas.microsoft.com/office/powerpoint/2010/main" val="3926475111"/>
+      </p:ext>
+    </p:extLst>
+  </p:cSld>
+  <p:clrMapOvr>
+    <a:masterClrMapping/>
+  </p:clrMapOvr>
+</p:notes>
+</file>
+
+<file path=ppt/notesSlides/notesSlide13.xml><?xml version="1.0" encoding="utf-8"?>
+<p:notes xmlns:a="http://schemas.openxmlformats.org/drawingml/2006/main" xmlns:r="http://schemas.openxmlformats.org/officeDocument/2006/relationships" xmlns:p="http://schemas.openxmlformats.org/presentationml/2006/main">
+  <p:cSld>
+    <p:spTree>
+      <p:nvGrpSpPr>
+        <p:cNvPr id="1" name=""/>
+        <p:cNvGrpSpPr/>
+        <p:nvPr/>
+      </p:nvGrpSpPr>
+      <p:grpSpPr>
+        <a:xfrm>
+          <a:off x="0" y="0"/>
+          <a:ext cx="0" cy="0"/>
+          <a:chOff x="0" y="0"/>
+          <a:chExt cx="0" cy="0"/>
+        </a:xfrm>
+      </p:grpSpPr>
+      <p:sp>
+        <p:nvSpPr>
+          <p:cNvPr id="2" name="投影片影像預留位置 1"/>
+          <p:cNvSpPr>
+            <a:spLocks noGrp="1" noRot="1" noChangeAspect="1"/>
+          </p:cNvSpPr>
+          <p:nvPr>
+            <p:ph type="sldImg"/>
+          </p:nvPr>
+        </p:nvSpPr>
+        <p:spPr/>
+      </p:sp>
+      <p:sp>
+        <p:nvSpPr>
+          <p:cNvPr id="3" name="備忘稿預留位置 2"/>
+          <p:cNvSpPr>
+            <a:spLocks noGrp="1"/>
+          </p:cNvSpPr>
+          <p:nvPr>
+            <p:ph type="body" idx="1"/>
+          </p:nvPr>
+        </p:nvSpPr>
+        <p:spPr/>
+        <p:txBody>
+          <a:bodyPr rtlCol="0"/>
+          <a:lstStyle/>
+          <a:p>
+            <a:pPr rtl="0"/>
+            <a:endParaRPr lang="zh-TW" altLang="en-US" dirty="0">
+              <a:latin typeface="Microsoft JhengHei UI" panose="020B0604030504040204" pitchFamily="34" charset="-120"/>
+              <a:ea typeface="Microsoft JhengHei UI" panose="020B0604030504040204" pitchFamily="34" charset="-120"/>
+            </a:endParaRPr>
+          </a:p>
+        </p:txBody>
+      </p:sp>
+      <p:sp>
+        <p:nvSpPr>
+          <p:cNvPr id="4" name="投影片編號預留位置 3"/>
+          <p:cNvSpPr>
+            <a:spLocks noGrp="1"/>
+          </p:cNvSpPr>
+          <p:nvPr>
+            <p:ph type="sldNum" sz="quarter" idx="10"/>
+          </p:nvPr>
+        </p:nvSpPr>
+        <p:spPr/>
+        <p:txBody>
+          <a:bodyPr rtlCol="0"/>
+          <a:lstStyle/>
+          <a:p>
+            <a:pPr rtl="0"/>
+            <a:fld id="{017142BC-A7BD-4276-975D-6351998F7C85}" type="slidenum">
+              <a:rPr lang="en-US" altLang="zh-TW" smtClean="0">
+                <a:latin typeface="Microsoft JhengHei UI" panose="020B0604030504040204" pitchFamily="34" charset="-120"/>
+                <a:ea typeface="Microsoft JhengHei UI" panose="020B0604030504040204" pitchFamily="34" charset="-120"/>
+              </a:rPr>
+              <a:t>23</a:t>
             </a:fld>
             <a:endParaRPr lang="zh-TW" altLang="en-US" dirty="0">
               <a:latin typeface="Microsoft JhengHei UI" panose="020B0604030504040204" pitchFamily="34" charset="-120"/>
@@ -1538,7 +1730,7 @@
     </p:spTree>
     <p:extLst>
       <p:ext uri="{BB962C8B-B14F-4D97-AF65-F5344CB8AC3E}">
-        <p14:creationId xmlns:p14="http://schemas.microsoft.com/office/powerpoint/2010/main" val="268359606"/>
+        <p14:creationId xmlns:p14="http://schemas.microsoft.com/office/powerpoint/2010/main" val="1412049621"/>
       </p:ext>
     </p:extLst>
   </p:cSld>
@@ -1621,7 +1813,7 @@
                 <a:latin typeface="Microsoft JhengHei UI" panose="020B0604030504040204" pitchFamily="34" charset="-120"/>
                 <a:ea typeface="Microsoft JhengHei UI" panose="020B0604030504040204" pitchFamily="34" charset="-120"/>
               </a:rPr>
-              <a:t>13</a:t>
+              <a:t>12</a:t>
             </a:fld>
             <a:endParaRPr lang="zh-TW" altLang="en-US" dirty="0">
               <a:latin typeface="Microsoft JhengHei UI" panose="020B0604030504040204" pitchFamily="34" charset="-120"/>
@@ -1633,7 +1825,7 @@
     </p:spTree>
     <p:extLst>
       <p:ext uri="{BB962C8B-B14F-4D97-AF65-F5344CB8AC3E}">
-        <p14:creationId xmlns:p14="http://schemas.microsoft.com/office/powerpoint/2010/main" val="1026099171"/>
+        <p14:creationId xmlns:p14="http://schemas.microsoft.com/office/powerpoint/2010/main" val="268359606"/>
       </p:ext>
     </p:extLst>
   </p:cSld>
@@ -1728,7 +1920,7 @@
     </p:spTree>
     <p:extLst>
       <p:ext uri="{BB962C8B-B14F-4D97-AF65-F5344CB8AC3E}">
-        <p14:creationId xmlns:p14="http://schemas.microsoft.com/office/powerpoint/2010/main" val="647864458"/>
+        <p14:creationId xmlns:p14="http://schemas.microsoft.com/office/powerpoint/2010/main" val="1026099171"/>
       </p:ext>
     </p:extLst>
   </p:cSld>
@@ -1986,7 +2178,7 @@
             <a:pPr rtl="0"/>
             <a:fld id="{8ED88A50-215E-468E-827C-42AE249A1C51}" type="datetime1">
               <a:rPr lang="zh-TW" altLang="en-US" noProof="0" smtClean="0"/>
-              <a:t>2021/10/14</a:t>
+              <a:t>2021/10/17</a:t>
             </a:fld>
             <a:endParaRPr lang="zh-TW" altLang="en-US" noProof="0" dirty="0"/>
           </a:p>
@@ -2248,7 +2440,7 @@
             <a:pPr rtl="0"/>
             <a:fld id="{D6C9D539-0D53-48B5-9E72-7002309E311F}" type="datetime1">
               <a:rPr lang="zh-TW" altLang="en-US" noProof="0" smtClean="0"/>
-              <a:t>2021/10/14</a:t>
+              <a:t>2021/10/17</a:t>
             </a:fld>
             <a:endParaRPr lang="zh-TW" altLang="en-US" noProof="0" dirty="0"/>
           </a:p>
@@ -2483,7 +2675,7 @@
             <a:pPr rtl="0"/>
             <a:fld id="{48E54D84-2993-4C36-A82E-7B3A7AF31A54}" type="datetime1">
               <a:rPr lang="zh-TW" altLang="en-US" noProof="0" smtClean="0"/>
-              <a:t>2021/10/14</a:t>
+              <a:t>2021/10/17</a:t>
             </a:fld>
             <a:endParaRPr lang="zh-TW" altLang="en-US" noProof="0" dirty="0"/>
           </a:p>
@@ -2723,7 +2915,7 @@
             <a:pPr rtl="0"/>
             <a:fld id="{D73E7FC9-F991-4E60-A471-A91FDB4A45AC}" type="datetime1">
               <a:rPr lang="zh-TW" altLang="en-US" noProof="0" smtClean="0"/>
-              <a:t>2021/10/14</a:t>
+              <a:t>2021/10/17</a:t>
             </a:fld>
             <a:endParaRPr lang="zh-TW" altLang="en-US" noProof="0" dirty="0"/>
           </a:p>
@@ -3030,7 +3222,7 @@
             <a:pPr rtl="0"/>
             <a:fld id="{A4EEDE44-BA41-4E3A-8776-BD0C8196250C}" type="datetime1">
               <a:rPr lang="zh-TW" altLang="en-US" noProof="0" smtClean="0"/>
-              <a:t>2021/10/14</a:t>
+              <a:t>2021/10/17</a:t>
             </a:fld>
             <a:endParaRPr lang="zh-TW" altLang="en-US" noProof="0" dirty="0"/>
           </a:p>
@@ -3332,7 +3524,7 @@
             <a:pPr rtl="0"/>
             <a:fld id="{F4B8659F-CA7A-4C3A-9D10-E5E8E21E48DE}" type="datetime1">
               <a:rPr lang="zh-TW" altLang="en-US" noProof="0" smtClean="0"/>
-              <a:t>2021/10/14</a:t>
+              <a:t>2021/10/17</a:t>
             </a:fld>
             <a:endParaRPr lang="zh-TW" altLang="en-US" noProof="0" dirty="0"/>
           </a:p>
@@ -3754,7 +3946,7 @@
             <a:pPr rtl="0"/>
             <a:fld id="{0C6448A1-7DA6-4094-92A3-B84F1C7DDCB9}" type="datetime1">
               <a:rPr lang="zh-TW" altLang="en-US" noProof="0" smtClean="0"/>
-              <a:t>2021/10/14</a:t>
+              <a:t>2021/10/17</a:t>
             </a:fld>
             <a:endParaRPr lang="zh-TW" altLang="en-US" noProof="0" dirty="0"/>
           </a:p>
@@ -3916,7 +4108,7 @@
             <a:pPr rtl="0"/>
             <a:fld id="{D40C8A5F-0A80-42DD-9603-0B61C4DB190B}" type="datetime1">
               <a:rPr lang="zh-TW" altLang="en-US" noProof="0" smtClean="0"/>
-              <a:t>2021/10/14</a:t>
+              <a:t>2021/10/17</a:t>
             </a:fld>
             <a:endParaRPr lang="zh-TW" altLang="en-US" noProof="0" dirty="0"/>
           </a:p>
@@ -4010,7 +4202,7 @@
             <a:pPr rtl="0"/>
             <a:fld id="{71FAD4C2-D65D-4A0F-A151-0D79808B4228}" type="datetime1">
               <a:rPr lang="zh-TW" altLang="en-US" noProof="0" smtClean="0"/>
-              <a:t>2021/10/14</a:t>
+              <a:t>2021/10/17</a:t>
             </a:fld>
             <a:endParaRPr lang="zh-TW" altLang="en-US" noProof="0" dirty="0"/>
           </a:p>
@@ -4388,7 +4580,7 @@
             <a:pPr rtl="0"/>
             <a:fld id="{6820BF0F-D78A-44A7-BCB4-3FADDF770EE4}" type="datetime1">
               <a:rPr lang="zh-TW" altLang="en-US" noProof="0" smtClean="0"/>
-              <a:t>2021/10/14</a:t>
+              <a:t>2021/10/17</a:t>
             </a:fld>
             <a:endParaRPr lang="zh-TW" altLang="en-US" noProof="0" dirty="0"/>
           </a:p>
@@ -4678,7 +4870,7 @@
             <a:pPr rtl="0"/>
             <a:fld id="{F95A0CF5-590E-40CC-964F-83273B68E425}" type="datetime1">
               <a:rPr lang="zh-TW" altLang="en-US" noProof="0" smtClean="0"/>
-              <a:t>2021/10/14</a:t>
+              <a:t>2021/10/17</a:t>
             </a:fld>
             <a:endParaRPr lang="zh-TW" altLang="en-US" noProof="0" dirty="0"/>
           </a:p>
@@ -4888,7 +5080,7 @@
           <a:p>
             <a:fld id="{7C741ED0-6F00-40F9-AFA4-51A44224A830}" type="datetime1">
               <a:rPr lang="zh-TW" altLang="en-US" noProof="0" smtClean="0"/>
-              <a:t>2021/10/14</a:t>
+              <a:t>2021/10/17</a:t>
             </a:fld>
             <a:endParaRPr lang="zh-TW" altLang="en-US" noProof="0" dirty="0"/>
           </a:p>
@@ -5506,7 +5698,7 @@
                 <a16:creationId xmlns:a16="http://schemas.microsoft.com/office/drawing/2014/main" id="{683F1FFD-1AA8-4EC2-97B9-FEC7564F489B}"/>
               </a:ext>
               <a:ext uri="{C183D7F6-B498-43B3-948B-1728B52AA6E4}">
-                <adec:decorative xmlns="" xmlns:adec="http://schemas.microsoft.com/office/drawing/2017/decorative" val="1"/>
+                <adec:decorative xmlns:adec="http://schemas.microsoft.com/office/drawing/2017/decorative" xmlns="" val="1"/>
               </a:ext>
             </a:extLst>
           </p:cNvPr>
@@ -5604,7 +5796,7 @@
                 <a16:creationId xmlns:a16="http://schemas.microsoft.com/office/drawing/2014/main" id="{8FF0F8A7-C9E3-49D9-A67E-09FF582C7821}"/>
               </a:ext>
               <a:ext uri="{C183D7F6-B498-43B3-948B-1728B52AA6E4}">
-                <adec:decorative xmlns="" xmlns:adec="http://schemas.microsoft.com/office/drawing/2017/decorative" val="1"/>
+                <adec:decorative xmlns:adec="http://schemas.microsoft.com/office/drawing/2017/decorative" xmlns="" val="1"/>
               </a:ext>
             </a:extLst>
           </p:cNvPr>
@@ -5870,7 +6062,7 @@
                 <a16:creationId xmlns:a16="http://schemas.microsoft.com/office/drawing/2014/main" id="{A4274C20-A98B-4AC3-B16A-B7F41CB582DC}"/>
               </a:ext>
               <a:ext uri="{C183D7F6-B498-43B3-948B-1728B52AA6E4}">
-                <adec:decorative xmlns="" xmlns:adec="http://schemas.microsoft.com/office/drawing/2017/decorative" val="1"/>
+                <adec:decorative xmlns:adec="http://schemas.microsoft.com/office/drawing/2017/decorative" xmlns="" val="1"/>
               </a:ext>
             </a:extLst>
           </p:cNvPr>
@@ -5901,7 +6093,7 @@
                   <a16:creationId xmlns:a16="http://schemas.microsoft.com/office/drawing/2014/main" id="{43ECC69B-2243-424A-8237-CF490F8B06C1}"/>
                 </a:ext>
                 <a:ext uri="{C183D7F6-B498-43B3-948B-1728B52AA6E4}">
-                  <adec:decorative xmlns="" xmlns:adec="http://schemas.microsoft.com/office/drawing/2017/decorative" val="1"/>
+                  <adec:decorative xmlns:adec="http://schemas.microsoft.com/office/drawing/2017/decorative" xmlns="" val="1"/>
                 </a:ext>
               </a:extLst>
             </p:cNvPr>
@@ -5953,7 +6145,7 @@
                   <a16:creationId xmlns:a16="http://schemas.microsoft.com/office/drawing/2014/main" id="{6D2EA3B9-3D17-4510-8464-E74F67267C00}"/>
                 </a:ext>
                 <a:ext uri="{C183D7F6-B498-43B3-948B-1728B52AA6E4}">
-                  <adec:decorative xmlns="" xmlns:adec="http://schemas.microsoft.com/office/drawing/2017/decorative" val="1"/>
+                  <adec:decorative xmlns:adec="http://schemas.microsoft.com/office/drawing/2017/decorative" xmlns="" val="1"/>
                 </a:ext>
               </a:extLst>
             </p:cNvPr>
@@ -6005,7 +6197,7 @@
                   <a16:creationId xmlns:a16="http://schemas.microsoft.com/office/drawing/2014/main" id="{AA5DFA43-F31D-4C31-8826-6B40A21CF9AD}"/>
                 </a:ext>
                 <a:ext uri="{C183D7F6-B498-43B3-948B-1728B52AA6E4}">
-                  <adec:decorative xmlns="" xmlns:adec="http://schemas.microsoft.com/office/drawing/2017/decorative" val="1"/>
+                  <adec:decorative xmlns:adec="http://schemas.microsoft.com/office/drawing/2017/decorative" xmlns="" val="1"/>
                 </a:ext>
               </a:extLst>
             </p:cNvPr>
@@ -6111,18 +6303,16 @@
             <a:r>
               <a:rPr lang="en-US" altLang="zh-TW" dirty="0" smtClean="0">
                 <a:solidFill>
-                  <a:srgbClr val="FFFEFF"/>
+                  <a:srgbClr val="FFC000"/>
                 </a:solidFill>
               </a:rPr>
-              <a:t>Statistic</a:t>
-            </a:r>
-            <a:endParaRPr lang="en-US" altLang="zh-TW" dirty="0">
-              <a:solidFill>
-                <a:srgbClr val="FFFEFF"/>
-              </a:solidFill>
-              <a:latin typeface="Microsoft JhengHei UI" panose="020B0604030504040204" pitchFamily="34" charset="-120"/>
-              <a:ea typeface="Microsoft JhengHei UI" panose="020B0604030504040204" pitchFamily="34" charset="-120"/>
-            </a:endParaRPr>
+              <a:t>Statistic </a:t>
+            </a:r>
+            <a:r>
+              <a:rPr lang="en-US" altLang="zh-TW" dirty="0" smtClean="0"/>
+              <a:t>method</a:t>
+            </a:r>
+            <a:endParaRPr lang="en-US" altLang="zh-TW" dirty="0"/>
           </a:p>
         </p:txBody>
       </p:sp>
@@ -7441,18 +7631,16 @@
             <a:r>
               <a:rPr lang="en-US" altLang="zh-TW" dirty="0" smtClean="0">
                 <a:solidFill>
-                  <a:srgbClr val="FFFEFF"/>
+                  <a:srgbClr val="FFC000"/>
                 </a:solidFill>
               </a:rPr>
-              <a:t>Machine learning</a:t>
-            </a:r>
-            <a:endParaRPr lang="en-US" altLang="zh-TW" dirty="0">
-              <a:solidFill>
-                <a:srgbClr val="FFFEFF"/>
-              </a:solidFill>
-              <a:latin typeface="Microsoft JhengHei UI" panose="020B0604030504040204" pitchFamily="34" charset="-120"/>
-              <a:ea typeface="Microsoft JhengHei UI" panose="020B0604030504040204" pitchFamily="34" charset="-120"/>
-            </a:endParaRPr>
+              <a:t>Machine learning </a:t>
+            </a:r>
+            <a:r>
+              <a:rPr lang="en-US" altLang="zh-TW" dirty="0" smtClean="0"/>
+              <a:t>feature clear</a:t>
+            </a:r>
+            <a:endParaRPr lang="en-US" altLang="zh-TW" dirty="0"/>
           </a:p>
         </p:txBody>
       </p:sp>
@@ -7517,7 +7705,391 @@
         </p:nvGrpSpPr>
         <p:grpSpPr>
           <a:xfrm>
-            <a:off x="474742" y="2032728"/>
+            <a:off x="503143" y="2032728"/>
+            <a:ext cx="3116356" cy="441388"/>
+            <a:chOff x="4192673" y="1618424"/>
+            <a:chExt cx="2644602" cy="441388"/>
+          </a:xfrm>
+        </p:grpSpPr>
+        <p:sp>
+          <p:nvSpPr>
+            <p:cNvPr id="7" name="六邊形 6"/>
+            <p:cNvSpPr/>
+            <p:nvPr/>
+          </p:nvSpPr>
+          <p:spPr>
+            <a:xfrm>
+              <a:off x="4192673" y="1618424"/>
+              <a:ext cx="2644602" cy="441388"/>
+            </a:xfrm>
+            <a:prstGeom prst="hexagon">
+              <a:avLst>
+                <a:gd name="adj" fmla="val 40000"/>
+                <a:gd name="vf" fmla="val 115470"/>
+              </a:avLst>
+            </a:prstGeom>
+          </p:spPr>
+          <p:style>
+            <a:lnRef idx="2">
+              <a:schemeClr val="accent5">
+                <a:shade val="50000"/>
+              </a:schemeClr>
+            </a:lnRef>
+            <a:fillRef idx="1">
+              <a:schemeClr val="accent5"/>
+            </a:fillRef>
+            <a:effectRef idx="0">
+              <a:schemeClr val="accent5"/>
+            </a:effectRef>
+            <a:fontRef idx="minor">
+              <a:schemeClr val="lt1"/>
+            </a:fontRef>
+          </p:style>
+        </p:sp>
+        <p:sp>
+          <p:nvSpPr>
+            <p:cNvPr id="8" name="六邊形 4"/>
+            <p:cNvSpPr txBox="1"/>
+            <p:nvPr/>
+          </p:nvSpPr>
+          <p:spPr>
+            <a:xfrm>
+              <a:off x="4471908" y="1665029"/>
+              <a:ext cx="2086132" cy="348178"/>
+            </a:xfrm>
+            <a:prstGeom prst="rect">
+              <a:avLst/>
+            </a:prstGeom>
+          </p:spPr>
+          <p:style>
+            <a:lnRef idx="0">
+              <a:scrgbClr r="0" g="0" b="0"/>
+            </a:lnRef>
+            <a:fillRef idx="0">
+              <a:scrgbClr r="0" g="0" b="0"/>
+            </a:fillRef>
+            <a:effectRef idx="0">
+              <a:scrgbClr r="0" g="0" b="0"/>
+            </a:effectRef>
+            <a:fontRef idx="minor">
+              <a:schemeClr val="lt1"/>
+            </a:fontRef>
+          </p:style>
+          <p:txBody>
+            <a:bodyPr spcFirstLastPara="0" vert="horz" wrap="square" lIns="121920" tIns="121920" rIns="121920" bIns="121920" numCol="1" spcCol="1270" rtlCol="0" anchor="ctr" anchorCtr="0">
+              <a:noAutofit/>
+            </a:bodyPr>
+            <a:lstStyle/>
+            <a:p>
+              <a:pPr lvl="0" defTabSz="711200">
+                <a:lnSpc>
+                  <a:spcPct val="90000"/>
+                </a:lnSpc>
+                <a:spcBef>
+                  <a:spcPct val="0"/>
+                </a:spcBef>
+                <a:spcAft>
+                  <a:spcPct val="35000"/>
+                </a:spcAft>
+              </a:pPr>
+              <a:r>
+                <a:rPr lang="en-US" sz="1600" kern="1200" noProof="0" dirty="0" err="1" smtClean="0">
+                  <a:latin typeface="Microsoft JhengHei UI" panose="020B0604030504040204" pitchFamily="34" charset="-120"/>
+                  <a:ea typeface="Microsoft JhengHei UI" panose="020B0604030504040204" pitchFamily="34" charset="-120"/>
+                </a:rPr>
+                <a:t>Avg</a:t>
+              </a:r>
+              <a:r>
+                <a:rPr lang="en-US" sz="1600" kern="1200" noProof="0" dirty="0" smtClean="0">
+                  <a:latin typeface="Microsoft JhengHei UI" panose="020B0604030504040204" pitchFamily="34" charset="-120"/>
+                  <a:ea typeface="Microsoft JhengHei UI" panose="020B0604030504040204" pitchFamily="34" charset="-120"/>
+                </a:rPr>
+                <a:t> and weight</a:t>
+              </a:r>
+              <a:endParaRPr lang="en-US" sz="1600" kern="1200" noProof="0" dirty="0">
+                <a:latin typeface="Microsoft JhengHei UI" panose="020B0604030504040204" pitchFamily="34" charset="-120"/>
+                <a:ea typeface="Microsoft JhengHei UI" panose="020B0604030504040204" pitchFamily="34" charset="-120"/>
+              </a:endParaRPr>
+            </a:p>
+          </p:txBody>
+        </p:sp>
+      </p:grpSp>
+      <p:sp>
+        <p:nvSpPr>
+          <p:cNvPr id="20" name="矩形 19"/>
+          <p:cNvSpPr/>
+          <p:nvPr/>
+        </p:nvSpPr>
+        <p:spPr>
+          <a:xfrm>
+            <a:off x="149060" y="3501685"/>
+            <a:ext cx="3673059" cy="1177036"/>
+          </a:xfrm>
+          <a:prstGeom prst="rect">
+            <a:avLst/>
+          </a:prstGeom>
+        </p:spPr>
+        <p:style>
+          <a:lnRef idx="0">
+            <a:schemeClr val="dk1">
+              <a:alpha val="0"/>
+              <a:hueOff val="0"/>
+              <a:satOff val="0"/>
+              <a:lumOff val="0"/>
+              <a:alphaOff val="0"/>
+            </a:schemeClr>
+          </a:lnRef>
+          <a:fillRef idx="0">
+            <a:schemeClr val="lt1">
+              <a:alpha val="0"/>
+              <a:hueOff val="0"/>
+              <a:satOff val="0"/>
+              <a:lumOff val="0"/>
+              <a:alphaOff val="0"/>
+            </a:schemeClr>
+          </a:fillRef>
+          <a:effectRef idx="0">
+            <a:schemeClr val="lt1">
+              <a:alpha val="0"/>
+              <a:hueOff val="0"/>
+              <a:satOff val="0"/>
+              <a:lumOff val="0"/>
+              <a:alphaOff val="0"/>
+            </a:schemeClr>
+          </a:effectRef>
+          <a:fontRef idx="minor">
+            <a:schemeClr val="tx1">
+              <a:hueOff val="0"/>
+              <a:satOff val="0"/>
+              <a:lumOff val="0"/>
+              <a:alphaOff val="0"/>
+            </a:schemeClr>
+          </a:fontRef>
+        </p:style>
+      </p:sp>
+      <p:sp>
+        <p:nvSpPr>
+          <p:cNvPr id="27" name="矩形 26"/>
+          <p:cNvSpPr/>
+          <p:nvPr/>
+        </p:nvSpPr>
+        <p:spPr>
+          <a:xfrm>
+            <a:off x="149060" y="4685720"/>
+            <a:ext cx="3673059" cy="1177036"/>
+          </a:xfrm>
+          <a:prstGeom prst="rect">
+            <a:avLst/>
+          </a:prstGeom>
+        </p:spPr>
+        <p:style>
+          <a:lnRef idx="0">
+            <a:schemeClr val="dk1">
+              <a:alpha val="0"/>
+              <a:hueOff val="0"/>
+              <a:satOff val="0"/>
+              <a:lumOff val="0"/>
+              <a:alphaOff val="0"/>
+            </a:schemeClr>
+          </a:lnRef>
+          <a:fillRef idx="0">
+            <a:schemeClr val="lt1">
+              <a:alpha val="0"/>
+              <a:hueOff val="0"/>
+              <a:satOff val="0"/>
+              <a:lumOff val="0"/>
+              <a:alphaOff val="0"/>
+            </a:schemeClr>
+          </a:fillRef>
+          <a:effectRef idx="0">
+            <a:schemeClr val="lt1">
+              <a:alpha val="0"/>
+              <a:hueOff val="0"/>
+              <a:satOff val="0"/>
+              <a:lumOff val="0"/>
+              <a:alphaOff val="0"/>
+            </a:schemeClr>
+          </a:effectRef>
+          <a:fontRef idx="minor">
+            <a:schemeClr val="tx1">
+              <a:hueOff val="0"/>
+              <a:satOff val="0"/>
+              <a:lumOff val="0"/>
+              <a:alphaOff val="0"/>
+            </a:schemeClr>
+          </a:fontRef>
+        </p:style>
+      </p:sp>
+    </p:spTree>
+    <p:extLst>
+      <p:ext uri="{BB962C8B-B14F-4D97-AF65-F5344CB8AC3E}">
+        <p14:creationId xmlns:p14="http://schemas.microsoft.com/office/powerpoint/2010/main" val="1670734773"/>
+      </p:ext>
+    </p:extLst>
+  </p:cSld>
+  <p:clrMapOvr>
+    <a:masterClrMapping/>
+  </p:clrMapOvr>
+</p:sld>
+</file>
+
+<file path=ppt/slides/slide12.xml><?xml version="1.0" encoding="utf-8"?>
+<p:sld xmlns:a="http://schemas.openxmlformats.org/drawingml/2006/main" xmlns:r="http://schemas.openxmlformats.org/officeDocument/2006/relationships" xmlns:p="http://schemas.openxmlformats.org/presentationml/2006/main">
+  <p:cSld>
+    <p:spTree>
+      <p:nvGrpSpPr>
+        <p:cNvPr id="1" name=""/>
+        <p:cNvGrpSpPr/>
+        <p:nvPr/>
+      </p:nvGrpSpPr>
+      <p:grpSpPr>
+        <a:xfrm>
+          <a:off x="0" y="0"/>
+          <a:ext cx="0" cy="0"/>
+          <a:chOff x="0" y="0"/>
+          <a:chExt cx="0" cy="0"/>
+        </a:xfrm>
+      </p:grpSpPr>
+      <p:sp>
+        <p:nvSpPr>
+          <p:cNvPr id="2" name="標題 1">
+            <a:extLst>
+              <a:ext uri="{FF2B5EF4-FFF2-40B4-BE49-F238E27FC236}">
+                <a16:creationId xmlns:a16="http://schemas.microsoft.com/office/drawing/2014/main" id="{A0150EC9-7E7D-4648-AC38-2A7BCBFB2EF6}"/>
+              </a:ext>
+            </a:extLst>
+          </p:cNvPr>
+          <p:cNvSpPr>
+            <a:spLocks noGrp="1"/>
+          </p:cNvSpPr>
+          <p:nvPr>
+            <p:ph type="title"/>
+          </p:nvPr>
+        </p:nvSpPr>
+        <p:spPr>
+          <a:xfrm>
+            <a:off x="581192" y="702156"/>
+            <a:ext cx="11029616" cy="1013800"/>
+          </a:xfrm>
+        </p:spPr>
+        <p:txBody>
+          <a:bodyPr rtlCol="0">
+            <a:normAutofit/>
+          </a:bodyPr>
+          <a:lstStyle/>
+          <a:p>
+            <a:r>
+              <a:rPr lang="en-US" altLang="zh-TW" dirty="0" smtClean="0">
+                <a:solidFill>
+                  <a:srgbClr val="FFC000"/>
+                </a:solidFill>
+              </a:rPr>
+              <a:t>Machine </a:t>
+            </a:r>
+            <a:r>
+              <a:rPr lang="en-US" altLang="zh-TW" dirty="0" smtClean="0">
+                <a:solidFill>
+                  <a:srgbClr val="FFC000"/>
+                </a:solidFill>
+              </a:rPr>
+              <a:t>learning</a:t>
+            </a:r>
+            <a:r>
+              <a:rPr lang="en-US" altLang="zh-TW" dirty="0">
+                <a:solidFill>
+                  <a:srgbClr val="FFFEFF"/>
+                </a:solidFill>
+              </a:rPr>
+              <a:t> </a:t>
+            </a:r>
+            <a:r>
+              <a:rPr lang="en-US" altLang="zh-TW" dirty="0" smtClean="0">
+                <a:solidFill>
+                  <a:srgbClr val="FFFEFF"/>
+                </a:solidFill>
+              </a:rPr>
+              <a:t>Classification </a:t>
+            </a:r>
+            <a:r>
+              <a:rPr lang="en-US" altLang="zh-TW" dirty="0">
+                <a:solidFill>
+                  <a:srgbClr val="FFFEFF"/>
+                </a:solidFill>
+              </a:rPr>
+              <a:t>algorithm</a:t>
+            </a:r>
+            <a:endParaRPr lang="en-US" altLang="zh-TW" dirty="0">
+              <a:solidFill>
+                <a:srgbClr val="FFFEFF"/>
+              </a:solidFill>
+              <a:latin typeface="Microsoft JhengHei UI" panose="020B0604030504040204" pitchFamily="34" charset="-120"/>
+              <a:ea typeface="Microsoft JhengHei UI" panose="020B0604030504040204" pitchFamily="34" charset="-120"/>
+            </a:endParaRPr>
+          </a:p>
+        </p:txBody>
+      </p:sp>
+      <p:sp>
+        <p:nvSpPr>
+          <p:cNvPr id="4" name="矩形 3"/>
+          <p:cNvSpPr/>
+          <p:nvPr/>
+        </p:nvSpPr>
+        <p:spPr>
+          <a:xfrm>
+            <a:off x="120659" y="2032728"/>
+            <a:ext cx="3673059" cy="1177036"/>
+          </a:xfrm>
+          <a:prstGeom prst="rect">
+            <a:avLst/>
+          </a:prstGeom>
+        </p:spPr>
+        <p:style>
+          <a:lnRef idx="0">
+            <a:schemeClr val="dk1">
+              <a:alpha val="0"/>
+              <a:hueOff val="0"/>
+              <a:satOff val="0"/>
+              <a:lumOff val="0"/>
+              <a:alphaOff val="0"/>
+            </a:schemeClr>
+          </a:lnRef>
+          <a:fillRef idx="0">
+            <a:schemeClr val="lt1">
+              <a:alpha val="0"/>
+              <a:hueOff val="0"/>
+              <a:satOff val="0"/>
+              <a:lumOff val="0"/>
+              <a:alphaOff val="0"/>
+            </a:schemeClr>
+          </a:fillRef>
+          <a:effectRef idx="0">
+            <a:schemeClr val="lt1">
+              <a:alpha val="0"/>
+              <a:hueOff val="0"/>
+              <a:satOff val="0"/>
+              <a:lumOff val="0"/>
+              <a:alphaOff val="0"/>
+            </a:schemeClr>
+          </a:effectRef>
+          <a:fontRef idx="minor">
+            <a:schemeClr val="tx1">
+              <a:hueOff val="0"/>
+              <a:satOff val="0"/>
+              <a:lumOff val="0"/>
+              <a:alphaOff val="0"/>
+            </a:schemeClr>
+          </a:fontRef>
+        </p:style>
+      </p:sp>
+      <p:grpSp>
+        <p:nvGrpSpPr>
+          <p:cNvPr id="6" name="群組 5"/>
+          <p:cNvGrpSpPr/>
+          <p:nvPr/>
+        </p:nvGrpSpPr>
+        <p:grpSpPr>
+          <a:xfrm>
+            <a:off x="503143" y="2032728"/>
             <a:ext cx="3116356" cy="441388"/>
             <a:chOff x="4192673" y="1618424"/>
             <a:chExt cx="2644602" cy="441388"/>
@@ -7621,49 +8193,13 @@
       </p:grpSp>
       <p:sp>
         <p:nvSpPr>
-          <p:cNvPr id="15" name="矩形 14"/>
-          <p:cNvSpPr/>
-          <p:nvPr/>
-        </p:nvSpPr>
-        <p:spPr>
-          <a:xfrm>
-            <a:off x="563422" y="2582314"/>
-            <a:ext cx="9637221" cy="400110"/>
-          </a:xfrm>
-          <a:prstGeom prst="rect">
-            <a:avLst/>
-          </a:prstGeom>
-        </p:spPr>
-        <p:txBody>
-          <a:bodyPr wrap="square">
-            <a:spAutoFit/>
-          </a:bodyPr>
-          <a:lstStyle/>
-          <a:p>
-            <a:pPr lvl="0"/>
-            <a:r>
-              <a:rPr lang="zh-TW" altLang="en-US" sz="2000" dirty="0" smtClean="0">
-                <a:latin typeface="Microsoft JhengHei UI" panose="020B0604030504040204" pitchFamily="34" charset="-120"/>
-                <a:ea typeface="Microsoft JhengHei UI" panose="020B0604030504040204" pitchFamily="34" charset="-120"/>
-              </a:rPr>
-              <a:t>使用機器學習演算法，這邊簡單介紹</a:t>
-            </a:r>
-            <a:endParaRPr lang="en-US" altLang="zh-TW" sz="2000" dirty="0">
-              <a:latin typeface="Microsoft JhengHei UI" panose="020B0604030504040204" pitchFamily="34" charset="-120"/>
-              <a:ea typeface="Microsoft JhengHei UI" panose="020B0604030504040204" pitchFamily="34" charset="-120"/>
-            </a:endParaRPr>
-          </a:p>
-        </p:txBody>
-      </p:sp>
-      <p:sp>
-        <p:nvSpPr>
           <p:cNvPr id="20" name="矩形 19"/>
           <p:cNvSpPr/>
           <p:nvPr/>
         </p:nvSpPr>
         <p:spPr>
           <a:xfrm>
-            <a:off x="149060" y="3293869"/>
+            <a:off x="149060" y="3501685"/>
             <a:ext cx="3673059" cy="1177036"/>
           </a:xfrm>
           <a:prstGeom prst="rect">
@@ -7716,7 +8252,7 @@
         </p:nvGrpSpPr>
         <p:grpSpPr>
           <a:xfrm>
-            <a:off x="503143" y="3293869"/>
+            <a:off x="503143" y="3501685"/>
             <a:ext cx="3116356" cy="441388"/>
             <a:chOff x="4192673" y="1618424"/>
             <a:chExt cx="2644602" cy="441388"/>
@@ -7826,8 +8362,8 @@
         </p:nvSpPr>
         <p:spPr>
           <a:xfrm>
-            <a:off x="591823" y="3843455"/>
-            <a:ext cx="9637221" cy="400110"/>
+            <a:off x="581192" y="4014865"/>
+            <a:ext cx="11332778" cy="830997"/>
           </a:xfrm>
           <a:prstGeom prst="rect">
             <a:avLst/>
@@ -7841,13 +8377,30 @@
           <a:p>
             <a:pPr lvl="0"/>
             <a:r>
-              <a:rPr lang="zh-TW" altLang="en-US" sz="2000" dirty="0" smtClean="0">
+              <a:rPr lang="en-US" altLang="zh-TW" sz="1600" dirty="0">
                 <a:latin typeface="Microsoft JhengHei UI" panose="020B0604030504040204" pitchFamily="34" charset="-120"/>
                 <a:ea typeface="Microsoft JhengHei UI" panose="020B0604030504040204" pitchFamily="34" charset="-120"/>
               </a:rPr>
-              <a:t>使用機器學習演算法，這邊簡單介紹  待完成</a:t>
-            </a:r>
-            <a:endParaRPr lang="en-US" altLang="zh-TW" sz="2000" dirty="0">
+              <a:t>The (random forest) algorithm establishes the outcome based on the predictions of the </a:t>
+            </a:r>
+            <a:r>
+              <a:rPr lang="en-US" altLang="zh-TW" sz="1600" dirty="0">
+                <a:solidFill>
+                  <a:srgbClr val="FFC000"/>
+                </a:solidFill>
+                <a:latin typeface="Microsoft JhengHei UI" panose="020B0604030504040204" pitchFamily="34" charset="-120"/>
+                <a:ea typeface="Microsoft JhengHei UI" panose="020B0604030504040204" pitchFamily="34" charset="-120"/>
+              </a:rPr>
+              <a:t>decision trees</a:t>
+            </a:r>
+            <a:r>
+              <a:rPr lang="en-US" altLang="zh-TW" sz="1600" dirty="0">
+                <a:latin typeface="Microsoft JhengHei UI" panose="020B0604030504040204" pitchFamily="34" charset="-120"/>
+                <a:ea typeface="Microsoft JhengHei UI" panose="020B0604030504040204" pitchFamily="34" charset="-120"/>
+              </a:rPr>
+              <a:t>. It predicts by taking the average or mean of the output from various trees. Increasing the number of trees increases the precision of the outcome.</a:t>
+            </a:r>
+            <a:endParaRPr lang="en-US" altLang="zh-TW" sz="1600" dirty="0">
               <a:latin typeface="Microsoft JhengHei UI" panose="020B0604030504040204" pitchFamily="34" charset="-120"/>
               <a:ea typeface="Microsoft JhengHei UI" panose="020B0604030504040204" pitchFamily="34" charset="-120"/>
             </a:endParaRPr>
@@ -7915,7 +8468,7 @@
         </p:nvGrpSpPr>
         <p:grpSpPr>
           <a:xfrm>
-            <a:off x="503143" y="4685720"/>
+            <a:off x="474742" y="4921789"/>
             <a:ext cx="3116356" cy="441388"/>
             <a:chOff x="4192673" y="1618424"/>
             <a:chExt cx="2644602" cy="441388"/>
@@ -8003,11 +8556,11 @@
                 </a:spcAft>
               </a:pPr>
               <a:r>
-                <a:rPr lang="en-US" altLang="zh-TW" sz="1600" dirty="0" smtClean="0">
+                <a:rPr lang="en-US" sz="1600" noProof="0" dirty="0" err="1" smtClean="0">
                   <a:latin typeface="Microsoft JhengHei UI" panose="020B0604030504040204" pitchFamily="34" charset="-120"/>
                   <a:ea typeface="Microsoft JhengHei UI" panose="020B0604030504040204" pitchFamily="34" charset="-120"/>
                 </a:rPr>
-                <a:t>SVM</a:t>
+                <a:t>XGboost</a:t>
               </a:r>
               <a:endParaRPr lang="en-US" sz="1600" kern="1200" noProof="0" dirty="0">
                 <a:latin typeface="Microsoft JhengHei UI" panose="020B0604030504040204" pitchFamily="34" charset="-120"/>
@@ -8017,6 +8570,104 @@
           </p:txBody>
         </p:sp>
       </p:grpSp>
+      <p:sp>
+        <p:nvSpPr>
+          <p:cNvPr id="9" name="矩形 8"/>
+          <p:cNvSpPr/>
+          <p:nvPr/>
+        </p:nvSpPr>
+        <p:spPr>
+          <a:xfrm>
+            <a:off x="563422" y="5462671"/>
+            <a:ext cx="11350548" cy="1077218"/>
+          </a:xfrm>
+          <a:prstGeom prst="rect">
+            <a:avLst/>
+          </a:prstGeom>
+        </p:spPr>
+        <p:txBody>
+          <a:bodyPr wrap="square">
+            <a:spAutoFit/>
+          </a:bodyPr>
+          <a:lstStyle/>
+          <a:p>
+            <a:r>
+              <a:rPr lang="en-US" altLang="zh-TW" sz="1600" dirty="0" err="1">
+                <a:latin typeface="Microsoft JhengHei UI" panose="020B0604030504040204" pitchFamily="34" charset="-120"/>
+                <a:ea typeface="Microsoft JhengHei UI" panose="020B0604030504040204" pitchFamily="34" charset="-120"/>
+              </a:rPr>
+              <a:t>XGBoost</a:t>
+            </a:r>
+            <a:r>
+              <a:rPr lang="en-US" altLang="zh-TW" sz="1600" dirty="0">
+                <a:latin typeface="Microsoft JhengHei UI" panose="020B0604030504040204" pitchFamily="34" charset="-120"/>
+                <a:ea typeface="Microsoft JhengHei UI" panose="020B0604030504040204" pitchFamily="34" charset="-120"/>
+              </a:rPr>
+              <a:t> (Extreme Gradient Boosting) is a Gradient Boosted Tree (GBDT) that keeps the original model unchanged every time, and adds a new function to the model to correct the error of the previous tree to improve the overall model. Mainly used to solve the problem of supervision is learning, can be used for classification can also be used for regression </a:t>
+            </a:r>
+            <a:r>
+              <a:rPr lang="en-US" altLang="zh-TW" sz="1600" dirty="0" smtClean="0">
+                <a:latin typeface="Microsoft JhengHei UI" panose="020B0604030504040204" pitchFamily="34" charset="-120"/>
+                <a:ea typeface="Microsoft JhengHei UI" panose="020B0604030504040204" pitchFamily="34" charset="-120"/>
+              </a:rPr>
+              <a:t>problems.</a:t>
+            </a:r>
+            <a:endParaRPr lang="zh-TW" altLang="en-US" sz="1600" dirty="0">
+              <a:latin typeface="Microsoft JhengHei UI" panose="020B0604030504040204" pitchFamily="34" charset="-120"/>
+              <a:ea typeface="Microsoft JhengHei UI" panose="020B0604030504040204" pitchFamily="34" charset="-120"/>
+            </a:endParaRPr>
+          </a:p>
+        </p:txBody>
+      </p:sp>
+      <p:sp>
+        <p:nvSpPr>
+          <p:cNvPr id="10" name="矩形 9"/>
+          <p:cNvSpPr/>
+          <p:nvPr/>
+        </p:nvSpPr>
+        <p:spPr>
+          <a:xfrm>
+            <a:off x="581192" y="2490334"/>
+            <a:ext cx="11332778" cy="830997"/>
+          </a:xfrm>
+          <a:prstGeom prst="rect">
+            <a:avLst/>
+          </a:prstGeom>
+        </p:spPr>
+        <p:txBody>
+          <a:bodyPr wrap="square">
+            <a:spAutoFit/>
+          </a:bodyPr>
+          <a:lstStyle/>
+          <a:p>
+            <a:r>
+              <a:rPr lang="en-US" altLang="zh-TW" sz="1600" dirty="0">
+                <a:latin typeface="Microsoft JhengHei UI" panose="020B0604030504040204" pitchFamily="34" charset="-120"/>
+                <a:ea typeface="Microsoft JhengHei UI" panose="020B0604030504040204" pitchFamily="34" charset="-120"/>
+              </a:rPr>
+              <a:t>Naive </a:t>
+            </a:r>
+            <a:r>
+              <a:rPr lang="en-US" altLang="zh-TW" sz="1600" dirty="0" err="1">
+                <a:latin typeface="Microsoft JhengHei UI" panose="020B0604030504040204" pitchFamily="34" charset="-120"/>
+                <a:ea typeface="Microsoft JhengHei UI" panose="020B0604030504040204" pitchFamily="34" charset="-120"/>
+              </a:rPr>
+              <a:t>bayes</a:t>
+            </a:r>
+            <a:r>
+              <a:rPr lang="en-US" altLang="zh-TW" sz="1600" dirty="0">
+                <a:latin typeface="Microsoft JhengHei UI" panose="020B0604030504040204" pitchFamily="34" charset="-120"/>
+                <a:ea typeface="Microsoft JhengHei UI" panose="020B0604030504040204" pitchFamily="34" charset="-120"/>
+              </a:rPr>
+              <a:t> is a classification model based on calculating the probability of conditions. By assuming that each event is independent, the probability under each condition can be calculated to obtain the probability of the event (category) occurring</a:t>
+            </a:r>
+            <a:endParaRPr lang="zh-TW" altLang="en-US" sz="1600" dirty="0">
+              <a:latin typeface="Microsoft JhengHei UI" panose="020B0604030504040204" pitchFamily="34" charset="-120"/>
+              <a:ea typeface="Microsoft JhengHei UI" panose="020B0604030504040204" pitchFamily="34" charset="-120"/>
+            </a:endParaRPr>
+          </a:p>
+        </p:txBody>
+      </p:sp>
     </p:spTree>
     <p:extLst>
       <p:ext uri="{BB962C8B-B14F-4D97-AF65-F5344CB8AC3E}">
@@ -8030,7 +8681,7 @@
 </p:sld>
 </file>
 
-<file path=ppt/slides/slide12.xml><?xml version="1.0" encoding="utf-8"?>
+<file path=ppt/slides/slide13.xml><?xml version="1.0" encoding="utf-8"?>
 <p:sld xmlns:a="http://schemas.openxmlformats.org/drawingml/2006/main" xmlns:r="http://schemas.openxmlformats.org/officeDocument/2006/relationships" xmlns:p="http://schemas.openxmlformats.org/presentationml/2006/main">
   <p:cSld>
     <p:spTree>
@@ -8098,7 +8749,7 @@
 </p:sld>
 </file>
 
-<file path=ppt/slides/slide13.xml><?xml version="1.0" encoding="utf-8"?>
+<file path=ppt/slides/slide14.xml><?xml version="1.0" encoding="utf-8"?>
 <p:sld xmlns:a="http://schemas.openxmlformats.org/drawingml/2006/main" xmlns:r="http://schemas.openxmlformats.org/officeDocument/2006/relationships" xmlns:p="http://schemas.openxmlformats.org/presentationml/2006/main">
   <p:cSld>
     <p:spTree>
@@ -8817,7 +9468,7 @@
 </p:sld>
 </file>
 
-<file path=ppt/slides/slide14.xml><?xml version="1.0" encoding="utf-8"?>
+<file path=ppt/slides/slide15.xml><?xml version="1.0" encoding="utf-8"?>
 <p:sld xmlns:a="http://schemas.openxmlformats.org/drawingml/2006/main" xmlns:r="http://schemas.openxmlformats.org/officeDocument/2006/relationships" xmlns:p="http://schemas.openxmlformats.org/presentationml/2006/main">
   <p:cSld>
     <p:spTree>
@@ -9124,7 +9775,7 @@
           <p:nvPr>
             <p:extLst>
               <p:ext uri="{D42A27DB-BD31-4B8C-83A1-F6EECF244321}">
-                <p14:modId xmlns:p14="http://schemas.microsoft.com/office/powerpoint/2010/main" val="452453878"/>
+                <p14:modId xmlns:p14="http://schemas.microsoft.com/office/powerpoint/2010/main" val="3948223902"/>
               </p:ext>
             </p:extLst>
           </p:nvPr>
@@ -9203,8 +9854,8 @@
                     <a:lstStyle/>
                     <a:p>
                       <a:r>
-                        <a:rPr lang="zh-TW" altLang="en-US" sz="1200" dirty="0" smtClean="0"/>
-                        <a:t>待完成</a:t>
+                        <a:rPr lang="en-US" altLang="zh-TW" sz="1200" dirty="0" smtClean="0"/>
+                        <a:t>0.70</a:t>
                       </a:r>
                       <a:endParaRPr lang="zh-TW" altLang="en-US" sz="1200" dirty="0"/>
                     </a:p>
@@ -9237,6 +9888,10 @@
                     <a:bodyPr/>
                     <a:lstStyle/>
                     <a:p>
+                      <a:r>
+                        <a:rPr lang="en-US" altLang="zh-TW" sz="1200" dirty="0" smtClean="0"/>
+                        <a:t>0.63</a:t>
+                      </a:r>
                       <a:endParaRPr lang="zh-TW" altLang="en-US" sz="1200" dirty="0"/>
                     </a:p>
                   </a:txBody>
@@ -9268,6 +9923,10 @@
                     <a:bodyPr/>
                     <a:lstStyle/>
                     <a:p>
+                      <a:r>
+                        <a:rPr lang="en-US" altLang="zh-TW" sz="1200" dirty="0" smtClean="0"/>
+                        <a:t>0.70</a:t>
+                      </a:r>
                       <a:endParaRPr lang="zh-TW" altLang="en-US" sz="1200" dirty="0"/>
                     </a:p>
                   </a:txBody>
@@ -9299,6 +9958,10 @@
                     <a:bodyPr/>
                     <a:lstStyle/>
                     <a:p>
+                      <a:r>
+                        <a:rPr lang="en-US" altLang="zh-TW" sz="1200" dirty="0" smtClean="0"/>
+                        <a:t>0.66</a:t>
+                      </a:r>
                       <a:endParaRPr lang="zh-TW" altLang="en-US" sz="1200" dirty="0"/>
                     </a:p>
                   </a:txBody>
@@ -9620,8 +10283,8 @@
           <a:p>
             <a:pPr algn="ctr"/>
             <a:r>
-              <a:rPr lang="en-US" altLang="zh-TW" dirty="0" smtClean="0"/>
-              <a:t>SVM</a:t>
+              <a:rPr lang="en-US" altLang="zh-TW" dirty="0" err="1" smtClean="0"/>
+              <a:t>XGboost</a:t>
             </a:r>
             <a:endParaRPr lang="zh-TW" altLang="en-US" dirty="0"/>
           </a:p>
@@ -9674,7 +10337,7 @@
           <p:nvPr>
             <p:extLst>
               <p:ext uri="{D42A27DB-BD31-4B8C-83A1-F6EECF244321}">
-                <p14:modId xmlns:p14="http://schemas.microsoft.com/office/powerpoint/2010/main" val="99060820"/>
+                <p14:modId xmlns:p14="http://schemas.microsoft.com/office/powerpoint/2010/main" val="2173222368"/>
               </p:ext>
             </p:extLst>
           </p:nvPr>
@@ -9752,6 +10415,10 @@
                     <a:bodyPr/>
                     <a:lstStyle/>
                     <a:p>
+                      <a:r>
+                        <a:rPr lang="en-US" altLang="zh-TW" sz="1200" dirty="0" smtClean="0"/>
+                        <a:t>0.72</a:t>
+                      </a:r>
                       <a:endParaRPr lang="zh-TW" altLang="en-US" sz="1200" dirty="0"/>
                     </a:p>
                   </a:txBody>
@@ -9783,6 +10450,10 @@
                     <a:bodyPr/>
                     <a:lstStyle/>
                     <a:p>
+                      <a:r>
+                        <a:rPr lang="en-US" altLang="zh-TW" sz="1200" dirty="0" smtClean="0"/>
+                        <a:t>0.68</a:t>
+                      </a:r>
                       <a:endParaRPr lang="zh-TW" altLang="en-US" sz="1200" dirty="0"/>
                     </a:p>
                   </a:txBody>
@@ -9814,6 +10485,10 @@
                     <a:bodyPr/>
                     <a:lstStyle/>
                     <a:p>
+                      <a:r>
+                        <a:rPr lang="en-US" altLang="zh-TW" sz="1200" dirty="0" smtClean="0"/>
+                        <a:t>0.725</a:t>
+                      </a:r>
                       <a:endParaRPr lang="zh-TW" altLang="en-US" sz="1200" dirty="0"/>
                     </a:p>
                   </a:txBody>
@@ -9845,6 +10520,10 @@
                     <a:bodyPr/>
                     <a:lstStyle/>
                     <a:p>
+                      <a:r>
+                        <a:rPr lang="en-US" altLang="zh-TW" sz="1200" dirty="0" smtClean="0"/>
+                        <a:t>0.70</a:t>
+                      </a:r>
                       <a:endParaRPr lang="zh-TW" altLang="en-US" sz="1200" dirty="0"/>
                     </a:p>
                   </a:txBody>
@@ -9869,7 +10548,7 @@
           <p:nvPr>
             <p:extLst>
               <p:ext uri="{D42A27DB-BD31-4B8C-83A1-F6EECF244321}">
-                <p14:modId xmlns:p14="http://schemas.microsoft.com/office/powerpoint/2010/main" val="3187099511"/>
+                <p14:modId xmlns:p14="http://schemas.microsoft.com/office/powerpoint/2010/main" val="3623941595"/>
               </p:ext>
             </p:extLst>
           </p:nvPr>
@@ -9947,6 +10626,10 @@
                     <a:bodyPr/>
                     <a:lstStyle/>
                     <a:p>
+                      <a:r>
+                        <a:rPr lang="en-US" altLang="zh-TW" sz="1200" dirty="0" smtClean="0"/>
+                        <a:t>0.73</a:t>
+                      </a:r>
                       <a:endParaRPr lang="zh-TW" altLang="en-US" sz="1200" dirty="0"/>
                     </a:p>
                   </a:txBody>
@@ -9978,6 +10661,10 @@
                     <a:bodyPr/>
                     <a:lstStyle/>
                     <a:p>
+                      <a:r>
+                        <a:rPr lang="en-US" altLang="zh-TW" sz="1200" dirty="0" smtClean="0"/>
+                        <a:t>0.73</a:t>
+                      </a:r>
                       <a:endParaRPr lang="zh-TW" altLang="en-US" sz="1200" dirty="0"/>
                     </a:p>
                   </a:txBody>
@@ -10009,6 +10696,10 @@
                     <a:bodyPr/>
                     <a:lstStyle/>
                     <a:p>
+                      <a:r>
+                        <a:rPr lang="en-US" altLang="zh-TW" sz="1200" dirty="0" smtClean="0"/>
+                        <a:t>0.75</a:t>
+                      </a:r>
                       <a:endParaRPr lang="zh-TW" altLang="en-US" sz="1200" dirty="0"/>
                     </a:p>
                   </a:txBody>
@@ -10040,6 +10731,10 @@
                     <a:bodyPr/>
                     <a:lstStyle/>
                     <a:p>
+                      <a:r>
+                        <a:rPr lang="en-US" altLang="zh-TW" sz="1200" dirty="0" smtClean="0"/>
+                        <a:t>0.73</a:t>
+                      </a:r>
                       <a:endParaRPr lang="zh-TW" altLang="en-US" sz="1200" dirty="0"/>
                     </a:p>
                   </a:txBody>
@@ -10310,78 +11005,6 @@
 </p:sld>
 </file>
 
-<file path=ppt/slides/slide15.xml><?xml version="1.0" encoding="utf-8"?>
-<p:sld xmlns:a="http://schemas.openxmlformats.org/drawingml/2006/main" xmlns:r="http://schemas.openxmlformats.org/officeDocument/2006/relationships" xmlns:p="http://schemas.openxmlformats.org/presentationml/2006/main">
-  <p:cSld>
-    <p:spTree>
-      <p:nvGrpSpPr>
-        <p:cNvPr id="1" name=""/>
-        <p:cNvGrpSpPr/>
-        <p:nvPr/>
-      </p:nvGrpSpPr>
-      <p:grpSpPr>
-        <a:xfrm>
-          <a:off x="0" y="0"/>
-          <a:ext cx="0" cy="0"/>
-          <a:chOff x="0" y="0"/>
-          <a:chExt cx="0" cy="0"/>
-        </a:xfrm>
-      </p:grpSpPr>
-      <p:sp>
-        <p:nvSpPr>
-          <p:cNvPr id="2" name="標題 1"/>
-          <p:cNvSpPr>
-            <a:spLocks noGrp="1"/>
-          </p:cNvSpPr>
-          <p:nvPr>
-            <p:ph type="title"/>
-          </p:nvPr>
-        </p:nvSpPr>
-        <p:spPr>
-          <a:xfrm>
-            <a:off x="428793" y="3653510"/>
-            <a:ext cx="11029615" cy="1497507"/>
-          </a:xfrm>
-        </p:spPr>
-        <p:txBody>
-          <a:bodyPr>
-            <a:normAutofit/>
-          </a:bodyPr>
-          <a:lstStyle/>
-          <a:p>
-            <a:r>
-              <a:rPr lang="en-US" altLang="zh-TW" sz="7200" dirty="0" smtClean="0"/>
-              <a:t>Thank </a:t>
-            </a:r>
-            <a:r>
-              <a:rPr lang="en-US" altLang="zh-TW" sz="7200" dirty="0" smtClean="0">
-                <a:solidFill>
-                  <a:schemeClr val="accent6"/>
-                </a:solidFill>
-              </a:rPr>
-              <a:t>you</a:t>
-            </a:r>
-            <a:endParaRPr lang="zh-TW" altLang="en-US" sz="7200" dirty="0">
-              <a:solidFill>
-                <a:schemeClr val="accent6"/>
-              </a:solidFill>
-            </a:endParaRPr>
-          </a:p>
-        </p:txBody>
-      </p:sp>
-    </p:spTree>
-    <p:extLst>
-      <p:ext uri="{BB962C8B-B14F-4D97-AF65-F5344CB8AC3E}">
-        <p14:creationId xmlns:p14="http://schemas.microsoft.com/office/powerpoint/2010/main" val="4038362970"/>
-      </p:ext>
-    </p:extLst>
-  </p:cSld>
-  <p:clrMapOvr>
-    <a:masterClrMapping/>
-  </p:clrMapOvr>
-</p:sld>
-</file>
-
 <file path=ppt/slides/slide16.xml><?xml version="1.0" encoding="utf-8"?>
 <p:sld xmlns:a="http://schemas.openxmlformats.org/drawingml/2006/main" xmlns:r="http://schemas.openxmlformats.org/officeDocument/2006/relationships" xmlns:p="http://schemas.openxmlformats.org/presentationml/2006/main">
   <p:cSld>
@@ -10422,6 +11045,78 @@
           <a:lstStyle/>
           <a:p>
             <a:r>
+              <a:rPr lang="en-US" altLang="zh-TW" sz="7200" dirty="0" smtClean="0"/>
+              <a:t>Thank </a:t>
+            </a:r>
+            <a:r>
+              <a:rPr lang="en-US" altLang="zh-TW" sz="7200" dirty="0" smtClean="0">
+                <a:solidFill>
+                  <a:schemeClr val="accent6"/>
+                </a:solidFill>
+              </a:rPr>
+              <a:t>you</a:t>
+            </a:r>
+            <a:endParaRPr lang="zh-TW" altLang="en-US" sz="7200" dirty="0">
+              <a:solidFill>
+                <a:schemeClr val="accent6"/>
+              </a:solidFill>
+            </a:endParaRPr>
+          </a:p>
+        </p:txBody>
+      </p:sp>
+    </p:spTree>
+    <p:extLst>
+      <p:ext uri="{BB962C8B-B14F-4D97-AF65-F5344CB8AC3E}">
+        <p14:creationId xmlns:p14="http://schemas.microsoft.com/office/powerpoint/2010/main" val="4038362970"/>
+      </p:ext>
+    </p:extLst>
+  </p:cSld>
+  <p:clrMapOvr>
+    <a:masterClrMapping/>
+  </p:clrMapOvr>
+</p:sld>
+</file>
+
+<file path=ppt/slides/slide17.xml><?xml version="1.0" encoding="utf-8"?>
+<p:sld xmlns:a="http://schemas.openxmlformats.org/drawingml/2006/main" xmlns:r="http://schemas.openxmlformats.org/officeDocument/2006/relationships" xmlns:p="http://schemas.openxmlformats.org/presentationml/2006/main">
+  <p:cSld>
+    <p:spTree>
+      <p:nvGrpSpPr>
+        <p:cNvPr id="1" name=""/>
+        <p:cNvGrpSpPr/>
+        <p:nvPr/>
+      </p:nvGrpSpPr>
+      <p:grpSpPr>
+        <a:xfrm>
+          <a:off x="0" y="0"/>
+          <a:ext cx="0" cy="0"/>
+          <a:chOff x="0" y="0"/>
+          <a:chExt cx="0" cy="0"/>
+        </a:xfrm>
+      </p:grpSpPr>
+      <p:sp>
+        <p:nvSpPr>
+          <p:cNvPr id="2" name="標題 1"/>
+          <p:cNvSpPr>
+            <a:spLocks noGrp="1"/>
+          </p:cNvSpPr>
+          <p:nvPr>
+            <p:ph type="title"/>
+          </p:nvPr>
+        </p:nvSpPr>
+        <p:spPr>
+          <a:xfrm>
+            <a:off x="428793" y="3653510"/>
+            <a:ext cx="11029615" cy="1497507"/>
+          </a:xfrm>
+        </p:spPr>
+        <p:txBody>
+          <a:bodyPr>
+            <a:normAutofit/>
+          </a:bodyPr>
+          <a:lstStyle/>
+          <a:p>
+            <a:r>
               <a:rPr lang="en-US" altLang="zh-TW" sz="7200" dirty="0" err="1" smtClean="0"/>
               <a:t>github</a:t>
             </a:r>
@@ -10442,7 +11137,7 @@
 </p:sld>
 </file>
 
-<file path=ppt/slides/slide17.xml><?xml version="1.0" encoding="utf-8"?>
+<file path=ppt/slides/slide18.xml><?xml version="1.0" encoding="utf-8"?>
 <p:sld xmlns:a="http://schemas.openxmlformats.org/drawingml/2006/main" xmlns:r="http://schemas.openxmlformats.org/officeDocument/2006/relationships" xmlns:p="http://schemas.openxmlformats.org/presentationml/2006/main">
   <p:cSld>
     <p:spTree>
@@ -10653,66 +11348,6 @@
 </p:sld>
 </file>
 
-<file path=ppt/slides/slide18.xml><?xml version="1.0" encoding="utf-8"?>
-<p:sld xmlns:a="http://schemas.openxmlformats.org/drawingml/2006/main" xmlns:r="http://schemas.openxmlformats.org/officeDocument/2006/relationships" xmlns:p="http://schemas.openxmlformats.org/presentationml/2006/main">
-  <p:cSld>
-    <p:spTree>
-      <p:nvGrpSpPr>
-        <p:cNvPr id="1" name=""/>
-        <p:cNvGrpSpPr/>
-        <p:nvPr/>
-      </p:nvGrpSpPr>
-      <p:grpSpPr>
-        <a:xfrm>
-          <a:off x="0" y="0"/>
-          <a:ext cx="0" cy="0"/>
-          <a:chOff x="0" y="0"/>
-          <a:chExt cx="0" cy="0"/>
-        </a:xfrm>
-      </p:grpSpPr>
-      <p:sp>
-        <p:nvSpPr>
-          <p:cNvPr id="2" name="標題 1"/>
-          <p:cNvSpPr>
-            <a:spLocks noGrp="1"/>
-          </p:cNvSpPr>
-          <p:nvPr>
-            <p:ph type="title"/>
-          </p:nvPr>
-        </p:nvSpPr>
-        <p:spPr>
-          <a:xfrm>
-            <a:off x="428793" y="3653510"/>
-            <a:ext cx="11029615" cy="1497507"/>
-          </a:xfrm>
-        </p:spPr>
-        <p:txBody>
-          <a:bodyPr>
-            <a:normAutofit/>
-          </a:bodyPr>
-          <a:lstStyle/>
-          <a:p>
-            <a:r>
-              <a:rPr lang="en-US" altLang="zh-TW" sz="7200" dirty="0" smtClean="0"/>
-              <a:t>reference</a:t>
-            </a:r>
-            <a:endParaRPr lang="zh-TW" altLang="en-US" sz="7200" dirty="0"/>
-          </a:p>
-        </p:txBody>
-      </p:sp>
-    </p:spTree>
-    <p:extLst>
-      <p:ext uri="{BB962C8B-B14F-4D97-AF65-F5344CB8AC3E}">
-        <p14:creationId xmlns:p14="http://schemas.microsoft.com/office/powerpoint/2010/main" val="230992842"/>
-      </p:ext>
-    </p:extLst>
-  </p:cSld>
-  <p:clrMapOvr>
-    <a:masterClrMapping/>
-  </p:clrMapOvr>
-</p:sld>
-</file>
-
 <file path=ppt/slides/slide19.xml><?xml version="1.0" encoding="utf-8"?>
 <p:sld xmlns:a="http://schemas.openxmlformats.org/drawingml/2006/main" xmlns:r="http://schemas.openxmlformats.org/officeDocument/2006/relationships" xmlns:p="http://schemas.openxmlformats.org/presentationml/2006/main">
   <p:cSld>
@@ -10732,13 +11367,7 @@
       </p:grpSpPr>
       <p:sp>
         <p:nvSpPr>
-          <p:cNvPr id="2" name="標題 1">
-            <a:extLst>
-              <a:ext uri="{FF2B5EF4-FFF2-40B4-BE49-F238E27FC236}">
-                <a16:creationId xmlns:a16="http://schemas.microsoft.com/office/drawing/2014/main" id="{A0150EC9-7E7D-4648-AC38-2A7BCBFB2EF6}"/>
-              </a:ext>
-            </a:extLst>
-          </p:cNvPr>
+          <p:cNvPr id="2" name="標題 1"/>
           <p:cNvSpPr>
             <a:spLocks noGrp="1"/>
           </p:cNvSpPr>
@@ -10748,604 +11377,28 @@
         </p:nvSpPr>
         <p:spPr>
           <a:xfrm>
-            <a:off x="581192" y="702156"/>
-            <a:ext cx="11029616" cy="1013800"/>
+            <a:off x="428793" y="3653510"/>
+            <a:ext cx="11029615" cy="1497507"/>
           </a:xfrm>
         </p:spPr>
         <p:txBody>
-          <a:bodyPr rtlCol="0">
+          <a:bodyPr>
             <a:normAutofit/>
           </a:bodyPr>
           <a:lstStyle/>
           <a:p>
             <a:r>
-              <a:rPr lang="en-US" altLang="zh-TW" dirty="0" smtClean="0"/>
+              <a:rPr lang="en-US" altLang="zh-TW" sz="7200" dirty="0" smtClean="0"/>
               <a:t>reference</a:t>
             </a:r>
-            <a:endParaRPr lang="en-US" altLang="zh-TW" dirty="0"/>
-          </a:p>
-        </p:txBody>
-      </p:sp>
-      <p:sp>
-        <p:nvSpPr>
-          <p:cNvPr id="4" name="矩形 3"/>
-          <p:cNvSpPr/>
-          <p:nvPr/>
-        </p:nvSpPr>
-        <p:spPr>
-          <a:xfrm>
-            <a:off x="120659" y="2032728"/>
-            <a:ext cx="3673059" cy="1177036"/>
-          </a:xfrm>
-          <a:prstGeom prst="rect">
-            <a:avLst/>
-          </a:prstGeom>
-        </p:spPr>
-        <p:style>
-          <a:lnRef idx="0">
-            <a:schemeClr val="dk1">
-              <a:alpha val="0"/>
-              <a:hueOff val="0"/>
-              <a:satOff val="0"/>
-              <a:lumOff val="0"/>
-              <a:alphaOff val="0"/>
-            </a:schemeClr>
-          </a:lnRef>
-          <a:fillRef idx="0">
-            <a:schemeClr val="lt1">
-              <a:alpha val="0"/>
-              <a:hueOff val="0"/>
-              <a:satOff val="0"/>
-              <a:lumOff val="0"/>
-              <a:alphaOff val="0"/>
-            </a:schemeClr>
-          </a:fillRef>
-          <a:effectRef idx="0">
-            <a:schemeClr val="lt1">
-              <a:alpha val="0"/>
-              <a:hueOff val="0"/>
-              <a:satOff val="0"/>
-              <a:lumOff val="0"/>
-              <a:alphaOff val="0"/>
-            </a:schemeClr>
-          </a:effectRef>
-          <a:fontRef idx="minor">
-            <a:schemeClr val="tx1">
-              <a:hueOff val="0"/>
-              <a:satOff val="0"/>
-              <a:lumOff val="0"/>
-              <a:alphaOff val="0"/>
-            </a:schemeClr>
-          </a:fontRef>
-        </p:style>
-      </p:sp>
-      <p:sp>
-        <p:nvSpPr>
-          <p:cNvPr id="13" name="矩形 12"/>
-          <p:cNvSpPr/>
-          <p:nvPr/>
-        </p:nvSpPr>
-        <p:spPr>
-          <a:xfrm>
-            <a:off x="449886" y="2094596"/>
-            <a:ext cx="11292227" cy="4985980"/>
-          </a:xfrm>
-          <a:prstGeom prst="rect">
-            <a:avLst/>
-          </a:prstGeom>
-        </p:spPr>
-        <p:txBody>
-          <a:bodyPr wrap="square">
-            <a:spAutoFit/>
-          </a:bodyPr>
-          <a:lstStyle/>
-          <a:p>
-            <a:pPr>
-              <a:lnSpc>
-                <a:spcPct val="150000"/>
-              </a:lnSpc>
-            </a:pPr>
-            <a:r>
-              <a:rPr lang="en-US" altLang="zh-TW" sz="1600" kern="100" dirty="0">
-                <a:latin typeface="Microsoft JhengHei UI" panose="020B0604030504040204" pitchFamily="34" charset="-120"/>
-                <a:ea typeface="Microsoft JhengHei UI" panose="020B0604030504040204" pitchFamily="34" charset="-120"/>
-                <a:cs typeface="Times New Roman" panose="02020603050405020304" pitchFamily="18" charset="0"/>
-              </a:rPr>
-              <a:t>[</a:t>
-            </a:r>
-            <a:r>
-              <a:rPr lang="en-US" altLang="zh-TW" sz="1600" kern="100" dirty="0" smtClean="0">
-                <a:latin typeface="Microsoft JhengHei UI" panose="020B0604030504040204" pitchFamily="34" charset="-120"/>
-                <a:ea typeface="Microsoft JhengHei UI" panose="020B0604030504040204" pitchFamily="34" charset="-120"/>
-                <a:cs typeface="Times New Roman" panose="02020603050405020304" pitchFamily="18" charset="0"/>
-              </a:rPr>
-              <a:t>1]</a:t>
-            </a:r>
-            <a:r>
-              <a:rPr lang="en-US" altLang="zh-CN" sz="1600" dirty="0" smtClean="0">
-                <a:latin typeface="Microsoft JhengHei UI" panose="020B0604030504040204" pitchFamily="34" charset="-120"/>
-                <a:ea typeface="Microsoft JhengHei UI" panose="020B0604030504040204" pitchFamily="34" charset="-120"/>
-              </a:rPr>
-              <a:t>python </a:t>
-            </a:r>
-            <a:r>
-              <a:rPr lang="zh-CN" altLang="en-US" sz="1600" dirty="0">
-                <a:latin typeface="Microsoft JhengHei UI" panose="020B0604030504040204" pitchFamily="34" charset="-120"/>
-                <a:ea typeface="Microsoft JhengHei UI" panose="020B0604030504040204" pitchFamily="34" charset="-120"/>
-              </a:rPr>
-              <a:t>去除所有的中文 英文标点符</a:t>
-            </a:r>
-            <a:r>
-              <a:rPr lang="zh-CN" altLang="en-US" sz="1600" dirty="0" smtClean="0">
-                <a:latin typeface="Microsoft JhengHei UI" panose="020B0604030504040204" pitchFamily="34" charset="-120"/>
-                <a:ea typeface="Microsoft JhengHei UI" panose="020B0604030504040204" pitchFamily="34" charset="-120"/>
-              </a:rPr>
-              <a:t>号</a:t>
-            </a:r>
-            <a:r>
-              <a:rPr lang="en-US" altLang="zh-TW" sz="1600" kern="100" dirty="0" smtClean="0">
-                <a:latin typeface="Microsoft JhengHei UI" panose="020B0604030504040204" pitchFamily="34" charset="-120"/>
-                <a:ea typeface="Microsoft JhengHei UI" panose="020B0604030504040204" pitchFamily="34" charset="-120"/>
-                <a:cs typeface="Times New Roman" panose="02020603050405020304" pitchFamily="18" charset="0"/>
-              </a:rPr>
-              <a:t>(</a:t>
-            </a:r>
-            <a:r>
-              <a:rPr lang="en-US" altLang="zh-TW" sz="1600" kern="100" dirty="0" smtClean="0">
-                <a:latin typeface="Microsoft JhengHei UI" panose="020B0604030504040204" pitchFamily="34" charset="-120"/>
-                <a:ea typeface="Microsoft JhengHei UI" panose="020B0604030504040204" pitchFamily="34" charset="-120"/>
-                <a:cs typeface="Times New Roman" panose="02020603050405020304" pitchFamily="18" charset="0"/>
-                <a:hlinkClick r:id="rId3"/>
-              </a:rPr>
-              <a:t>https</a:t>
-            </a:r>
-            <a:r>
-              <a:rPr lang="en-US" altLang="zh-TW" sz="1600" kern="100" dirty="0">
-                <a:latin typeface="Microsoft JhengHei UI" panose="020B0604030504040204" pitchFamily="34" charset="-120"/>
-                <a:ea typeface="Microsoft JhengHei UI" panose="020B0604030504040204" pitchFamily="34" charset="-120"/>
-                <a:cs typeface="Times New Roman" panose="02020603050405020304" pitchFamily="18" charset="0"/>
-                <a:hlinkClick r:id="rId3"/>
-              </a:rPr>
-              <a:t>://</a:t>
-            </a:r>
-            <a:r>
-              <a:rPr lang="en-US" altLang="zh-TW" sz="1600" kern="100" dirty="0" smtClean="0">
-                <a:latin typeface="Microsoft JhengHei UI" panose="020B0604030504040204" pitchFamily="34" charset="-120"/>
-                <a:ea typeface="Microsoft JhengHei UI" panose="020B0604030504040204" pitchFamily="34" charset="-120"/>
-                <a:cs typeface="Times New Roman" panose="02020603050405020304" pitchFamily="18" charset="0"/>
-                <a:hlinkClick r:id="rId3"/>
-              </a:rPr>
-              <a:t>blog.csdn.net/weixin_38819889/article/details/105389248</a:t>
-            </a:r>
-            <a:r>
-              <a:rPr lang="en-US" altLang="zh-TW" sz="1600" kern="100" dirty="0" smtClean="0">
-                <a:latin typeface="Microsoft JhengHei UI" panose="020B0604030504040204" pitchFamily="34" charset="-120"/>
-                <a:ea typeface="Microsoft JhengHei UI" panose="020B0604030504040204" pitchFamily="34" charset="-120"/>
-                <a:cs typeface="Times New Roman" panose="02020603050405020304" pitchFamily="18" charset="0"/>
-              </a:rPr>
-              <a:t>)</a:t>
-            </a:r>
-          </a:p>
-          <a:p>
-            <a:pPr>
-              <a:lnSpc>
-                <a:spcPct val="150000"/>
-              </a:lnSpc>
-            </a:pPr>
-            <a:r>
-              <a:rPr lang="en-US" altLang="zh-TW" sz="1600" kern="100" dirty="0" smtClean="0">
-                <a:latin typeface="Microsoft JhengHei UI" panose="020B0604030504040204" pitchFamily="34" charset="-120"/>
-                <a:ea typeface="Microsoft JhengHei UI" panose="020B0604030504040204" pitchFamily="34" charset="-120"/>
-                <a:cs typeface="Times New Roman" panose="02020603050405020304" pitchFamily="18" charset="0"/>
-              </a:rPr>
-              <a:t>[2]</a:t>
-            </a:r>
-            <a:r>
-              <a:rPr lang="en-US" altLang="zh-TW" sz="1600" dirty="0" smtClean="0">
-                <a:latin typeface="Microsoft JhengHei UI" panose="020B0604030504040204" pitchFamily="34" charset="-120"/>
-                <a:ea typeface="Microsoft JhengHei UI" panose="020B0604030504040204" pitchFamily="34" charset="-120"/>
-              </a:rPr>
-              <a:t>Python</a:t>
-            </a:r>
-            <a:r>
-              <a:rPr lang="zh-TW" altLang="en-US" sz="1600" dirty="0">
-                <a:latin typeface="Microsoft JhengHei UI" panose="020B0604030504040204" pitchFamily="34" charset="-120"/>
-                <a:ea typeface="Microsoft JhengHei UI" panose="020B0604030504040204" pitchFamily="34" charset="-120"/>
-              </a:rPr>
-              <a:t>處理中文標點符號大</a:t>
-            </a:r>
-            <a:r>
-              <a:rPr lang="zh-TW" altLang="en-US" sz="1600" dirty="0" smtClean="0">
-                <a:latin typeface="Microsoft JhengHei UI" panose="020B0604030504040204" pitchFamily="34" charset="-120"/>
-                <a:ea typeface="Microsoft JhengHei UI" panose="020B0604030504040204" pitchFamily="34" charset="-120"/>
-              </a:rPr>
-              <a:t>集合</a:t>
-            </a:r>
-            <a:r>
-              <a:rPr lang="en-US" altLang="zh-TW" sz="1600" dirty="0" smtClean="0">
-                <a:latin typeface="Microsoft JhengHei UI" panose="020B0604030504040204" pitchFamily="34" charset="-120"/>
-                <a:ea typeface="Microsoft JhengHei UI" panose="020B0604030504040204" pitchFamily="34" charset="-120"/>
-              </a:rPr>
-              <a:t>(</a:t>
-            </a:r>
-            <a:r>
-              <a:rPr lang="en-US" altLang="zh-TW" sz="1600" dirty="0">
-                <a:latin typeface="Microsoft JhengHei UI" panose="020B0604030504040204" pitchFamily="34" charset="-120"/>
-                <a:ea typeface="Microsoft JhengHei UI" panose="020B0604030504040204" pitchFamily="34" charset="-120"/>
-              </a:rPr>
-              <a:t>https://codertw.com/%E7%A8%8B%E5%BC%8F%E8%AA%9E%E8%A8%80/356827/)</a:t>
-            </a:r>
-            <a:endParaRPr lang="zh-TW" altLang="en-US" sz="1600" dirty="0">
-              <a:latin typeface="Microsoft JhengHei UI" panose="020B0604030504040204" pitchFamily="34" charset="-120"/>
-              <a:ea typeface="Microsoft JhengHei UI" panose="020B0604030504040204" pitchFamily="34" charset="-120"/>
-            </a:endParaRPr>
-          </a:p>
-          <a:p>
-            <a:pPr>
-              <a:lnSpc>
-                <a:spcPct val="150000"/>
-              </a:lnSpc>
-            </a:pPr>
-            <a:r>
-              <a:rPr lang="en-US" altLang="zh-TW" sz="1600" kern="100" dirty="0" smtClean="0">
-                <a:latin typeface="Microsoft JhengHei UI" panose="020B0604030504040204" pitchFamily="34" charset="-120"/>
-                <a:ea typeface="Microsoft JhengHei UI" panose="020B0604030504040204" pitchFamily="34" charset="-120"/>
-                <a:cs typeface="Times New Roman" panose="02020603050405020304" pitchFamily="18" charset="0"/>
-              </a:rPr>
-              <a:t>[3]</a:t>
-            </a:r>
-            <a:r>
-              <a:rPr lang="zh-TW" altLang="en-US" sz="1600" dirty="0">
-                <a:latin typeface="Microsoft JhengHei UI" panose="020B0604030504040204" pitchFamily="34" charset="-120"/>
-                <a:ea typeface="Microsoft JhengHei UI" panose="020B0604030504040204" pitchFamily="34" charset="-120"/>
-              </a:rPr>
-              <a:t>英文自然語言處理的經典工具 </a:t>
-            </a:r>
-            <a:r>
-              <a:rPr lang="en-US" altLang="zh-TW" sz="1600" dirty="0" smtClean="0">
-                <a:latin typeface="Microsoft JhengHei UI" panose="020B0604030504040204" pitchFamily="34" charset="-120"/>
-                <a:ea typeface="Microsoft JhengHei UI" panose="020B0604030504040204" pitchFamily="34" charset="-120"/>
-              </a:rPr>
-              <a:t>NLTK</a:t>
-            </a:r>
-            <a:r>
-              <a:rPr lang="en-US" altLang="zh-TW" sz="1600" kern="100" dirty="0">
-                <a:latin typeface="Microsoft JhengHei UI" panose="020B0604030504040204" pitchFamily="34" charset="-120"/>
-                <a:ea typeface="Microsoft JhengHei UI" panose="020B0604030504040204" pitchFamily="34" charset="-120"/>
-                <a:cs typeface="Times New Roman" panose="02020603050405020304" pitchFamily="18" charset="0"/>
-              </a:rPr>
-              <a:t>(</a:t>
-            </a:r>
-            <a:r>
-              <a:rPr lang="en-US" altLang="zh-TW" sz="1600" kern="100" dirty="0">
-                <a:latin typeface="Microsoft JhengHei UI" panose="020B0604030504040204" pitchFamily="34" charset="-120"/>
-                <a:ea typeface="Microsoft JhengHei UI" panose="020B0604030504040204" pitchFamily="34" charset="-120"/>
-                <a:cs typeface="Times New Roman" panose="02020603050405020304" pitchFamily="18" charset="0"/>
-                <a:hlinkClick r:id="rId4"/>
-              </a:rPr>
-              <a:t>https://clay-atlas.com/blog/2019/07/30/nlp-python-cn-nltk-kit</a:t>
-            </a:r>
-            <a:r>
-              <a:rPr lang="en-US" altLang="zh-TW" sz="1600" kern="100" dirty="0" smtClean="0">
-                <a:latin typeface="Microsoft JhengHei UI" panose="020B0604030504040204" pitchFamily="34" charset="-120"/>
-                <a:ea typeface="Microsoft JhengHei UI" panose="020B0604030504040204" pitchFamily="34" charset="-120"/>
-                <a:cs typeface="Times New Roman" panose="02020603050405020304" pitchFamily="18" charset="0"/>
-                <a:hlinkClick r:id="rId4"/>
-              </a:rPr>
-              <a:t>/</a:t>
-            </a:r>
-            <a:r>
-              <a:rPr lang="en-US" altLang="zh-TW" sz="1600" kern="100" dirty="0" smtClean="0">
-                <a:latin typeface="Microsoft JhengHei UI" panose="020B0604030504040204" pitchFamily="34" charset="-120"/>
-                <a:ea typeface="Microsoft JhengHei UI" panose="020B0604030504040204" pitchFamily="34" charset="-120"/>
-                <a:cs typeface="Times New Roman" panose="02020603050405020304" pitchFamily="18" charset="0"/>
-              </a:rPr>
-              <a:t>)</a:t>
-            </a:r>
-          </a:p>
-          <a:p>
-            <a:pPr>
-              <a:lnSpc>
-                <a:spcPct val="150000"/>
-              </a:lnSpc>
-            </a:pPr>
-            <a:r>
-              <a:rPr lang="en-US" altLang="zh-TW" sz="1600" kern="100" dirty="0" smtClean="0">
-                <a:latin typeface="Microsoft JhengHei UI" panose="020B0604030504040204" pitchFamily="34" charset="-120"/>
-                <a:ea typeface="Microsoft JhengHei UI" panose="020B0604030504040204" pitchFamily="34" charset="-120"/>
-                <a:cs typeface="Times New Roman" panose="02020603050405020304" pitchFamily="18" charset="0"/>
-              </a:rPr>
-              <a:t>[4]</a:t>
-            </a:r>
-            <a:r>
-              <a:rPr lang="en-US" altLang="zh-TW" sz="1600" dirty="0">
-                <a:latin typeface="Microsoft JhengHei UI" panose="020B0604030504040204" pitchFamily="34" charset="-120"/>
-                <a:ea typeface="Microsoft JhengHei UI" panose="020B0604030504040204" pitchFamily="34" charset="-120"/>
-              </a:rPr>
-              <a:t> Word2Vec</a:t>
-            </a:r>
-            <a:r>
-              <a:rPr lang="zh-TW" altLang="en-US" sz="1600" dirty="0">
-                <a:latin typeface="Microsoft JhengHei UI" panose="020B0604030504040204" pitchFamily="34" charset="-120"/>
-                <a:ea typeface="Microsoft JhengHei UI" panose="020B0604030504040204" pitchFamily="34" charset="-120"/>
-              </a:rPr>
-              <a:t>的参数解</a:t>
-            </a:r>
-            <a:r>
-              <a:rPr lang="zh-TW" altLang="en-US" sz="1600" dirty="0" smtClean="0">
-                <a:latin typeface="Microsoft JhengHei UI" panose="020B0604030504040204" pitchFamily="34" charset="-120"/>
-                <a:ea typeface="Microsoft JhengHei UI" panose="020B0604030504040204" pitchFamily="34" charset="-120"/>
-              </a:rPr>
-              <a:t>释</a:t>
-            </a:r>
-            <a:r>
-              <a:rPr lang="en-US" altLang="zh-TW" sz="1600" dirty="0">
-                <a:latin typeface="Microsoft JhengHei UI" panose="020B0604030504040204" pitchFamily="34" charset="-120"/>
-                <a:ea typeface="Microsoft JhengHei UI" panose="020B0604030504040204" pitchFamily="34" charset="-120"/>
-              </a:rPr>
-              <a:t>(</a:t>
-            </a:r>
-            <a:r>
-              <a:rPr lang="en-US" altLang="zh-TW" sz="1600" dirty="0">
-                <a:latin typeface="Microsoft JhengHei UI" panose="020B0604030504040204" pitchFamily="34" charset="-120"/>
-                <a:ea typeface="Microsoft JhengHei UI" panose="020B0604030504040204" pitchFamily="34" charset="-120"/>
-                <a:hlinkClick r:id="rId5"/>
-              </a:rPr>
-              <a:t>https://blog.csdn.net/laobai1015/article/details/86540813</a:t>
-            </a:r>
-            <a:r>
-              <a:rPr lang="en-US" altLang="zh-TW" sz="1600" dirty="0" smtClean="0">
-                <a:latin typeface="Microsoft JhengHei UI" panose="020B0604030504040204" pitchFamily="34" charset="-120"/>
-                <a:ea typeface="Microsoft JhengHei UI" panose="020B0604030504040204" pitchFamily="34" charset="-120"/>
-              </a:rPr>
-              <a:t>)</a:t>
-            </a:r>
-          </a:p>
-          <a:p>
-            <a:pPr>
-              <a:lnSpc>
-                <a:spcPct val="150000"/>
-              </a:lnSpc>
-            </a:pPr>
-            <a:r>
-              <a:rPr lang="en-US" altLang="zh-TW" sz="1600" dirty="0" smtClean="0">
-                <a:latin typeface="Microsoft JhengHei UI" panose="020B0604030504040204" pitchFamily="34" charset="-120"/>
-                <a:ea typeface="Microsoft JhengHei UI" panose="020B0604030504040204" pitchFamily="34" charset="-120"/>
-              </a:rPr>
-              <a:t>[5]</a:t>
-            </a:r>
-            <a:r>
-              <a:rPr lang="en-US" altLang="zh-TW" sz="1600" dirty="0">
-                <a:latin typeface="Microsoft JhengHei UI" panose="020B0604030504040204" pitchFamily="34" charset="-120"/>
-                <a:ea typeface="Microsoft JhengHei UI" panose="020B0604030504040204" pitchFamily="34" charset="-120"/>
-                <a:hlinkClick r:id="rId6"/>
-              </a:rPr>
-              <a:t> NLP</a:t>
-            </a:r>
-            <a:r>
-              <a:rPr lang="zh-TW" altLang="en-US" sz="1600" dirty="0">
-                <a:latin typeface="Microsoft JhengHei UI" panose="020B0604030504040204" pitchFamily="34" charset="-120"/>
-                <a:ea typeface="Microsoft JhengHei UI" panose="020B0604030504040204" pitchFamily="34" charset="-120"/>
-                <a:hlinkClick r:id="rId6"/>
-              </a:rPr>
-              <a:t>入门（三）词形还原（</a:t>
-            </a:r>
-            <a:r>
-              <a:rPr lang="en-US" altLang="zh-TW" sz="1600" dirty="0">
-                <a:latin typeface="Microsoft JhengHei UI" panose="020B0604030504040204" pitchFamily="34" charset="-120"/>
-                <a:ea typeface="Microsoft JhengHei UI" panose="020B0604030504040204" pitchFamily="34" charset="-120"/>
-                <a:hlinkClick r:id="rId6"/>
-              </a:rPr>
-              <a:t>Lemmatization</a:t>
-            </a:r>
-            <a:r>
-              <a:rPr lang="zh-TW" altLang="en-US" sz="1600" dirty="0" smtClean="0">
-                <a:latin typeface="Microsoft JhengHei UI" panose="020B0604030504040204" pitchFamily="34" charset="-120"/>
-                <a:ea typeface="Microsoft JhengHei UI" panose="020B0604030504040204" pitchFamily="34" charset="-120"/>
-                <a:hlinkClick r:id="rId6"/>
-              </a:rPr>
-              <a:t>）</a:t>
-            </a:r>
-            <a:r>
-              <a:rPr lang="en-US" altLang="zh-TW" sz="1600" dirty="0">
-                <a:latin typeface="Microsoft JhengHei UI" panose="020B0604030504040204" pitchFamily="34" charset="-120"/>
-                <a:ea typeface="Microsoft JhengHei UI" panose="020B0604030504040204" pitchFamily="34" charset="-120"/>
-              </a:rPr>
-              <a:t>(https://www.cnblogs.com/jclian91/p/9898511.html)</a:t>
-            </a:r>
-            <a:endParaRPr lang="zh-TW" altLang="en-US" sz="1600" dirty="0">
-              <a:latin typeface="Microsoft JhengHei UI" panose="020B0604030504040204" pitchFamily="34" charset="-120"/>
-              <a:ea typeface="Microsoft JhengHei UI" panose="020B0604030504040204" pitchFamily="34" charset="-120"/>
-            </a:endParaRPr>
-          </a:p>
-          <a:p>
-            <a:pPr>
-              <a:lnSpc>
-                <a:spcPct val="150000"/>
-              </a:lnSpc>
-            </a:pPr>
-            <a:r>
-              <a:rPr lang="en-US" altLang="zh-TW" sz="1600" dirty="0" smtClean="0">
-                <a:latin typeface="Microsoft JhengHei UI" panose="020B0604030504040204" pitchFamily="34" charset="-120"/>
-                <a:ea typeface="Microsoft JhengHei UI" panose="020B0604030504040204" pitchFamily="34" charset="-120"/>
-              </a:rPr>
-              <a:t>[6]</a:t>
-            </a:r>
-            <a:r>
-              <a:rPr lang="zh-TW" altLang="en-US" sz="1600" dirty="0">
-                <a:latin typeface="Microsoft JhengHei UI" panose="020B0604030504040204" pitchFamily="34" charset="-120"/>
-                <a:ea typeface="Microsoft JhengHei UI" panose="020B0604030504040204" pitchFamily="34" charset="-120"/>
-              </a:rPr>
-              <a:t> </a:t>
-            </a:r>
-            <a:r>
-              <a:rPr lang="en-US" altLang="zh-TW" sz="1600" dirty="0">
-                <a:latin typeface="Microsoft JhengHei UI" panose="020B0604030504040204" pitchFamily="34" charset="-120"/>
-                <a:ea typeface="Microsoft JhengHei UI" panose="020B0604030504040204" pitchFamily="34" charset="-120"/>
-              </a:rPr>
-              <a:t>Word2Vec</a:t>
-            </a:r>
-            <a:r>
-              <a:rPr lang="zh-TW" altLang="en-US" sz="1600" dirty="0">
-                <a:latin typeface="Microsoft JhengHei UI" panose="020B0604030504040204" pitchFamily="34" charset="-120"/>
-                <a:ea typeface="Microsoft JhengHei UI" panose="020B0604030504040204" pitchFamily="34" charset="-120"/>
-              </a:rPr>
-              <a:t>的簡易教學與參數調整</a:t>
-            </a:r>
-            <a:r>
-              <a:rPr lang="zh-TW" altLang="en-US" sz="1600" dirty="0" smtClean="0">
-                <a:latin typeface="Microsoft JhengHei UI" panose="020B0604030504040204" pitchFamily="34" charset="-120"/>
-                <a:ea typeface="Microsoft JhengHei UI" panose="020B0604030504040204" pitchFamily="34" charset="-120"/>
-              </a:rPr>
-              <a:t>指南</a:t>
-            </a:r>
-            <a:r>
-              <a:rPr lang="en-US" altLang="zh-TW" sz="1600" dirty="0">
-                <a:latin typeface="Microsoft JhengHei UI" panose="020B0604030504040204" pitchFamily="34" charset="-120"/>
-                <a:ea typeface="Microsoft JhengHei UI" panose="020B0604030504040204" pitchFamily="34" charset="-120"/>
-              </a:rPr>
-              <a:t>(</a:t>
-            </a:r>
-            <a:r>
-              <a:rPr lang="en-US" altLang="zh-TW" sz="1600" dirty="0">
-                <a:latin typeface="Microsoft JhengHei UI" panose="020B0604030504040204" pitchFamily="34" charset="-120"/>
-                <a:ea typeface="Microsoft JhengHei UI" panose="020B0604030504040204" pitchFamily="34" charset="-120"/>
-                <a:hlinkClick r:id="rId7"/>
-              </a:rPr>
-              <a:t>https://www.kaggle.com/jerrykuo7727/word2vec</a:t>
-            </a:r>
-            <a:r>
-              <a:rPr lang="en-US" altLang="zh-TW" sz="1600" dirty="0" smtClean="0">
-                <a:latin typeface="Microsoft JhengHei UI" panose="020B0604030504040204" pitchFamily="34" charset="-120"/>
-                <a:ea typeface="Microsoft JhengHei UI" panose="020B0604030504040204" pitchFamily="34" charset="-120"/>
-              </a:rPr>
-              <a:t>)</a:t>
-            </a:r>
-          </a:p>
-          <a:p>
-            <a:pPr>
-              <a:lnSpc>
-                <a:spcPct val="150000"/>
-              </a:lnSpc>
-            </a:pPr>
-            <a:r>
-              <a:rPr lang="en-US" altLang="zh-TW" sz="1600" dirty="0" smtClean="0">
-                <a:latin typeface="Microsoft JhengHei UI" panose="020B0604030504040204" pitchFamily="34" charset="-120"/>
-                <a:ea typeface="Microsoft JhengHei UI" panose="020B0604030504040204" pitchFamily="34" charset="-120"/>
-              </a:rPr>
-              <a:t>[7]</a:t>
-            </a:r>
-            <a:r>
-              <a:rPr lang="zh-TW" altLang="en-US" sz="1600" dirty="0">
-                <a:latin typeface="Microsoft JhengHei UI" panose="020B0604030504040204" pitchFamily="34" charset="-120"/>
-                <a:ea typeface="Microsoft JhengHei UI" panose="020B0604030504040204" pitchFamily="34" charset="-120"/>
-              </a:rPr>
-              <a:t>新手村逃脫！初心者的 </a:t>
-            </a:r>
-            <a:r>
-              <a:rPr lang="en-US" altLang="zh-TW" sz="1600" dirty="0">
-                <a:latin typeface="Microsoft JhengHei UI" panose="020B0604030504040204" pitchFamily="34" charset="-120"/>
-                <a:ea typeface="Microsoft JhengHei UI" panose="020B0604030504040204" pitchFamily="34" charset="-120"/>
-              </a:rPr>
-              <a:t>Python </a:t>
-            </a:r>
-            <a:r>
-              <a:rPr lang="zh-TW" altLang="en-US" sz="1600" dirty="0">
-                <a:latin typeface="Microsoft JhengHei UI" panose="020B0604030504040204" pitchFamily="34" charset="-120"/>
-                <a:ea typeface="Microsoft JhengHei UI" panose="020B0604030504040204" pitchFamily="34" charset="-120"/>
-              </a:rPr>
-              <a:t>機器學習攻略 </a:t>
-            </a:r>
-            <a:r>
-              <a:rPr lang="en-US" altLang="zh-TW" sz="1600" dirty="0">
-                <a:latin typeface="Microsoft JhengHei UI" panose="020B0604030504040204" pitchFamily="34" charset="-120"/>
-                <a:ea typeface="Microsoft JhengHei UI" panose="020B0604030504040204" pitchFamily="34" charset="-120"/>
-              </a:rPr>
-              <a:t>1.0.0 </a:t>
-            </a:r>
-            <a:r>
-              <a:rPr lang="en-US" altLang="zh-TW" sz="1600" dirty="0" smtClean="0">
-                <a:latin typeface="Microsoft JhengHei UI" panose="020B0604030504040204" pitchFamily="34" charset="-120"/>
-                <a:ea typeface="Microsoft JhengHei UI" panose="020B0604030504040204" pitchFamily="34" charset="-120"/>
-              </a:rPr>
-              <a:t>documentation</a:t>
-            </a:r>
-            <a:r>
-              <a:rPr lang="en-US" altLang="zh-TW" sz="1600" dirty="0">
-                <a:latin typeface="Microsoft JhengHei UI" panose="020B0604030504040204" pitchFamily="34" charset="-120"/>
-                <a:ea typeface="Microsoft JhengHei UI" panose="020B0604030504040204" pitchFamily="34" charset="-120"/>
-              </a:rPr>
-              <a:t>(</a:t>
-            </a:r>
-            <a:r>
-              <a:rPr lang="en-US" altLang="zh-TW" sz="1600" dirty="0">
-                <a:latin typeface="Microsoft JhengHei UI" panose="020B0604030504040204" pitchFamily="34" charset="-120"/>
-                <a:ea typeface="Microsoft JhengHei UI" panose="020B0604030504040204" pitchFamily="34" charset="-120"/>
-                <a:hlinkClick r:id="rId8"/>
-              </a:rPr>
-              <a:t>https://yaojenkuo.io/ml-newbies/07-performance.html</a:t>
-            </a:r>
-            <a:r>
-              <a:rPr lang="en-US" altLang="zh-TW" sz="1600" dirty="0" smtClean="0">
-                <a:latin typeface="Microsoft JhengHei UI" panose="020B0604030504040204" pitchFamily="34" charset="-120"/>
-                <a:ea typeface="Microsoft JhengHei UI" panose="020B0604030504040204" pitchFamily="34" charset="-120"/>
-              </a:rPr>
-              <a:t>)</a:t>
-            </a:r>
-          </a:p>
-          <a:p>
-            <a:pPr>
-              <a:lnSpc>
-                <a:spcPct val="150000"/>
-              </a:lnSpc>
-            </a:pPr>
-            <a:r>
-              <a:rPr lang="en-US" altLang="zh-TW" sz="1600" dirty="0" smtClean="0">
-                <a:latin typeface="Microsoft JhengHei UI" panose="020B0604030504040204" pitchFamily="34" charset="-120"/>
-                <a:ea typeface="Microsoft JhengHei UI" panose="020B0604030504040204" pitchFamily="34" charset="-120"/>
-              </a:rPr>
-              <a:t>[8]</a:t>
-            </a:r>
-            <a:r>
-              <a:rPr lang="en-US" altLang="zh-TW" sz="1600" dirty="0">
-                <a:latin typeface="Microsoft JhengHei UI" panose="020B0604030504040204" pitchFamily="34" charset="-120"/>
-                <a:ea typeface="Microsoft JhengHei UI" panose="020B0604030504040204" pitchFamily="34" charset="-120"/>
-              </a:rPr>
-              <a:t> Word2vec from scratch (Skip-gram &amp; CBOW)(https://medium.com/@pocheng0118/word2vec-from-scratch-skip-gram-cbow-98fd17385945)</a:t>
-            </a:r>
-            <a:endParaRPr lang="en-US" altLang="zh-TW" sz="1600" dirty="0" smtClean="0">
-              <a:latin typeface="Microsoft JhengHei UI" panose="020B0604030504040204" pitchFamily="34" charset="-120"/>
-              <a:ea typeface="Microsoft JhengHei UI" panose="020B0604030504040204" pitchFamily="34" charset="-120"/>
-            </a:endParaRPr>
-          </a:p>
-          <a:p>
-            <a:pPr>
-              <a:lnSpc>
-                <a:spcPct val="150000"/>
-              </a:lnSpc>
-            </a:pPr>
-            <a:endParaRPr lang="en-US" altLang="zh-TW" sz="1600" dirty="0" smtClean="0">
-              <a:latin typeface="Microsoft JhengHei UI" panose="020B0604030504040204" pitchFamily="34" charset="-120"/>
-              <a:ea typeface="Microsoft JhengHei UI" panose="020B0604030504040204" pitchFamily="34" charset="-120"/>
-            </a:endParaRPr>
-          </a:p>
-          <a:p>
-            <a:pPr>
-              <a:lnSpc>
-                <a:spcPct val="150000"/>
-              </a:lnSpc>
-            </a:pPr>
-            <a:endParaRPr lang="en-US" altLang="zh-TW" sz="1600" dirty="0">
-              <a:latin typeface="Microsoft JhengHei UI" panose="020B0604030504040204" pitchFamily="34" charset="-120"/>
-              <a:ea typeface="Microsoft JhengHei UI" panose="020B0604030504040204" pitchFamily="34" charset="-120"/>
-            </a:endParaRPr>
+            <a:endParaRPr lang="zh-TW" altLang="en-US" sz="7200" dirty="0"/>
           </a:p>
         </p:txBody>
       </p:sp>
     </p:spTree>
     <p:extLst>
       <p:ext uri="{BB962C8B-B14F-4D97-AF65-F5344CB8AC3E}">
-        <p14:creationId xmlns:p14="http://schemas.microsoft.com/office/powerpoint/2010/main" val="530469330"/>
+        <p14:creationId xmlns:p14="http://schemas.microsoft.com/office/powerpoint/2010/main" val="230992842"/>
       </p:ext>
     </p:extLst>
   </p:cSld>
@@ -12038,66 +12091,6 @@
       </p:grpSpPr>
       <p:sp>
         <p:nvSpPr>
-          <p:cNvPr id="2" name="標題 1"/>
-          <p:cNvSpPr>
-            <a:spLocks noGrp="1"/>
-          </p:cNvSpPr>
-          <p:nvPr>
-            <p:ph type="title"/>
-          </p:nvPr>
-        </p:nvSpPr>
-        <p:spPr>
-          <a:xfrm>
-            <a:off x="428793" y="3653510"/>
-            <a:ext cx="11029615" cy="1497507"/>
-          </a:xfrm>
-        </p:spPr>
-        <p:txBody>
-          <a:bodyPr>
-            <a:noAutofit/>
-          </a:bodyPr>
-          <a:lstStyle/>
-          <a:p>
-            <a:r>
-              <a:rPr lang="en-US" altLang="zh-TW" sz="7200" dirty="0" smtClean="0"/>
-              <a:t>Contribution of group members</a:t>
-            </a:r>
-            <a:endParaRPr lang="zh-TW" altLang="en-US" sz="7200" dirty="0"/>
-          </a:p>
-        </p:txBody>
-      </p:sp>
-    </p:spTree>
-    <p:extLst>
-      <p:ext uri="{BB962C8B-B14F-4D97-AF65-F5344CB8AC3E}">
-        <p14:creationId xmlns:p14="http://schemas.microsoft.com/office/powerpoint/2010/main" val="2998671774"/>
-      </p:ext>
-    </p:extLst>
-  </p:cSld>
-  <p:clrMapOvr>
-    <a:masterClrMapping/>
-  </p:clrMapOvr>
-</p:sld>
-</file>
-
-<file path=ppt/slides/slide21.xml><?xml version="1.0" encoding="utf-8"?>
-<p:sld xmlns:a="http://schemas.openxmlformats.org/drawingml/2006/main" xmlns:r="http://schemas.openxmlformats.org/officeDocument/2006/relationships" xmlns:p="http://schemas.openxmlformats.org/presentationml/2006/main">
-  <p:cSld>
-    <p:spTree>
-      <p:nvGrpSpPr>
-        <p:cNvPr id="1" name=""/>
-        <p:cNvGrpSpPr/>
-        <p:nvPr/>
-      </p:nvGrpSpPr>
-      <p:grpSpPr>
-        <a:xfrm>
-          <a:off x="0" y="0"/>
-          <a:ext cx="0" cy="0"/>
-          <a:chOff x="0" y="0"/>
-          <a:chExt cx="0" cy="0"/>
-        </a:xfrm>
-      </p:grpSpPr>
-      <p:sp>
-        <p:nvSpPr>
           <p:cNvPr id="2" name="標題 1">
             <a:extLst>
               <a:ext uri="{FF2B5EF4-FFF2-40B4-BE49-F238E27FC236}">
@@ -12126,7 +12119,7 @@
           <a:p>
             <a:r>
               <a:rPr lang="en-US" altLang="zh-TW" dirty="0" smtClean="0"/>
-              <a:t>contribute</a:t>
+              <a:t>reference</a:t>
             </a:r>
             <a:endParaRPr lang="en-US" altLang="zh-TW" dirty="0"/>
           </a:p>
@@ -12185,6 +12178,1174 @@
           </a:fontRef>
         </p:style>
       </p:sp>
+      <p:sp>
+        <p:nvSpPr>
+          <p:cNvPr id="13" name="矩形 12"/>
+          <p:cNvSpPr/>
+          <p:nvPr/>
+        </p:nvSpPr>
+        <p:spPr>
+          <a:xfrm>
+            <a:off x="449886" y="2094596"/>
+            <a:ext cx="11445627" cy="4524315"/>
+          </a:xfrm>
+          <a:prstGeom prst="rect">
+            <a:avLst/>
+          </a:prstGeom>
+        </p:spPr>
+        <p:txBody>
+          <a:bodyPr wrap="square">
+            <a:spAutoFit/>
+          </a:bodyPr>
+          <a:lstStyle/>
+          <a:p>
+            <a:pPr>
+              <a:lnSpc>
+                <a:spcPct val="150000"/>
+              </a:lnSpc>
+            </a:pPr>
+            <a:r>
+              <a:rPr lang="en-US" altLang="zh-TW" sz="1600" kern="100" dirty="0">
+                <a:latin typeface="Microsoft JhengHei UI" panose="020B0604030504040204" pitchFamily="34" charset="-120"/>
+                <a:ea typeface="Microsoft JhengHei UI" panose="020B0604030504040204" pitchFamily="34" charset="-120"/>
+                <a:cs typeface="Times New Roman" panose="02020603050405020304" pitchFamily="18" charset="0"/>
+              </a:rPr>
+              <a:t>[</a:t>
+            </a:r>
+            <a:r>
+              <a:rPr lang="en-US" altLang="zh-TW" sz="1600" kern="100" dirty="0" smtClean="0">
+                <a:latin typeface="Microsoft JhengHei UI" panose="020B0604030504040204" pitchFamily="34" charset="-120"/>
+                <a:ea typeface="Microsoft JhengHei UI" panose="020B0604030504040204" pitchFamily="34" charset="-120"/>
+                <a:cs typeface="Times New Roman" panose="02020603050405020304" pitchFamily="18" charset="0"/>
+              </a:rPr>
+              <a:t>1]</a:t>
+            </a:r>
+            <a:r>
+              <a:rPr lang="en-US" altLang="zh-CN" sz="1600" dirty="0" smtClean="0">
+                <a:latin typeface="Microsoft JhengHei UI" panose="020B0604030504040204" pitchFamily="34" charset="-120"/>
+                <a:ea typeface="Microsoft JhengHei UI" panose="020B0604030504040204" pitchFamily="34" charset="-120"/>
+              </a:rPr>
+              <a:t>python </a:t>
+            </a:r>
+            <a:r>
+              <a:rPr lang="zh-CN" altLang="en-US" sz="1600" dirty="0">
+                <a:latin typeface="Microsoft JhengHei UI" panose="020B0604030504040204" pitchFamily="34" charset="-120"/>
+                <a:ea typeface="Microsoft JhengHei UI" panose="020B0604030504040204" pitchFamily="34" charset="-120"/>
+              </a:rPr>
+              <a:t>去除所有的中文 英文标点符</a:t>
+            </a:r>
+            <a:r>
+              <a:rPr lang="zh-CN" altLang="en-US" sz="1600" dirty="0" smtClean="0">
+                <a:latin typeface="Microsoft JhengHei UI" panose="020B0604030504040204" pitchFamily="34" charset="-120"/>
+                <a:ea typeface="Microsoft JhengHei UI" panose="020B0604030504040204" pitchFamily="34" charset="-120"/>
+              </a:rPr>
+              <a:t>号</a:t>
+            </a:r>
+            <a:r>
+              <a:rPr lang="en-US" altLang="zh-TW" sz="1600" kern="100" dirty="0" smtClean="0">
+                <a:latin typeface="Microsoft JhengHei UI" panose="020B0604030504040204" pitchFamily="34" charset="-120"/>
+                <a:ea typeface="Microsoft JhengHei UI" panose="020B0604030504040204" pitchFamily="34" charset="-120"/>
+                <a:cs typeface="Times New Roman" panose="02020603050405020304" pitchFamily="18" charset="0"/>
+              </a:rPr>
+              <a:t>(https</a:t>
+            </a:r>
+            <a:r>
+              <a:rPr lang="en-US" altLang="zh-TW" sz="1600" kern="100" dirty="0">
+                <a:latin typeface="Microsoft JhengHei UI" panose="020B0604030504040204" pitchFamily="34" charset="-120"/>
+                <a:ea typeface="Microsoft JhengHei UI" panose="020B0604030504040204" pitchFamily="34" charset="-120"/>
+                <a:cs typeface="Times New Roman" panose="02020603050405020304" pitchFamily="18" charset="0"/>
+              </a:rPr>
+              <a:t>://</a:t>
+            </a:r>
+            <a:r>
+              <a:rPr lang="en-US" altLang="zh-TW" sz="1600" kern="100" dirty="0" smtClean="0">
+                <a:latin typeface="Microsoft JhengHei UI" panose="020B0604030504040204" pitchFamily="34" charset="-120"/>
+                <a:ea typeface="Microsoft JhengHei UI" panose="020B0604030504040204" pitchFamily="34" charset="-120"/>
+                <a:cs typeface="Times New Roman" panose="02020603050405020304" pitchFamily="18" charset="0"/>
+              </a:rPr>
+              <a:t>blog.csdn.net/weixin_38819889/article/details/105389248)</a:t>
+            </a:r>
+          </a:p>
+          <a:p>
+            <a:pPr>
+              <a:lnSpc>
+                <a:spcPct val="150000"/>
+              </a:lnSpc>
+            </a:pPr>
+            <a:r>
+              <a:rPr lang="en-US" altLang="zh-TW" sz="1600" kern="100" dirty="0" smtClean="0">
+                <a:latin typeface="Microsoft JhengHei UI" panose="020B0604030504040204" pitchFamily="34" charset="-120"/>
+                <a:ea typeface="Microsoft JhengHei UI" panose="020B0604030504040204" pitchFamily="34" charset="-120"/>
+                <a:cs typeface="Times New Roman" panose="02020603050405020304" pitchFamily="18" charset="0"/>
+              </a:rPr>
+              <a:t>[2]</a:t>
+            </a:r>
+            <a:r>
+              <a:rPr lang="en-US" altLang="zh-TW" sz="1600" dirty="0" smtClean="0">
+                <a:latin typeface="Microsoft JhengHei UI" panose="020B0604030504040204" pitchFamily="34" charset="-120"/>
+                <a:ea typeface="Microsoft JhengHei UI" panose="020B0604030504040204" pitchFamily="34" charset="-120"/>
+              </a:rPr>
+              <a:t>Python</a:t>
+            </a:r>
+            <a:r>
+              <a:rPr lang="zh-TW" altLang="en-US" sz="1600" dirty="0">
+                <a:latin typeface="Microsoft JhengHei UI" panose="020B0604030504040204" pitchFamily="34" charset="-120"/>
+                <a:ea typeface="Microsoft JhengHei UI" panose="020B0604030504040204" pitchFamily="34" charset="-120"/>
+              </a:rPr>
+              <a:t>處理中文標點符號大</a:t>
+            </a:r>
+            <a:r>
+              <a:rPr lang="zh-TW" altLang="en-US" sz="1600" dirty="0" smtClean="0">
+                <a:latin typeface="Microsoft JhengHei UI" panose="020B0604030504040204" pitchFamily="34" charset="-120"/>
+                <a:ea typeface="Microsoft JhengHei UI" panose="020B0604030504040204" pitchFamily="34" charset="-120"/>
+              </a:rPr>
+              <a:t>集合</a:t>
+            </a:r>
+            <a:r>
+              <a:rPr lang="en-US" altLang="zh-TW" sz="1600" dirty="0" smtClean="0">
+                <a:latin typeface="Microsoft JhengHei UI" panose="020B0604030504040204" pitchFamily="34" charset="-120"/>
+                <a:ea typeface="Microsoft JhengHei UI" panose="020B0604030504040204" pitchFamily="34" charset="-120"/>
+              </a:rPr>
+              <a:t>(</a:t>
+            </a:r>
+            <a:r>
+              <a:rPr lang="en-US" altLang="zh-TW" sz="1600" dirty="0">
+                <a:latin typeface="Microsoft JhengHei UI" panose="020B0604030504040204" pitchFamily="34" charset="-120"/>
+                <a:ea typeface="Microsoft JhengHei UI" panose="020B0604030504040204" pitchFamily="34" charset="-120"/>
+              </a:rPr>
+              <a:t>https://codertw.com/%E7%A8%8B%E5%BC%8F%E8%AA%9E%E8%A8%80/356827/)</a:t>
+            </a:r>
+            <a:endParaRPr lang="zh-TW" altLang="en-US" sz="1600" dirty="0">
+              <a:latin typeface="Microsoft JhengHei UI" panose="020B0604030504040204" pitchFamily="34" charset="-120"/>
+              <a:ea typeface="Microsoft JhengHei UI" panose="020B0604030504040204" pitchFamily="34" charset="-120"/>
+            </a:endParaRPr>
+          </a:p>
+          <a:p>
+            <a:pPr>
+              <a:lnSpc>
+                <a:spcPct val="150000"/>
+              </a:lnSpc>
+            </a:pPr>
+            <a:r>
+              <a:rPr lang="en-US" altLang="zh-TW" sz="1600" kern="100" dirty="0" smtClean="0">
+                <a:latin typeface="Microsoft JhengHei UI" panose="020B0604030504040204" pitchFamily="34" charset="-120"/>
+                <a:ea typeface="Microsoft JhengHei UI" panose="020B0604030504040204" pitchFamily="34" charset="-120"/>
+                <a:cs typeface="Times New Roman" panose="02020603050405020304" pitchFamily="18" charset="0"/>
+              </a:rPr>
+              <a:t>[3]</a:t>
+            </a:r>
+            <a:r>
+              <a:rPr lang="zh-TW" altLang="en-US" sz="1600" dirty="0">
+                <a:latin typeface="Microsoft JhengHei UI" panose="020B0604030504040204" pitchFamily="34" charset="-120"/>
+                <a:ea typeface="Microsoft JhengHei UI" panose="020B0604030504040204" pitchFamily="34" charset="-120"/>
+              </a:rPr>
+              <a:t>英文自然語言處理的經典工具 </a:t>
+            </a:r>
+            <a:r>
+              <a:rPr lang="en-US" altLang="zh-TW" sz="1600" dirty="0" smtClean="0">
+                <a:latin typeface="Microsoft JhengHei UI" panose="020B0604030504040204" pitchFamily="34" charset="-120"/>
+                <a:ea typeface="Microsoft JhengHei UI" panose="020B0604030504040204" pitchFamily="34" charset="-120"/>
+              </a:rPr>
+              <a:t>NLTK</a:t>
+            </a:r>
+            <a:r>
+              <a:rPr lang="en-US" altLang="zh-TW" sz="1600" kern="100" dirty="0">
+                <a:latin typeface="Microsoft JhengHei UI" panose="020B0604030504040204" pitchFamily="34" charset="-120"/>
+                <a:ea typeface="Microsoft JhengHei UI" panose="020B0604030504040204" pitchFamily="34" charset="-120"/>
+                <a:cs typeface="Times New Roman" panose="02020603050405020304" pitchFamily="18" charset="0"/>
+              </a:rPr>
+              <a:t>(https://clay-atlas.com/blog/2019/07/30/nlp-python-cn-nltk-kit</a:t>
+            </a:r>
+            <a:r>
+              <a:rPr lang="en-US" altLang="zh-TW" sz="1600" kern="100" dirty="0" smtClean="0">
+                <a:latin typeface="Microsoft JhengHei UI" panose="020B0604030504040204" pitchFamily="34" charset="-120"/>
+                <a:ea typeface="Microsoft JhengHei UI" panose="020B0604030504040204" pitchFamily="34" charset="-120"/>
+                <a:cs typeface="Times New Roman" panose="02020603050405020304" pitchFamily="18" charset="0"/>
+              </a:rPr>
+              <a:t>/)</a:t>
+            </a:r>
+          </a:p>
+          <a:p>
+            <a:pPr>
+              <a:lnSpc>
+                <a:spcPct val="150000"/>
+              </a:lnSpc>
+            </a:pPr>
+            <a:r>
+              <a:rPr lang="en-US" altLang="zh-TW" sz="1600" kern="100" dirty="0" smtClean="0">
+                <a:latin typeface="Microsoft JhengHei UI" panose="020B0604030504040204" pitchFamily="34" charset="-120"/>
+                <a:ea typeface="Microsoft JhengHei UI" panose="020B0604030504040204" pitchFamily="34" charset="-120"/>
+                <a:cs typeface="Times New Roman" panose="02020603050405020304" pitchFamily="18" charset="0"/>
+              </a:rPr>
+              <a:t>[4]</a:t>
+            </a:r>
+            <a:r>
+              <a:rPr lang="en-US" altLang="zh-TW" sz="1600" dirty="0">
+                <a:latin typeface="Microsoft JhengHei UI" panose="020B0604030504040204" pitchFamily="34" charset="-120"/>
+                <a:ea typeface="Microsoft JhengHei UI" panose="020B0604030504040204" pitchFamily="34" charset="-120"/>
+              </a:rPr>
+              <a:t> Word2Vec</a:t>
+            </a:r>
+            <a:r>
+              <a:rPr lang="zh-TW" altLang="en-US" sz="1600" dirty="0">
+                <a:latin typeface="Microsoft JhengHei UI" panose="020B0604030504040204" pitchFamily="34" charset="-120"/>
+                <a:ea typeface="Microsoft JhengHei UI" panose="020B0604030504040204" pitchFamily="34" charset="-120"/>
+              </a:rPr>
+              <a:t>的参数解</a:t>
+            </a:r>
+            <a:r>
+              <a:rPr lang="zh-TW" altLang="en-US" sz="1600" dirty="0" smtClean="0">
+                <a:latin typeface="Microsoft JhengHei UI" panose="020B0604030504040204" pitchFamily="34" charset="-120"/>
+                <a:ea typeface="Microsoft JhengHei UI" panose="020B0604030504040204" pitchFamily="34" charset="-120"/>
+              </a:rPr>
+              <a:t>释</a:t>
+            </a:r>
+            <a:r>
+              <a:rPr lang="en-US" altLang="zh-TW" sz="1600" dirty="0">
+                <a:latin typeface="Microsoft JhengHei UI" panose="020B0604030504040204" pitchFamily="34" charset="-120"/>
+                <a:ea typeface="Microsoft JhengHei UI" panose="020B0604030504040204" pitchFamily="34" charset="-120"/>
+              </a:rPr>
+              <a:t>(https://blog.csdn.net/laobai1015/article/details/86540813</a:t>
+            </a:r>
+            <a:r>
+              <a:rPr lang="en-US" altLang="zh-TW" sz="1600" dirty="0" smtClean="0">
+                <a:latin typeface="Microsoft JhengHei UI" panose="020B0604030504040204" pitchFamily="34" charset="-120"/>
+                <a:ea typeface="Microsoft JhengHei UI" panose="020B0604030504040204" pitchFamily="34" charset="-120"/>
+              </a:rPr>
+              <a:t>)</a:t>
+            </a:r>
+          </a:p>
+          <a:p>
+            <a:pPr>
+              <a:lnSpc>
+                <a:spcPct val="150000"/>
+              </a:lnSpc>
+            </a:pPr>
+            <a:r>
+              <a:rPr lang="en-US" altLang="zh-TW" sz="1600" dirty="0" smtClean="0">
+                <a:latin typeface="Microsoft JhengHei UI" panose="020B0604030504040204" pitchFamily="34" charset="-120"/>
+                <a:ea typeface="Microsoft JhengHei UI" panose="020B0604030504040204" pitchFamily="34" charset="-120"/>
+              </a:rPr>
+              <a:t>[5]</a:t>
+            </a:r>
+            <a:r>
+              <a:rPr lang="en-US" altLang="zh-TW" sz="1600" dirty="0">
+                <a:latin typeface="Microsoft JhengHei UI" panose="020B0604030504040204" pitchFamily="34" charset="-120"/>
+                <a:ea typeface="Microsoft JhengHei UI" panose="020B0604030504040204" pitchFamily="34" charset="-120"/>
+              </a:rPr>
+              <a:t> NLP</a:t>
+            </a:r>
+            <a:r>
+              <a:rPr lang="zh-TW" altLang="en-US" sz="1600" dirty="0">
+                <a:latin typeface="Microsoft JhengHei UI" panose="020B0604030504040204" pitchFamily="34" charset="-120"/>
+                <a:ea typeface="Microsoft JhengHei UI" panose="020B0604030504040204" pitchFamily="34" charset="-120"/>
+              </a:rPr>
+              <a:t>入门（三）词形还原（</a:t>
+            </a:r>
+            <a:r>
+              <a:rPr lang="en-US" altLang="zh-TW" sz="1600" dirty="0">
+                <a:latin typeface="Microsoft JhengHei UI" panose="020B0604030504040204" pitchFamily="34" charset="-120"/>
+                <a:ea typeface="Microsoft JhengHei UI" panose="020B0604030504040204" pitchFamily="34" charset="-120"/>
+              </a:rPr>
+              <a:t>Lemmatization</a:t>
+            </a:r>
+            <a:r>
+              <a:rPr lang="zh-TW" altLang="en-US" sz="1600" dirty="0" smtClean="0">
+                <a:latin typeface="Microsoft JhengHei UI" panose="020B0604030504040204" pitchFamily="34" charset="-120"/>
+                <a:ea typeface="Microsoft JhengHei UI" panose="020B0604030504040204" pitchFamily="34" charset="-120"/>
+              </a:rPr>
+              <a:t>）</a:t>
+            </a:r>
+            <a:r>
+              <a:rPr lang="en-US" altLang="zh-TW" sz="1600" dirty="0">
+                <a:latin typeface="Microsoft JhengHei UI" panose="020B0604030504040204" pitchFamily="34" charset="-120"/>
+                <a:ea typeface="Microsoft JhengHei UI" panose="020B0604030504040204" pitchFamily="34" charset="-120"/>
+              </a:rPr>
+              <a:t>(https://www.cnblogs.com/jclian91/p/9898511.html)</a:t>
+            </a:r>
+            <a:endParaRPr lang="zh-TW" altLang="en-US" sz="1600" dirty="0">
+              <a:latin typeface="Microsoft JhengHei UI" panose="020B0604030504040204" pitchFamily="34" charset="-120"/>
+              <a:ea typeface="Microsoft JhengHei UI" panose="020B0604030504040204" pitchFamily="34" charset="-120"/>
+            </a:endParaRPr>
+          </a:p>
+          <a:p>
+            <a:pPr>
+              <a:lnSpc>
+                <a:spcPct val="150000"/>
+              </a:lnSpc>
+            </a:pPr>
+            <a:r>
+              <a:rPr lang="en-US" altLang="zh-TW" sz="1600" dirty="0" smtClean="0">
+                <a:latin typeface="Microsoft JhengHei UI" panose="020B0604030504040204" pitchFamily="34" charset="-120"/>
+                <a:ea typeface="Microsoft JhengHei UI" panose="020B0604030504040204" pitchFamily="34" charset="-120"/>
+              </a:rPr>
+              <a:t>[6]</a:t>
+            </a:r>
+            <a:r>
+              <a:rPr lang="zh-TW" altLang="en-US" sz="1600" dirty="0">
+                <a:latin typeface="Microsoft JhengHei UI" panose="020B0604030504040204" pitchFamily="34" charset="-120"/>
+                <a:ea typeface="Microsoft JhengHei UI" panose="020B0604030504040204" pitchFamily="34" charset="-120"/>
+              </a:rPr>
+              <a:t> </a:t>
+            </a:r>
+            <a:r>
+              <a:rPr lang="en-US" altLang="zh-TW" sz="1600" dirty="0">
+                <a:latin typeface="Microsoft JhengHei UI" panose="020B0604030504040204" pitchFamily="34" charset="-120"/>
+                <a:ea typeface="Microsoft JhengHei UI" panose="020B0604030504040204" pitchFamily="34" charset="-120"/>
+              </a:rPr>
+              <a:t>Word2Vec</a:t>
+            </a:r>
+            <a:r>
+              <a:rPr lang="zh-TW" altLang="en-US" sz="1600" dirty="0">
+                <a:latin typeface="Microsoft JhengHei UI" panose="020B0604030504040204" pitchFamily="34" charset="-120"/>
+                <a:ea typeface="Microsoft JhengHei UI" panose="020B0604030504040204" pitchFamily="34" charset="-120"/>
+              </a:rPr>
+              <a:t>的簡易教學與參數調整</a:t>
+            </a:r>
+            <a:r>
+              <a:rPr lang="zh-TW" altLang="en-US" sz="1600" dirty="0" smtClean="0">
+                <a:latin typeface="Microsoft JhengHei UI" panose="020B0604030504040204" pitchFamily="34" charset="-120"/>
+                <a:ea typeface="Microsoft JhengHei UI" panose="020B0604030504040204" pitchFamily="34" charset="-120"/>
+              </a:rPr>
+              <a:t>指南</a:t>
+            </a:r>
+            <a:r>
+              <a:rPr lang="en-US" altLang="zh-TW" sz="1600" dirty="0">
+                <a:latin typeface="Microsoft JhengHei UI" panose="020B0604030504040204" pitchFamily="34" charset="-120"/>
+                <a:ea typeface="Microsoft JhengHei UI" panose="020B0604030504040204" pitchFamily="34" charset="-120"/>
+              </a:rPr>
+              <a:t>(https://www.kaggle.com/jerrykuo7727/word2vec</a:t>
+            </a:r>
+            <a:r>
+              <a:rPr lang="en-US" altLang="zh-TW" sz="1600" dirty="0" smtClean="0">
+                <a:latin typeface="Microsoft JhengHei UI" panose="020B0604030504040204" pitchFamily="34" charset="-120"/>
+                <a:ea typeface="Microsoft JhengHei UI" panose="020B0604030504040204" pitchFamily="34" charset="-120"/>
+              </a:rPr>
+              <a:t>)</a:t>
+            </a:r>
+          </a:p>
+          <a:p>
+            <a:pPr>
+              <a:lnSpc>
+                <a:spcPct val="150000"/>
+              </a:lnSpc>
+            </a:pPr>
+            <a:r>
+              <a:rPr lang="en-US" altLang="zh-TW" sz="1600" dirty="0" smtClean="0">
+                <a:latin typeface="Microsoft JhengHei UI" panose="020B0604030504040204" pitchFamily="34" charset="-120"/>
+                <a:ea typeface="Microsoft JhengHei UI" panose="020B0604030504040204" pitchFamily="34" charset="-120"/>
+              </a:rPr>
+              <a:t>[7]</a:t>
+            </a:r>
+            <a:r>
+              <a:rPr lang="zh-TW" altLang="en-US" sz="1600" dirty="0">
+                <a:latin typeface="Microsoft JhengHei UI" panose="020B0604030504040204" pitchFamily="34" charset="-120"/>
+                <a:ea typeface="Microsoft JhengHei UI" panose="020B0604030504040204" pitchFamily="34" charset="-120"/>
+              </a:rPr>
+              <a:t>新手村逃脫！初心者的 </a:t>
+            </a:r>
+            <a:r>
+              <a:rPr lang="en-US" altLang="zh-TW" sz="1600" dirty="0">
+                <a:latin typeface="Microsoft JhengHei UI" panose="020B0604030504040204" pitchFamily="34" charset="-120"/>
+                <a:ea typeface="Microsoft JhengHei UI" panose="020B0604030504040204" pitchFamily="34" charset="-120"/>
+              </a:rPr>
+              <a:t>Python </a:t>
+            </a:r>
+            <a:r>
+              <a:rPr lang="zh-TW" altLang="en-US" sz="1600" dirty="0">
+                <a:latin typeface="Microsoft JhengHei UI" panose="020B0604030504040204" pitchFamily="34" charset="-120"/>
+                <a:ea typeface="Microsoft JhengHei UI" panose="020B0604030504040204" pitchFamily="34" charset="-120"/>
+              </a:rPr>
+              <a:t>機器學習攻略 </a:t>
+            </a:r>
+            <a:r>
+              <a:rPr lang="en-US" altLang="zh-TW" sz="1600" dirty="0">
+                <a:latin typeface="Microsoft JhengHei UI" panose="020B0604030504040204" pitchFamily="34" charset="-120"/>
+                <a:ea typeface="Microsoft JhengHei UI" panose="020B0604030504040204" pitchFamily="34" charset="-120"/>
+              </a:rPr>
+              <a:t>1.0.0 </a:t>
+            </a:r>
+            <a:r>
+              <a:rPr lang="en-US" altLang="zh-TW" sz="1600" dirty="0" smtClean="0">
+                <a:latin typeface="Microsoft JhengHei UI" panose="020B0604030504040204" pitchFamily="34" charset="-120"/>
+                <a:ea typeface="Microsoft JhengHei UI" panose="020B0604030504040204" pitchFamily="34" charset="-120"/>
+              </a:rPr>
+              <a:t>documentation</a:t>
+            </a:r>
+            <a:r>
+              <a:rPr lang="en-US" altLang="zh-TW" sz="1600" dirty="0">
+                <a:latin typeface="Microsoft JhengHei UI" panose="020B0604030504040204" pitchFamily="34" charset="-120"/>
+                <a:ea typeface="Microsoft JhengHei UI" panose="020B0604030504040204" pitchFamily="34" charset="-120"/>
+              </a:rPr>
+              <a:t>(https://yaojenkuo.io/ml-newbies/07-performance.html</a:t>
+            </a:r>
+            <a:r>
+              <a:rPr lang="en-US" altLang="zh-TW" sz="1600" dirty="0" smtClean="0">
+                <a:latin typeface="Microsoft JhengHei UI" panose="020B0604030504040204" pitchFamily="34" charset="-120"/>
+                <a:ea typeface="Microsoft JhengHei UI" panose="020B0604030504040204" pitchFamily="34" charset="-120"/>
+              </a:rPr>
+              <a:t>)</a:t>
+            </a:r>
+          </a:p>
+          <a:p>
+            <a:pPr>
+              <a:lnSpc>
+                <a:spcPct val="150000"/>
+              </a:lnSpc>
+            </a:pPr>
+            <a:r>
+              <a:rPr lang="en-US" altLang="zh-TW" sz="1600" dirty="0" smtClean="0">
+                <a:latin typeface="Microsoft JhengHei UI" panose="020B0604030504040204" pitchFamily="34" charset="-120"/>
+                <a:ea typeface="Microsoft JhengHei UI" panose="020B0604030504040204" pitchFamily="34" charset="-120"/>
+              </a:rPr>
+              <a:t>[8]</a:t>
+            </a:r>
+            <a:r>
+              <a:rPr lang="en-US" altLang="zh-TW" sz="1600" dirty="0">
+                <a:latin typeface="Microsoft JhengHei UI" panose="020B0604030504040204" pitchFamily="34" charset="-120"/>
+                <a:ea typeface="Microsoft JhengHei UI" panose="020B0604030504040204" pitchFamily="34" charset="-120"/>
+              </a:rPr>
+              <a:t> Word2vec from scratch (Skip-gram &amp; CBOW)(https://medium.com/@pocheng0118/word2vec-from-scratch-skip-gram-cbow-98fd17385945)</a:t>
+            </a:r>
+            <a:endParaRPr lang="en-US" altLang="zh-TW" sz="1600" dirty="0" smtClean="0">
+              <a:latin typeface="Microsoft JhengHei UI" panose="020B0604030504040204" pitchFamily="34" charset="-120"/>
+              <a:ea typeface="Microsoft JhengHei UI" panose="020B0604030504040204" pitchFamily="34" charset="-120"/>
+            </a:endParaRPr>
+          </a:p>
+          <a:p>
+            <a:pPr>
+              <a:lnSpc>
+                <a:spcPct val="150000"/>
+              </a:lnSpc>
+            </a:pPr>
+            <a:endParaRPr lang="en-US" altLang="zh-TW" sz="1600" dirty="0" smtClean="0">
+              <a:latin typeface="Microsoft JhengHei UI" panose="020B0604030504040204" pitchFamily="34" charset="-120"/>
+              <a:ea typeface="Microsoft JhengHei UI" panose="020B0604030504040204" pitchFamily="34" charset="-120"/>
+            </a:endParaRPr>
+          </a:p>
+          <a:p>
+            <a:pPr>
+              <a:lnSpc>
+                <a:spcPct val="150000"/>
+              </a:lnSpc>
+            </a:pPr>
+            <a:endParaRPr lang="en-US" altLang="zh-TW" sz="1600" dirty="0">
+              <a:latin typeface="Microsoft JhengHei UI" panose="020B0604030504040204" pitchFamily="34" charset="-120"/>
+              <a:ea typeface="Microsoft JhengHei UI" panose="020B0604030504040204" pitchFamily="34" charset="-120"/>
+            </a:endParaRPr>
+          </a:p>
+        </p:txBody>
+      </p:sp>
+    </p:spTree>
+    <p:extLst>
+      <p:ext uri="{BB962C8B-B14F-4D97-AF65-F5344CB8AC3E}">
+        <p14:creationId xmlns:p14="http://schemas.microsoft.com/office/powerpoint/2010/main" val="530469330"/>
+      </p:ext>
+    </p:extLst>
+  </p:cSld>
+  <p:clrMapOvr>
+    <a:masterClrMapping/>
+  </p:clrMapOvr>
+</p:sld>
+</file>
+
+<file path=ppt/slides/slide21.xml><?xml version="1.0" encoding="utf-8"?>
+<p:sld xmlns:a="http://schemas.openxmlformats.org/drawingml/2006/main" xmlns:r="http://schemas.openxmlformats.org/officeDocument/2006/relationships" xmlns:p="http://schemas.openxmlformats.org/presentationml/2006/main">
+  <p:cSld>
+    <p:spTree>
+      <p:nvGrpSpPr>
+        <p:cNvPr id="1" name=""/>
+        <p:cNvGrpSpPr/>
+        <p:nvPr/>
+      </p:nvGrpSpPr>
+      <p:grpSpPr>
+        <a:xfrm>
+          <a:off x="0" y="0"/>
+          <a:ext cx="0" cy="0"/>
+          <a:chOff x="0" y="0"/>
+          <a:chExt cx="0" cy="0"/>
+        </a:xfrm>
+      </p:grpSpPr>
+      <p:sp>
+        <p:nvSpPr>
+          <p:cNvPr id="2" name="標題 1">
+            <a:extLst>
+              <a:ext uri="{FF2B5EF4-FFF2-40B4-BE49-F238E27FC236}">
+                <a16:creationId xmlns:a16="http://schemas.microsoft.com/office/drawing/2014/main" id="{A0150EC9-7E7D-4648-AC38-2A7BCBFB2EF6}"/>
+              </a:ext>
+            </a:extLst>
+          </p:cNvPr>
+          <p:cNvSpPr>
+            <a:spLocks noGrp="1"/>
+          </p:cNvSpPr>
+          <p:nvPr>
+            <p:ph type="title"/>
+          </p:nvPr>
+        </p:nvSpPr>
+        <p:spPr>
+          <a:xfrm>
+            <a:off x="581192" y="702156"/>
+            <a:ext cx="11029616" cy="1013800"/>
+          </a:xfrm>
+        </p:spPr>
+        <p:txBody>
+          <a:bodyPr rtlCol="0">
+            <a:normAutofit/>
+          </a:bodyPr>
+          <a:lstStyle/>
+          <a:p>
+            <a:r>
+              <a:rPr lang="en-US" altLang="zh-TW" dirty="0" smtClean="0"/>
+              <a:t>reference</a:t>
+            </a:r>
+            <a:endParaRPr lang="en-US" altLang="zh-TW" dirty="0"/>
+          </a:p>
+        </p:txBody>
+      </p:sp>
+      <p:sp>
+        <p:nvSpPr>
+          <p:cNvPr id="4" name="矩形 3"/>
+          <p:cNvSpPr/>
+          <p:nvPr/>
+        </p:nvSpPr>
+        <p:spPr>
+          <a:xfrm>
+            <a:off x="120659" y="2032728"/>
+            <a:ext cx="3673059" cy="1177036"/>
+          </a:xfrm>
+          <a:prstGeom prst="rect">
+            <a:avLst/>
+          </a:prstGeom>
+        </p:spPr>
+        <p:style>
+          <a:lnRef idx="0">
+            <a:schemeClr val="dk1">
+              <a:alpha val="0"/>
+              <a:hueOff val="0"/>
+              <a:satOff val="0"/>
+              <a:lumOff val="0"/>
+              <a:alphaOff val="0"/>
+            </a:schemeClr>
+          </a:lnRef>
+          <a:fillRef idx="0">
+            <a:schemeClr val="lt1">
+              <a:alpha val="0"/>
+              <a:hueOff val="0"/>
+              <a:satOff val="0"/>
+              <a:lumOff val="0"/>
+              <a:alphaOff val="0"/>
+            </a:schemeClr>
+          </a:fillRef>
+          <a:effectRef idx="0">
+            <a:schemeClr val="lt1">
+              <a:alpha val="0"/>
+              <a:hueOff val="0"/>
+              <a:satOff val="0"/>
+              <a:lumOff val="0"/>
+              <a:alphaOff val="0"/>
+            </a:schemeClr>
+          </a:effectRef>
+          <a:fontRef idx="minor">
+            <a:schemeClr val="tx1">
+              <a:hueOff val="0"/>
+              <a:satOff val="0"/>
+              <a:lumOff val="0"/>
+              <a:alphaOff val="0"/>
+            </a:schemeClr>
+          </a:fontRef>
+        </p:style>
+      </p:sp>
+      <p:sp>
+        <p:nvSpPr>
+          <p:cNvPr id="13" name="矩形 12"/>
+          <p:cNvSpPr/>
+          <p:nvPr/>
+        </p:nvSpPr>
+        <p:spPr>
+          <a:xfrm>
+            <a:off x="449886" y="2094596"/>
+            <a:ext cx="11512129" cy="4154984"/>
+          </a:xfrm>
+          <a:prstGeom prst="rect">
+            <a:avLst/>
+          </a:prstGeom>
+        </p:spPr>
+        <p:txBody>
+          <a:bodyPr wrap="square">
+            <a:spAutoFit/>
+          </a:bodyPr>
+          <a:lstStyle/>
+          <a:p>
+            <a:pPr>
+              <a:lnSpc>
+                <a:spcPct val="150000"/>
+              </a:lnSpc>
+            </a:pPr>
+            <a:r>
+              <a:rPr lang="en-US" altLang="zh-TW" sz="1600" kern="100" dirty="0" smtClean="0">
+                <a:latin typeface="Microsoft JhengHei UI" panose="020B0604030504040204" pitchFamily="34" charset="-120"/>
+                <a:ea typeface="Microsoft JhengHei UI" panose="020B0604030504040204" pitchFamily="34" charset="-120"/>
+                <a:cs typeface="Times New Roman" panose="02020603050405020304" pitchFamily="18" charset="0"/>
+              </a:rPr>
+              <a:t>[</a:t>
+            </a:r>
+            <a:r>
+              <a:rPr lang="en-US" altLang="zh-TW" sz="1600" kern="100" dirty="0" smtClean="0">
+                <a:latin typeface="Microsoft JhengHei UI" panose="020B0604030504040204" pitchFamily="34" charset="-120"/>
+                <a:ea typeface="Microsoft JhengHei UI" panose="020B0604030504040204" pitchFamily="34" charset="-120"/>
+                <a:cs typeface="Times New Roman" panose="02020603050405020304" pitchFamily="18" charset="0"/>
+              </a:rPr>
+              <a:t>9</a:t>
+            </a:r>
+            <a:r>
+              <a:rPr lang="en-US" altLang="zh-TW" sz="1600" kern="100" dirty="0">
+                <a:latin typeface="Microsoft JhengHei UI" panose="020B0604030504040204" pitchFamily="34" charset="-120"/>
+                <a:ea typeface="Microsoft JhengHei UI" panose="020B0604030504040204" pitchFamily="34" charset="-120"/>
+                <a:cs typeface="Times New Roman" panose="02020603050405020304" pitchFamily="18" charset="0"/>
+              </a:rPr>
+              <a:t>] ML</a:t>
+            </a:r>
+            <a:r>
+              <a:rPr lang="zh-TW" altLang="en-US" sz="1600" kern="100" dirty="0">
+                <a:latin typeface="Microsoft JhengHei UI" panose="020B0604030504040204" pitchFamily="34" charset="-120"/>
+                <a:ea typeface="Microsoft JhengHei UI" panose="020B0604030504040204" pitchFamily="34" charset="-120"/>
+                <a:cs typeface="Times New Roman" panose="02020603050405020304" pitchFamily="18" charset="0"/>
+              </a:rPr>
+              <a:t>入門（十七）隨機森林</a:t>
+            </a:r>
+            <a:r>
+              <a:rPr lang="en-US" altLang="zh-TW" sz="1600" kern="100" dirty="0">
+                <a:latin typeface="Microsoft JhengHei UI" panose="020B0604030504040204" pitchFamily="34" charset="-120"/>
+                <a:ea typeface="Microsoft JhengHei UI" panose="020B0604030504040204" pitchFamily="34" charset="-120"/>
+                <a:cs typeface="Times New Roman" panose="02020603050405020304" pitchFamily="18" charset="0"/>
+              </a:rPr>
+              <a:t>(Random Forest)</a:t>
+            </a:r>
+            <a:r>
+              <a:rPr lang="en-US" altLang="zh-CN" sz="1600" dirty="0" smtClean="0">
+                <a:latin typeface="Microsoft JhengHei UI" panose="020B0604030504040204" pitchFamily="34" charset="-120"/>
+                <a:ea typeface="Microsoft JhengHei UI" panose="020B0604030504040204" pitchFamily="34" charset="-120"/>
+              </a:rPr>
+              <a:t> </a:t>
+            </a:r>
+            <a:r>
+              <a:rPr lang="en-US" altLang="zh-TW" sz="1600" kern="100" dirty="0">
+                <a:latin typeface="Microsoft JhengHei UI" panose="020B0604030504040204" pitchFamily="34" charset="-120"/>
+                <a:ea typeface="Microsoft JhengHei UI" panose="020B0604030504040204" pitchFamily="34" charset="-120"/>
+                <a:cs typeface="Times New Roman" panose="02020603050405020304" pitchFamily="18" charset="0"/>
+              </a:rPr>
+              <a:t>(https://medium.com/chung-yi/ml%E5%85%A5%E9%96%80-%E5%8D%81%E4%B8%83-%E9%9A%A8%E6%A9%9F%E6%A3%AE%E6%9E%97-random-forest-6afc24871857)</a:t>
+            </a:r>
+            <a:endParaRPr lang="en-US" altLang="zh-TW" sz="1600" kern="100" dirty="0" smtClean="0">
+              <a:latin typeface="Microsoft JhengHei UI" panose="020B0604030504040204" pitchFamily="34" charset="-120"/>
+              <a:ea typeface="Microsoft JhengHei UI" panose="020B0604030504040204" pitchFamily="34" charset="-120"/>
+              <a:cs typeface="Times New Roman" panose="02020603050405020304" pitchFamily="18" charset="0"/>
+            </a:endParaRPr>
+          </a:p>
+          <a:p>
+            <a:pPr>
+              <a:lnSpc>
+                <a:spcPct val="150000"/>
+              </a:lnSpc>
+            </a:pPr>
+            <a:r>
+              <a:rPr lang="en-US" altLang="zh-TW" sz="1600" kern="100" dirty="0">
+                <a:latin typeface="Microsoft JhengHei UI" panose="020B0604030504040204" pitchFamily="34" charset="-120"/>
+                <a:ea typeface="Microsoft JhengHei UI" panose="020B0604030504040204" pitchFamily="34" charset="-120"/>
+                <a:cs typeface="Times New Roman" panose="02020603050405020304" pitchFamily="18" charset="0"/>
+              </a:rPr>
+              <a:t>[10] </a:t>
+            </a:r>
+            <a:r>
+              <a:rPr lang="en-US" altLang="zh-TW" sz="1600" kern="100" dirty="0" err="1">
+                <a:latin typeface="Microsoft JhengHei UI" panose="020B0604030504040204" pitchFamily="34" charset="-120"/>
+                <a:ea typeface="Microsoft JhengHei UI" panose="020B0604030504040204" pitchFamily="34" charset="-120"/>
+                <a:cs typeface="Times New Roman" panose="02020603050405020304" pitchFamily="18" charset="0"/>
+              </a:rPr>
+              <a:t>scikit</a:t>
+            </a:r>
+            <a:r>
+              <a:rPr lang="en-US" altLang="zh-TW" sz="1600" kern="100" dirty="0">
+                <a:latin typeface="Microsoft JhengHei UI" panose="020B0604030504040204" pitchFamily="34" charset="-120"/>
+                <a:ea typeface="Microsoft JhengHei UI" panose="020B0604030504040204" pitchFamily="34" charset="-120"/>
+                <a:cs typeface="Times New Roman" panose="02020603050405020304" pitchFamily="18" charset="0"/>
+              </a:rPr>
+              <a:t>-learn Machine Learning in Python</a:t>
+            </a:r>
+            <a:r>
+              <a:rPr lang="en-US" altLang="zh-TW" sz="1600" dirty="0">
+                <a:latin typeface="Microsoft JhengHei UI" panose="020B0604030504040204" pitchFamily="34" charset="-120"/>
+                <a:ea typeface="Microsoft JhengHei UI" panose="020B0604030504040204" pitchFamily="34" charset="-120"/>
+              </a:rPr>
+              <a:t> (https://scikit-learn.org/stable/index.html)</a:t>
+            </a:r>
+            <a:endParaRPr lang="zh-TW" altLang="en-US" sz="1600" dirty="0">
+              <a:latin typeface="Microsoft JhengHei UI" panose="020B0604030504040204" pitchFamily="34" charset="-120"/>
+              <a:ea typeface="Microsoft JhengHei UI" panose="020B0604030504040204" pitchFamily="34" charset="-120"/>
+            </a:endParaRPr>
+          </a:p>
+          <a:p>
+            <a:pPr>
+              <a:lnSpc>
+                <a:spcPct val="150000"/>
+              </a:lnSpc>
+            </a:pPr>
+            <a:r>
+              <a:rPr lang="en-US" altLang="zh-TW" sz="1600" kern="100" dirty="0" smtClean="0">
+                <a:latin typeface="Microsoft JhengHei UI" panose="020B0604030504040204" pitchFamily="34" charset="-120"/>
+                <a:ea typeface="Microsoft JhengHei UI" panose="020B0604030504040204" pitchFamily="34" charset="-120"/>
+                <a:cs typeface="Times New Roman" panose="02020603050405020304" pitchFamily="18" charset="0"/>
+              </a:rPr>
+              <a:t>[</a:t>
+            </a:r>
+            <a:r>
+              <a:rPr lang="en-US" altLang="zh-TW" sz="1600" kern="100" dirty="0">
+                <a:latin typeface="Microsoft JhengHei UI" panose="020B0604030504040204" pitchFamily="34" charset="-120"/>
+                <a:ea typeface="Microsoft JhengHei UI" panose="020B0604030504040204" pitchFamily="34" charset="-120"/>
+                <a:cs typeface="Times New Roman" panose="02020603050405020304" pitchFamily="18" charset="0"/>
+              </a:rPr>
+              <a:t>11] Introduction to Random Forest in Machine Learning(https://www.section.io/engineering-education/introduction-to-random-forest-in-machine-learning/</a:t>
+            </a:r>
+            <a:r>
+              <a:rPr lang="en-US" altLang="zh-TW" sz="1600" kern="100" dirty="0" smtClean="0">
+                <a:latin typeface="Microsoft JhengHei UI" panose="020B0604030504040204" pitchFamily="34" charset="-120"/>
+                <a:ea typeface="Microsoft JhengHei UI" panose="020B0604030504040204" pitchFamily="34" charset="-120"/>
+                <a:cs typeface="Times New Roman" panose="02020603050405020304" pitchFamily="18" charset="0"/>
+              </a:rPr>
+              <a:t>)</a:t>
+            </a:r>
+            <a:endParaRPr lang="en-US" altLang="zh-TW" sz="1600" kern="100" dirty="0" smtClean="0">
+              <a:latin typeface="Microsoft JhengHei UI" panose="020B0604030504040204" pitchFamily="34" charset="-120"/>
+              <a:ea typeface="Microsoft JhengHei UI" panose="020B0604030504040204" pitchFamily="34" charset="-120"/>
+              <a:cs typeface="Times New Roman" panose="02020603050405020304" pitchFamily="18" charset="0"/>
+            </a:endParaRPr>
+          </a:p>
+          <a:p>
+            <a:pPr>
+              <a:lnSpc>
+                <a:spcPct val="150000"/>
+              </a:lnSpc>
+            </a:pPr>
+            <a:r>
+              <a:rPr lang="en-US" altLang="zh-TW" sz="1600" kern="100" dirty="0" smtClean="0">
+                <a:latin typeface="Microsoft JhengHei UI" panose="020B0604030504040204" pitchFamily="34" charset="-120"/>
+                <a:ea typeface="Microsoft JhengHei UI" panose="020B0604030504040204" pitchFamily="34" charset="-120"/>
+                <a:cs typeface="Times New Roman" panose="02020603050405020304" pitchFamily="18" charset="0"/>
+              </a:rPr>
+              <a:t>[12]</a:t>
+            </a:r>
+            <a:r>
+              <a:rPr lang="zh-TW" altLang="en-US" sz="1600" dirty="0">
+                <a:latin typeface="Microsoft JhengHei UI" panose="020B0604030504040204" pitchFamily="34" charset="-120"/>
+                <a:ea typeface="Microsoft JhengHei UI" panose="020B0604030504040204" pitchFamily="34" charset="-120"/>
+              </a:rPr>
+              <a:t>機器學習之</a:t>
+            </a:r>
+            <a:r>
+              <a:rPr lang="en-US" altLang="zh-TW" sz="1600" dirty="0" err="1">
+                <a:latin typeface="Microsoft JhengHei UI" panose="020B0604030504040204" pitchFamily="34" charset="-120"/>
+                <a:ea typeface="Microsoft JhengHei UI" panose="020B0604030504040204" pitchFamily="34" charset="-120"/>
+              </a:rPr>
+              <a:t>XGBoost</a:t>
+            </a:r>
+            <a:r>
+              <a:rPr lang="zh-TW" altLang="en-US" sz="1600" dirty="0">
+                <a:latin typeface="Microsoft JhengHei UI" panose="020B0604030504040204" pitchFamily="34" charset="-120"/>
+                <a:ea typeface="Microsoft JhengHei UI" panose="020B0604030504040204" pitchFamily="34" charset="-120"/>
+              </a:rPr>
+              <a:t>分類器</a:t>
+            </a:r>
+            <a:r>
+              <a:rPr lang="en-US" altLang="zh-TW" sz="1600" dirty="0" err="1">
+                <a:latin typeface="Microsoft JhengHei UI" panose="020B0604030504040204" pitchFamily="34" charset="-120"/>
+                <a:ea typeface="Microsoft JhengHei UI" panose="020B0604030504040204" pitchFamily="34" charset="-120"/>
+              </a:rPr>
+              <a:t>XGBClassifier</a:t>
+            </a:r>
+            <a:r>
+              <a:rPr lang="en-US" altLang="zh-TW" sz="1600" dirty="0">
+                <a:latin typeface="Microsoft JhengHei UI" panose="020B0604030504040204" pitchFamily="34" charset="-120"/>
+                <a:ea typeface="Microsoft JhengHei UI" panose="020B0604030504040204" pitchFamily="34" charset="-120"/>
+              </a:rPr>
+              <a:t>-- </a:t>
+            </a:r>
+            <a:r>
+              <a:rPr lang="en-US" altLang="zh-TW" sz="1600" dirty="0" err="1">
+                <a:latin typeface="Microsoft JhengHei UI" panose="020B0604030504040204" pitchFamily="34" charset="-120"/>
+                <a:ea typeface="Microsoft JhengHei UI" panose="020B0604030504040204" pitchFamily="34" charset="-120"/>
+              </a:rPr>
+              <a:t>xgb</a:t>
+            </a:r>
+            <a:r>
+              <a:rPr lang="zh-TW" altLang="en-US" sz="1600" dirty="0">
+                <a:latin typeface="Microsoft JhengHei UI" panose="020B0604030504040204" pitchFamily="34" charset="-120"/>
+                <a:ea typeface="Microsoft JhengHei UI" panose="020B0604030504040204" pitchFamily="34" charset="-120"/>
+              </a:rPr>
+              <a:t>使用</a:t>
+            </a:r>
+            <a:r>
+              <a:rPr lang="en-US" altLang="zh-TW" sz="1600" dirty="0" err="1">
+                <a:latin typeface="Microsoft JhengHei UI" panose="020B0604030504040204" pitchFamily="34" charset="-120"/>
+                <a:ea typeface="Microsoft JhengHei UI" panose="020B0604030504040204" pitchFamily="34" charset="-120"/>
+              </a:rPr>
+              <a:t>sklearn</a:t>
+            </a:r>
+            <a:r>
+              <a:rPr lang="zh-TW" altLang="en-US" sz="1600" dirty="0">
+                <a:latin typeface="Microsoft JhengHei UI" panose="020B0604030504040204" pitchFamily="34" charset="-120"/>
+                <a:ea typeface="Microsoft JhengHei UI" panose="020B0604030504040204" pitchFamily="34" charset="-120"/>
+              </a:rPr>
+              <a:t>介面</a:t>
+            </a:r>
+            <a:r>
+              <a:rPr lang="en-US" altLang="zh-TW" sz="1600" dirty="0">
+                <a:latin typeface="Microsoft JhengHei UI" panose="020B0604030504040204" pitchFamily="34" charset="-120"/>
+                <a:ea typeface="Microsoft JhengHei UI" panose="020B0604030504040204" pitchFamily="34" charset="-120"/>
+              </a:rPr>
+              <a:t>(https://www.itread01.com/content/1545533828.html)</a:t>
+            </a:r>
+            <a:endParaRPr lang="en-US" altLang="zh-TW" sz="1600" dirty="0" smtClean="0">
+              <a:latin typeface="Microsoft JhengHei UI" panose="020B0604030504040204" pitchFamily="34" charset="-120"/>
+              <a:ea typeface="Microsoft JhengHei UI" panose="020B0604030504040204" pitchFamily="34" charset="-120"/>
+            </a:endParaRPr>
+          </a:p>
+          <a:p>
+            <a:pPr>
+              <a:lnSpc>
+                <a:spcPct val="150000"/>
+              </a:lnSpc>
+            </a:pPr>
+            <a:r>
+              <a:rPr lang="en-US" altLang="zh-TW" sz="1600" dirty="0" smtClean="0">
+                <a:latin typeface="Microsoft JhengHei UI" panose="020B0604030504040204" pitchFamily="34" charset="-120"/>
+                <a:ea typeface="Microsoft JhengHei UI" panose="020B0604030504040204" pitchFamily="34" charset="-120"/>
+              </a:rPr>
+              <a:t>[13</a:t>
+            </a:r>
+            <a:r>
+              <a:rPr lang="en-US" altLang="zh-TW" sz="1600" dirty="0">
+                <a:latin typeface="Microsoft JhengHei UI" panose="020B0604030504040204" pitchFamily="34" charset="-120"/>
+                <a:ea typeface="Microsoft JhengHei UI" panose="020B0604030504040204" pitchFamily="34" charset="-120"/>
+              </a:rPr>
+              <a:t>] Python </a:t>
+            </a:r>
+            <a:r>
+              <a:rPr lang="en-US" altLang="zh-TW" sz="1600" dirty="0" err="1">
+                <a:latin typeface="Microsoft JhengHei UI" panose="020B0604030504040204" pitchFamily="34" charset="-120"/>
+                <a:ea typeface="Microsoft JhengHei UI" panose="020B0604030504040204" pitchFamily="34" charset="-120"/>
+              </a:rPr>
+              <a:t>xgboost</a:t>
+            </a:r>
+            <a:r>
+              <a:rPr lang="en-US" altLang="zh-TW" sz="1600" dirty="0">
+                <a:latin typeface="Microsoft JhengHei UI" panose="020B0604030504040204" pitchFamily="34" charset="-120"/>
+                <a:ea typeface="Microsoft JhengHei UI" panose="020B0604030504040204" pitchFamily="34" charset="-120"/>
+              </a:rPr>
+              <a:t> </a:t>
+            </a:r>
+            <a:r>
+              <a:rPr lang="zh-TW" altLang="en-US" sz="1600" dirty="0">
+                <a:latin typeface="Microsoft JhengHei UI" panose="020B0604030504040204" pitchFamily="34" charset="-120"/>
+                <a:ea typeface="Microsoft JhengHei UI" panose="020B0604030504040204" pitchFamily="34" charset="-120"/>
+              </a:rPr>
+              <a:t>模块，</a:t>
+            </a:r>
+            <a:r>
+              <a:rPr lang="en-US" altLang="zh-TW" sz="1600" dirty="0" err="1">
+                <a:latin typeface="Microsoft JhengHei UI" panose="020B0604030504040204" pitchFamily="34" charset="-120"/>
+                <a:ea typeface="Microsoft JhengHei UI" panose="020B0604030504040204" pitchFamily="34" charset="-120"/>
+              </a:rPr>
+              <a:t>XGBClassifier</a:t>
+            </a:r>
+            <a:r>
+              <a:rPr lang="en-US" altLang="zh-TW" sz="1600" dirty="0">
+                <a:latin typeface="Microsoft JhengHei UI" panose="020B0604030504040204" pitchFamily="34" charset="-120"/>
+                <a:ea typeface="Microsoft JhengHei UI" panose="020B0604030504040204" pitchFamily="34" charset="-120"/>
+              </a:rPr>
+              <a:t>() </a:t>
+            </a:r>
+            <a:r>
+              <a:rPr lang="zh-TW" altLang="en-US" sz="1600" dirty="0">
+                <a:latin typeface="Microsoft JhengHei UI" panose="020B0604030504040204" pitchFamily="34" charset="-120"/>
+                <a:ea typeface="Microsoft JhengHei UI" panose="020B0604030504040204" pitchFamily="34" charset="-120"/>
+              </a:rPr>
+              <a:t>实例源</a:t>
+            </a:r>
+            <a:r>
+              <a:rPr lang="zh-TW" altLang="en-US" sz="1600" dirty="0" smtClean="0">
+                <a:latin typeface="Microsoft JhengHei UI" panose="020B0604030504040204" pitchFamily="34" charset="-120"/>
+                <a:ea typeface="Microsoft JhengHei UI" panose="020B0604030504040204" pitchFamily="34" charset="-120"/>
+              </a:rPr>
+              <a:t>码</a:t>
+            </a:r>
+            <a:r>
+              <a:rPr lang="en-US" altLang="zh-TW" sz="1600" dirty="0" smtClean="0">
+                <a:latin typeface="Microsoft JhengHei UI" panose="020B0604030504040204" pitchFamily="34" charset="-120"/>
+                <a:ea typeface="Microsoft JhengHei UI" panose="020B0604030504040204" pitchFamily="34" charset="-120"/>
+              </a:rPr>
+              <a:t>(</a:t>
+            </a:r>
+            <a:r>
+              <a:rPr lang="en-US" altLang="zh-TW" sz="1600" dirty="0">
+                <a:latin typeface="Microsoft JhengHei UI" panose="020B0604030504040204" pitchFamily="34" charset="-120"/>
+                <a:ea typeface="Microsoft JhengHei UI" panose="020B0604030504040204" pitchFamily="34" charset="-120"/>
+              </a:rPr>
+              <a:t>https://codingdict.com/sources/py/xgboost/12189.html)</a:t>
+            </a:r>
+            <a:endParaRPr lang="zh-TW" altLang="en-US" sz="1600" dirty="0">
+              <a:latin typeface="Microsoft JhengHei UI" panose="020B0604030504040204" pitchFamily="34" charset="-120"/>
+              <a:ea typeface="Microsoft JhengHei UI" panose="020B0604030504040204" pitchFamily="34" charset="-120"/>
+            </a:endParaRPr>
+          </a:p>
+          <a:p>
+            <a:pPr>
+              <a:lnSpc>
+                <a:spcPct val="150000"/>
+              </a:lnSpc>
+            </a:pPr>
+            <a:r>
+              <a:rPr lang="en-US" altLang="zh-TW" sz="1600" dirty="0" smtClean="0">
+                <a:latin typeface="Microsoft JhengHei UI" panose="020B0604030504040204" pitchFamily="34" charset="-120"/>
+                <a:ea typeface="Microsoft JhengHei UI" panose="020B0604030504040204" pitchFamily="34" charset="-120"/>
+              </a:rPr>
+              <a:t>[14]</a:t>
+            </a:r>
+            <a:r>
+              <a:rPr lang="zh-TW" altLang="en-US" sz="1600" dirty="0" smtClean="0">
+                <a:latin typeface="Microsoft JhengHei UI" panose="020B0604030504040204" pitchFamily="34" charset="-120"/>
+                <a:ea typeface="Microsoft JhengHei UI" panose="020B0604030504040204" pitchFamily="34" charset="-120"/>
+              </a:rPr>
+              <a:t> </a:t>
+            </a:r>
+            <a:r>
+              <a:rPr lang="en-US" altLang="zh-TW" sz="1600" dirty="0">
+                <a:latin typeface="Microsoft JhengHei UI" panose="020B0604030504040204" pitchFamily="34" charset="-120"/>
+                <a:ea typeface="Microsoft JhengHei UI" panose="020B0604030504040204" pitchFamily="34" charset="-120"/>
+              </a:rPr>
+              <a:t>Introduction to Naive Bayes: A Probability-Based Classification </a:t>
+            </a:r>
+            <a:r>
+              <a:rPr lang="en-US" altLang="zh-TW" sz="1600" dirty="0" smtClean="0">
+                <a:latin typeface="Microsoft JhengHei UI" panose="020B0604030504040204" pitchFamily="34" charset="-120"/>
+                <a:ea typeface="Microsoft JhengHei UI" panose="020B0604030504040204" pitchFamily="34" charset="-120"/>
+              </a:rPr>
+              <a:t>Algorithm(</a:t>
+            </a:r>
+            <a:r>
+              <a:rPr lang="en-US" altLang="zh-TW" sz="1600" dirty="0">
+                <a:latin typeface="Microsoft JhengHei UI" panose="020B0604030504040204" pitchFamily="34" charset="-120"/>
+                <a:ea typeface="Microsoft JhengHei UI" panose="020B0604030504040204" pitchFamily="34" charset="-120"/>
+              </a:rPr>
+              <a:t>https://blog.paperspace.com/introduction-to-naive-bayes/)</a:t>
+            </a:r>
+            <a:endParaRPr lang="en-US" altLang="zh-TW" sz="1600" dirty="0" smtClean="0">
+              <a:latin typeface="Microsoft JhengHei UI" panose="020B0604030504040204" pitchFamily="34" charset="-120"/>
+              <a:ea typeface="Microsoft JhengHei UI" panose="020B0604030504040204" pitchFamily="34" charset="-120"/>
+            </a:endParaRPr>
+          </a:p>
+          <a:p>
+            <a:pPr>
+              <a:lnSpc>
+                <a:spcPct val="150000"/>
+              </a:lnSpc>
+            </a:pPr>
+            <a:endParaRPr lang="en-US" altLang="zh-TW" sz="1600" dirty="0" smtClean="0">
+              <a:latin typeface="Microsoft JhengHei UI" panose="020B0604030504040204" pitchFamily="34" charset="-120"/>
+              <a:ea typeface="Microsoft JhengHei UI" panose="020B0604030504040204" pitchFamily="34" charset="-120"/>
+            </a:endParaRPr>
+          </a:p>
+          <a:p>
+            <a:pPr>
+              <a:lnSpc>
+                <a:spcPct val="150000"/>
+              </a:lnSpc>
+            </a:pPr>
+            <a:endParaRPr lang="en-US" altLang="zh-TW" sz="1600" dirty="0">
+              <a:latin typeface="Microsoft JhengHei UI" panose="020B0604030504040204" pitchFamily="34" charset="-120"/>
+              <a:ea typeface="Microsoft JhengHei UI" panose="020B0604030504040204" pitchFamily="34" charset="-120"/>
+            </a:endParaRPr>
+          </a:p>
+        </p:txBody>
+      </p:sp>
+    </p:spTree>
+    <p:extLst>
+      <p:ext uri="{BB962C8B-B14F-4D97-AF65-F5344CB8AC3E}">
+        <p14:creationId xmlns:p14="http://schemas.microsoft.com/office/powerpoint/2010/main" val="4010738926"/>
+      </p:ext>
+    </p:extLst>
+  </p:cSld>
+  <p:clrMapOvr>
+    <a:masterClrMapping/>
+  </p:clrMapOvr>
+</p:sld>
+</file>
+
+<file path=ppt/slides/slide22.xml><?xml version="1.0" encoding="utf-8"?>
+<p:sld xmlns:a="http://schemas.openxmlformats.org/drawingml/2006/main" xmlns:r="http://schemas.openxmlformats.org/officeDocument/2006/relationships" xmlns:p="http://schemas.openxmlformats.org/presentationml/2006/main">
+  <p:cSld>
+    <p:spTree>
+      <p:nvGrpSpPr>
+        <p:cNvPr id="1" name=""/>
+        <p:cNvGrpSpPr/>
+        <p:nvPr/>
+      </p:nvGrpSpPr>
+      <p:grpSpPr>
+        <a:xfrm>
+          <a:off x="0" y="0"/>
+          <a:ext cx="0" cy="0"/>
+          <a:chOff x="0" y="0"/>
+          <a:chExt cx="0" cy="0"/>
+        </a:xfrm>
+      </p:grpSpPr>
+      <p:sp>
+        <p:nvSpPr>
+          <p:cNvPr id="2" name="標題 1"/>
+          <p:cNvSpPr>
+            <a:spLocks noGrp="1"/>
+          </p:cNvSpPr>
+          <p:nvPr>
+            <p:ph type="title"/>
+          </p:nvPr>
+        </p:nvSpPr>
+        <p:spPr>
+          <a:xfrm>
+            <a:off x="428793" y="3653510"/>
+            <a:ext cx="11029615" cy="1497507"/>
+          </a:xfrm>
+        </p:spPr>
+        <p:txBody>
+          <a:bodyPr>
+            <a:noAutofit/>
+          </a:bodyPr>
+          <a:lstStyle/>
+          <a:p>
+            <a:r>
+              <a:rPr lang="en-US" altLang="zh-TW" sz="7200" dirty="0" smtClean="0"/>
+              <a:t>Contribution of group members</a:t>
+            </a:r>
+            <a:endParaRPr lang="zh-TW" altLang="en-US" sz="7200" dirty="0"/>
+          </a:p>
+        </p:txBody>
+      </p:sp>
+    </p:spTree>
+    <p:extLst>
+      <p:ext uri="{BB962C8B-B14F-4D97-AF65-F5344CB8AC3E}">
+        <p14:creationId xmlns:p14="http://schemas.microsoft.com/office/powerpoint/2010/main" val="2998671774"/>
+      </p:ext>
+    </p:extLst>
+  </p:cSld>
+  <p:clrMapOvr>
+    <a:masterClrMapping/>
+  </p:clrMapOvr>
+</p:sld>
+</file>
+
+<file path=ppt/slides/slide23.xml><?xml version="1.0" encoding="utf-8"?>
+<p:sld xmlns:a="http://schemas.openxmlformats.org/drawingml/2006/main" xmlns:r="http://schemas.openxmlformats.org/officeDocument/2006/relationships" xmlns:p="http://schemas.openxmlformats.org/presentationml/2006/main">
+  <p:cSld>
+    <p:spTree>
+      <p:nvGrpSpPr>
+        <p:cNvPr id="1" name=""/>
+        <p:cNvGrpSpPr/>
+        <p:nvPr/>
+      </p:nvGrpSpPr>
+      <p:grpSpPr>
+        <a:xfrm>
+          <a:off x="0" y="0"/>
+          <a:ext cx="0" cy="0"/>
+          <a:chOff x="0" y="0"/>
+          <a:chExt cx="0" cy="0"/>
+        </a:xfrm>
+      </p:grpSpPr>
+      <p:sp>
+        <p:nvSpPr>
+          <p:cNvPr id="2" name="標題 1">
+            <a:extLst>
+              <a:ext uri="{FF2B5EF4-FFF2-40B4-BE49-F238E27FC236}">
+                <a16:creationId xmlns:a16="http://schemas.microsoft.com/office/drawing/2014/main" id="{A0150EC9-7E7D-4648-AC38-2A7BCBFB2EF6}"/>
+              </a:ext>
+            </a:extLst>
+          </p:cNvPr>
+          <p:cNvSpPr>
+            <a:spLocks noGrp="1"/>
+          </p:cNvSpPr>
+          <p:nvPr>
+            <p:ph type="title"/>
+          </p:nvPr>
+        </p:nvSpPr>
+        <p:spPr>
+          <a:xfrm>
+            <a:off x="581192" y="702156"/>
+            <a:ext cx="11029616" cy="1013800"/>
+          </a:xfrm>
+        </p:spPr>
+        <p:txBody>
+          <a:bodyPr rtlCol="0">
+            <a:normAutofit/>
+          </a:bodyPr>
+          <a:lstStyle/>
+          <a:p>
+            <a:r>
+              <a:rPr lang="en-US" altLang="zh-TW" dirty="0" smtClean="0"/>
+              <a:t>contribute</a:t>
+            </a:r>
+            <a:endParaRPr lang="en-US" altLang="zh-TW" dirty="0"/>
+          </a:p>
+        </p:txBody>
+      </p:sp>
+      <p:sp>
+        <p:nvSpPr>
+          <p:cNvPr id="4" name="矩形 3"/>
+          <p:cNvSpPr/>
+          <p:nvPr/>
+        </p:nvSpPr>
+        <p:spPr>
+          <a:xfrm>
+            <a:off x="120659" y="2032728"/>
+            <a:ext cx="3673059" cy="1177036"/>
+          </a:xfrm>
+          <a:prstGeom prst="rect">
+            <a:avLst/>
+          </a:prstGeom>
+        </p:spPr>
+        <p:style>
+          <a:lnRef idx="0">
+            <a:schemeClr val="dk1">
+              <a:alpha val="0"/>
+              <a:hueOff val="0"/>
+              <a:satOff val="0"/>
+              <a:lumOff val="0"/>
+              <a:alphaOff val="0"/>
+            </a:schemeClr>
+          </a:lnRef>
+          <a:fillRef idx="0">
+            <a:schemeClr val="lt1">
+              <a:alpha val="0"/>
+              <a:hueOff val="0"/>
+              <a:satOff val="0"/>
+              <a:lumOff val="0"/>
+              <a:alphaOff val="0"/>
+            </a:schemeClr>
+          </a:fillRef>
+          <a:effectRef idx="0">
+            <a:schemeClr val="lt1">
+              <a:alpha val="0"/>
+              <a:hueOff val="0"/>
+              <a:satOff val="0"/>
+              <a:lumOff val="0"/>
+              <a:alphaOff val="0"/>
+            </a:schemeClr>
+          </a:effectRef>
+          <a:fontRef idx="minor">
+            <a:schemeClr val="tx1">
+              <a:hueOff val="0"/>
+              <a:satOff val="0"/>
+              <a:lumOff val="0"/>
+              <a:alphaOff val="0"/>
+            </a:schemeClr>
+          </a:fontRef>
+        </p:style>
+      </p:sp>
       <p:graphicFrame>
         <p:nvGraphicFramePr>
           <p:cNvPr id="3" name="表格 2"/>
@@ -12194,7 +13355,7 @@
           <p:nvPr>
             <p:extLst>
               <p:ext uri="{D42A27DB-BD31-4B8C-83A1-F6EECF244321}">
-                <p14:modId xmlns:p14="http://schemas.microsoft.com/office/powerpoint/2010/main" val="1218356262"/>
+                <p14:modId xmlns:p14="http://schemas.microsoft.com/office/powerpoint/2010/main" val="3503681094"/>
               </p:ext>
             </p:extLst>
           </p:nvPr>
@@ -12278,6 +13439,13 @@
                     <a:bodyPr/>
                     <a:lstStyle/>
                     <a:p>
+                      <a:r>
+                        <a:rPr lang="en-US" altLang="zh-TW" sz="1600" b="0" dirty="0" smtClean="0">
+                          <a:latin typeface="Microsoft JhengHei UI" panose="020B0604030504040204" pitchFamily="34" charset="-120"/>
+                          <a:ea typeface="Microsoft JhengHei UI" panose="020B0604030504040204" pitchFamily="34" charset="-120"/>
+                        </a:rPr>
+                        <a:t>contact</a:t>
+                      </a:r>
                       <a:endParaRPr lang="zh-TW" altLang="en-US" sz="1600" b="0" dirty="0">
                         <a:latin typeface="Microsoft JhengHei UI" panose="020B0604030504040204" pitchFamily="34" charset="-120"/>
                         <a:ea typeface="Microsoft JhengHei UI" panose="020B0604030504040204" pitchFamily="34" charset="-120"/>
@@ -12357,7 +13525,26 @@
                           <a:latin typeface="Microsoft JhengHei UI" panose="020B0604030504040204" pitchFamily="34" charset="-120"/>
                           <a:ea typeface="Microsoft JhengHei UI" panose="020B0604030504040204" pitchFamily="34" charset="-120"/>
                         </a:rPr>
-                        <a:t> method</a:t>
+                        <a:t> </a:t>
+                      </a:r>
+                      <a:r>
+                        <a:rPr lang="en-US" altLang="zh-TW" sz="1600" b="0" baseline="0" dirty="0" smtClean="0">
+                          <a:latin typeface="Microsoft JhengHei UI" panose="020B0604030504040204" pitchFamily="34" charset="-120"/>
+                          <a:ea typeface="Microsoft JhengHei UI" panose="020B0604030504040204" pitchFamily="34" charset="-120"/>
+                        </a:rPr>
+                        <a:t>method</a:t>
+                      </a:r>
+                    </a:p>
+                    <a:p>
+                      <a:pPr marL="342900" indent="-342900">
+                        <a:buAutoNum type="arabicPeriod"/>
+                      </a:pPr>
+                      <a:r>
+                        <a:rPr lang="en-US" altLang="zh-TW" sz="1600" b="0" baseline="0" dirty="0" smtClean="0">
+                          <a:latin typeface="Microsoft JhengHei UI" panose="020B0604030504040204" pitchFamily="34" charset="-120"/>
+                          <a:ea typeface="Microsoft JhengHei UI" panose="020B0604030504040204" pitchFamily="34" charset="-120"/>
+                        </a:rPr>
+                        <a:t>Try Machine learning method</a:t>
                       </a:r>
                       <a:endParaRPr lang="en-US" altLang="zh-TW" sz="1600" b="0" dirty="0" smtClean="0">
                         <a:latin typeface="Microsoft JhengHei UI" panose="020B0604030504040204" pitchFamily="34" charset="-120"/>
@@ -12380,15 +13567,16 @@
                           <a:latin typeface="Microsoft JhengHei UI" panose="020B0604030504040204" pitchFamily="34" charset="-120"/>
                           <a:ea typeface="Microsoft JhengHei UI" panose="020B0604030504040204" pitchFamily="34" charset="-120"/>
                         </a:rPr>
-                        <a:t> design</a:t>
+                        <a:t> </a:t>
+                      </a:r>
+                      <a:r>
+                        <a:rPr lang="en-US" altLang="zh-TW" sz="1600" b="0" baseline="0" dirty="0" smtClean="0">
+                          <a:latin typeface="Microsoft JhengHei UI" panose="020B0604030504040204" pitchFamily="34" charset="-120"/>
+                          <a:ea typeface="Microsoft JhengHei UI" panose="020B0604030504040204" pitchFamily="34" charset="-120"/>
+                        </a:rPr>
+                        <a:t>design</a:t>
                       </a:r>
                       <a:endParaRPr lang="en-US" altLang="zh-TW" sz="1600" b="0" dirty="0" smtClean="0">
-                        <a:latin typeface="Microsoft JhengHei UI" panose="020B0604030504040204" pitchFamily="34" charset="-120"/>
-                        <a:ea typeface="Microsoft JhengHei UI" panose="020B0604030504040204" pitchFamily="34" charset="-120"/>
-                      </a:endParaRPr>
-                    </a:p>
-                    <a:p>
-                      <a:endParaRPr lang="zh-TW" altLang="en-US" sz="1600" b="0" dirty="0">
                         <a:latin typeface="Microsoft JhengHei UI" panose="020B0604030504040204" pitchFamily="34" charset="-120"/>
                         <a:ea typeface="Microsoft JhengHei UI" panose="020B0604030504040204" pitchFamily="34" charset="-120"/>
                       </a:endParaRPr>
@@ -14177,9 +15365,10 @@
           </a:p>
           <a:p>
             <a:r>
-              <a:rPr lang="en-US" altLang="zh-TW" dirty="0" smtClean="0"/>
-              <a:t>SVM</a:t>
-            </a:r>
+              <a:rPr lang="en-US" altLang="zh-TW" dirty="0" err="1" smtClean="0"/>
+              <a:t>XGboost</a:t>
+            </a:r>
+            <a:endParaRPr lang="en-US" altLang="zh-TW" dirty="0" smtClean="0"/>
           </a:p>
         </p:txBody>
       </p:sp>
@@ -18225,15 +19414,6 @@
 </file>
 
 <file path=customXml/item1.xml><?xml version="1.0" encoding="utf-8"?>
-<?mso-contentType ?>
-<FormTemplates xmlns="http://schemas.microsoft.com/sharepoint/v3/contenttype/forms">
-  <Display>DocumentLibraryForm</Display>
-  <Edit>DocumentLibraryForm</Edit>
-  <New>DocumentLibraryForm</New>
-</FormTemplates>
-</file>
-
-<file path=customXml/item2.xml><?xml version="1.0" encoding="utf-8"?>
 <ct:contentTypeSchema xmlns:ct="http://schemas.microsoft.com/office/2006/metadata/contentType" xmlns:ma="http://schemas.microsoft.com/office/2006/metadata/properties/metaAttributes" ct:_="" ma:_="" ma:contentTypeName="Document" ma:contentTypeID="0x01010079F111ED35F8CC479449609E8A0923A6" ma:contentTypeVersion="11" ma:contentTypeDescription="Create a new document." ma:contentTypeScope="" ma:versionID="9677210f24a1be23c92c90fd886aa0aa">
   <xsd:schema xmlns:xsd="http://www.w3.org/2001/XMLSchema" xmlns:xs="http://www.w3.org/2001/XMLSchema" xmlns:p="http://schemas.microsoft.com/office/2006/metadata/properties" xmlns:ns2="71af3243-3dd4-4a8d-8c0d-dd76da1f02a5" xmlns:ns3="16c05727-aa75-4e4a-9b5f-8a80a1165891" targetNamespace="http://schemas.microsoft.com/office/2006/metadata/properties" ma:root="true" ma:fieldsID="60e05723c5c1908df1a1a4ebf11d344e" ns2:_="" ns3:_="">
     <xsd:import namespace="71af3243-3dd4-4a8d-8c0d-dd76da1f02a5"/>
@@ -18444,6 +19624,15 @@
 </ct:contentTypeSchema>
 </file>
 
+<file path=customXml/item2.xml><?xml version="1.0" encoding="utf-8"?>
+<?mso-contentType ?>
+<FormTemplates xmlns="http://schemas.microsoft.com/sharepoint/v3/contenttype/forms">
+  <Display>DocumentLibraryForm</Display>
+  <Edit>DocumentLibraryForm</Edit>
+  <New>DocumentLibraryForm</New>
+</FormTemplates>
+</file>
+
 <file path=customXml/item3.xml><?xml version="1.0" encoding="utf-8"?>
 <p:properties xmlns:p="http://schemas.microsoft.com/office/2006/metadata/properties" xmlns:xsi="http://www.w3.org/2001/XMLSchema-instance" xmlns:pc="http://schemas.microsoft.com/office/infopath/2007/PartnerControls">
   <documentManagement>
@@ -18453,14 +19642,6 @@
 </file>
 
 <file path=customXml/itemProps1.xml><?xml version="1.0" encoding="utf-8"?>
-<ds:datastoreItem xmlns:ds="http://schemas.openxmlformats.org/officeDocument/2006/customXml" ds:itemID="{D1CAB62D-49E5-4271-85C6-1466970BAB69}">
-  <ds:schemaRefs>
-    <ds:schemaRef ds:uri="http://schemas.microsoft.com/sharepoint/v3/contenttype/forms"/>
-  </ds:schemaRefs>
-</ds:datastoreItem>
-</file>
-
-<file path=customXml/itemProps2.xml><?xml version="1.0" encoding="utf-8"?>
 <ds:datastoreItem xmlns:ds="http://schemas.openxmlformats.org/officeDocument/2006/customXml" ds:itemID="{D5A32ED2-6DBA-4E14-851E-DE5772C902F3}">
   <ds:schemaRefs>
     <ds:schemaRef ds:uri="http://schemas.microsoft.com/office/2006/metadata/contentType"/>
@@ -18479,6 +19660,14 @@
 </ds:datastoreItem>
 </file>
 
+<file path=customXml/itemProps2.xml><?xml version="1.0" encoding="utf-8"?>
+<ds:datastoreItem xmlns:ds="http://schemas.openxmlformats.org/officeDocument/2006/customXml" ds:itemID="{D1CAB62D-49E5-4271-85C6-1466970BAB69}">
+  <ds:schemaRefs>
+    <ds:schemaRef ds:uri="http://schemas.microsoft.com/sharepoint/v3/contenttype/forms"/>
+  </ds:schemaRefs>
+</ds:datastoreItem>
+</file>
+
 <file path=customXml/itemProps3.xml><?xml version="1.0" encoding="utf-8"?>
 <ds:datastoreItem xmlns:ds="http://schemas.openxmlformats.org/officeDocument/2006/customXml" ds:itemID="{AA7F0652-397B-4F71-B75E-207A80EB2786}">
   <ds:schemaRefs>

</xml_diff>

<commit_message>
add makedown to 90%
</commit_message>
<xml_diff>
--- a/Case_Presentation_1/ppt/case1.pptx
+++ b/Case_Presentation_1/ppt/case1.pptx
@@ -5794,7 +5794,7 @@
                 <a16:creationId xmlns:a16="http://schemas.microsoft.com/office/drawing/2014/main" id="{683F1FFD-1AA8-4EC2-97B9-FEC7564F489B}"/>
               </a:ext>
               <a:ext uri="{C183D7F6-B498-43B3-948B-1728B52AA6E4}">
-                <adec:decorative xmlns="" xmlns:adec="http://schemas.microsoft.com/office/drawing/2017/decorative" val="1"/>
+                <adec:decorative xmlns:adec="http://schemas.microsoft.com/office/drawing/2017/decorative" xmlns="" val="1"/>
               </a:ext>
             </a:extLst>
           </p:cNvPr>
@@ -5892,7 +5892,7 @@
                 <a16:creationId xmlns:a16="http://schemas.microsoft.com/office/drawing/2014/main" id="{8FF0F8A7-C9E3-49D9-A67E-09FF582C7821}"/>
               </a:ext>
               <a:ext uri="{C183D7F6-B498-43B3-948B-1728B52AA6E4}">
-                <adec:decorative xmlns="" xmlns:adec="http://schemas.microsoft.com/office/drawing/2017/decorative" val="1"/>
+                <adec:decorative xmlns:adec="http://schemas.microsoft.com/office/drawing/2017/decorative" xmlns="" val="1"/>
               </a:ext>
             </a:extLst>
           </p:cNvPr>
@@ -6158,7 +6158,7 @@
                 <a16:creationId xmlns:a16="http://schemas.microsoft.com/office/drawing/2014/main" id="{A4274C20-A98B-4AC3-B16A-B7F41CB582DC}"/>
               </a:ext>
               <a:ext uri="{C183D7F6-B498-43B3-948B-1728B52AA6E4}">
-                <adec:decorative xmlns="" xmlns:adec="http://schemas.microsoft.com/office/drawing/2017/decorative" val="1"/>
+                <adec:decorative xmlns:adec="http://schemas.microsoft.com/office/drawing/2017/decorative" xmlns="" val="1"/>
               </a:ext>
             </a:extLst>
           </p:cNvPr>
@@ -6189,7 +6189,7 @@
                   <a16:creationId xmlns:a16="http://schemas.microsoft.com/office/drawing/2014/main" id="{43ECC69B-2243-424A-8237-CF490F8B06C1}"/>
                 </a:ext>
                 <a:ext uri="{C183D7F6-B498-43B3-948B-1728B52AA6E4}">
-                  <adec:decorative xmlns="" xmlns:adec="http://schemas.microsoft.com/office/drawing/2017/decorative" val="1"/>
+                  <adec:decorative xmlns:adec="http://schemas.microsoft.com/office/drawing/2017/decorative" xmlns="" val="1"/>
                 </a:ext>
               </a:extLst>
             </p:cNvPr>
@@ -6241,7 +6241,7 @@
                   <a16:creationId xmlns:a16="http://schemas.microsoft.com/office/drawing/2014/main" id="{6D2EA3B9-3D17-4510-8464-E74F67267C00}"/>
                 </a:ext>
                 <a:ext uri="{C183D7F6-B498-43B3-948B-1728B52AA6E4}">
-                  <adec:decorative xmlns="" xmlns:adec="http://schemas.microsoft.com/office/drawing/2017/decorative" val="1"/>
+                  <adec:decorative xmlns:adec="http://schemas.microsoft.com/office/drawing/2017/decorative" xmlns="" val="1"/>
                 </a:ext>
               </a:extLst>
             </p:cNvPr>
@@ -6293,7 +6293,7 @@
                   <a16:creationId xmlns:a16="http://schemas.microsoft.com/office/drawing/2014/main" id="{AA5DFA43-F31D-4C31-8826-6B40A21CF9AD}"/>
                 </a:ext>
                 <a:ext uri="{C183D7F6-B498-43B3-948B-1728B52AA6E4}">
-                  <adec:decorative xmlns="" xmlns:adec="http://schemas.microsoft.com/office/drawing/2017/decorative" val="1"/>
+                  <adec:decorative xmlns:adec="http://schemas.microsoft.com/office/drawing/2017/decorative" xmlns="" val="1"/>
                 </a:ext>
               </a:extLst>
             </p:cNvPr>
@@ -8021,14 +8021,7 @@
                   <a:latin typeface="Microsoft JhengHei UI" panose="020B0604030504040204" pitchFamily="34" charset="-120"/>
                   <a:ea typeface="Microsoft JhengHei UI" panose="020B0604030504040204" pitchFamily="34" charset="-120"/>
                 </a:rPr>
-                <a:t>. </a:t>
-              </a:r>
-              <a:r>
-                <a:rPr lang="en-US" altLang="zh-TW" sz="1600" dirty="0" smtClean="0">
-                  <a:latin typeface="Microsoft JhengHei UI" panose="020B0604030504040204" pitchFamily="34" charset="-120"/>
-                  <a:ea typeface="Microsoft JhengHei UI" panose="020B0604030504040204" pitchFamily="34" charset="-120"/>
-                </a:rPr>
-                <a:t>Average</a:t>
+                <a:t>. Average</a:t>
               </a:r>
               <a:endParaRPr lang="en-US" sz="1600" kern="1200" noProof="0" dirty="0">
                 <a:latin typeface="Microsoft JhengHei UI" panose="020B0604030504040204" pitchFamily="34" charset="-120"/>
@@ -10165,7 +10158,7 @@
           <p:nvPr>
             <p:extLst>
               <p:ext uri="{D42A27DB-BD31-4B8C-83A1-F6EECF244321}">
-                <p14:modId xmlns:p14="http://schemas.microsoft.com/office/powerpoint/2010/main" val="1749085286"/>
+                <p14:modId xmlns:p14="http://schemas.microsoft.com/office/powerpoint/2010/main" val="801600925"/>
               </p:ext>
             </p:extLst>
           </p:nvPr>
@@ -10245,7 +10238,7 @@
                     <a:p>
                       <a:r>
                         <a:rPr lang="en-US" altLang="zh-TW" sz="1200" dirty="0" smtClean="0"/>
-                        <a:t>0.989</a:t>
+                        <a:t>0.985</a:t>
                       </a:r>
                       <a:endParaRPr lang="zh-TW" altLang="en-US" sz="1200" dirty="0"/>
                     </a:p>
@@ -10583,15 +10576,7 @@
                   <a:srgbClr val="FFFEFF"/>
                 </a:solidFill>
               </a:rPr>
-              <a:t> </a:t>
-            </a:r>
-            <a:r>
-              <a:rPr lang="en-US" altLang="zh-TW" dirty="0" smtClean="0">
-                <a:solidFill>
-                  <a:srgbClr val="FFFEFF"/>
-                </a:solidFill>
-              </a:rPr>
-              <a:t>result (a)</a:t>
+              <a:t> result (a)</a:t>
             </a:r>
             <a:endParaRPr lang="en-US" altLang="zh-TW" dirty="0">
               <a:solidFill>
@@ -11405,7 +11390,7 @@
           <p:nvPr>
             <p:extLst>
               <p:ext uri="{D42A27DB-BD31-4B8C-83A1-F6EECF244321}">
-                <p14:modId xmlns:p14="http://schemas.microsoft.com/office/powerpoint/2010/main" val="2173222368"/>
+                <p14:modId xmlns:p14="http://schemas.microsoft.com/office/powerpoint/2010/main" val="129633412"/>
               </p:ext>
             </p:extLst>
           </p:nvPr>
@@ -11554,8 +11539,8 @@
                     <a:lstStyle/>
                     <a:p>
                       <a:r>
-                        <a:rPr lang="en-US" altLang="zh-TW" sz="1200" dirty="0" smtClean="0"/>
-                        <a:t>0.725</a:t>
+                        <a:rPr lang="en-US" altLang="zh-TW" sz="1200" smtClean="0"/>
+                        <a:t>0.73</a:t>
                       </a:r>
                       <a:endParaRPr lang="zh-TW" altLang="en-US" sz="1200" dirty="0"/>
                     </a:p>
@@ -12140,15 +12125,7 @@
                   <a:srgbClr val="FFFEFF"/>
                 </a:solidFill>
               </a:rPr>
-              <a:t> </a:t>
-            </a:r>
-            <a:r>
-              <a:rPr lang="en-US" altLang="zh-TW" dirty="0" smtClean="0">
-                <a:solidFill>
-                  <a:srgbClr val="FFFEFF"/>
-                </a:solidFill>
-              </a:rPr>
-              <a:t>result (B)</a:t>
+              <a:t> result (B)</a:t>
             </a:r>
             <a:endParaRPr lang="en-US" altLang="zh-TW" dirty="0">
               <a:solidFill>
@@ -18402,7 +18379,6 @@
               <a:rPr lang="en-US" altLang="zh-TW" sz="1400" dirty="0" smtClean="0"/>
               <a:t>eight</a:t>
             </a:r>
-            <a:endParaRPr lang="en-US" altLang="zh-TW" sz="1400" dirty="0" smtClean="0"/>
           </a:p>
         </p:txBody>
       </p:sp>
@@ -22411,15 +22387,6 @@
 </file>
 
 <file path=customXml/item1.xml><?xml version="1.0" encoding="utf-8"?>
-<?mso-contentType ?>
-<FormTemplates xmlns="http://schemas.microsoft.com/sharepoint/v3/contenttype/forms">
-  <Display>DocumentLibraryForm</Display>
-  <Edit>DocumentLibraryForm</Edit>
-  <New>DocumentLibraryForm</New>
-</FormTemplates>
-</file>
-
-<file path=customXml/item2.xml><?xml version="1.0" encoding="utf-8"?>
 <ct:contentTypeSchema xmlns:ct="http://schemas.microsoft.com/office/2006/metadata/contentType" xmlns:ma="http://schemas.microsoft.com/office/2006/metadata/properties/metaAttributes" ct:_="" ma:_="" ma:contentTypeName="Document" ma:contentTypeID="0x01010079F111ED35F8CC479449609E8A0923A6" ma:contentTypeVersion="11" ma:contentTypeDescription="Create a new document." ma:contentTypeScope="" ma:versionID="9677210f24a1be23c92c90fd886aa0aa">
   <xsd:schema xmlns:xsd="http://www.w3.org/2001/XMLSchema" xmlns:xs="http://www.w3.org/2001/XMLSchema" xmlns:p="http://schemas.microsoft.com/office/2006/metadata/properties" xmlns:ns2="71af3243-3dd4-4a8d-8c0d-dd76da1f02a5" xmlns:ns3="16c05727-aa75-4e4a-9b5f-8a80a1165891" targetNamespace="http://schemas.microsoft.com/office/2006/metadata/properties" ma:root="true" ma:fieldsID="60e05723c5c1908df1a1a4ebf11d344e" ns2:_="" ns3:_="">
     <xsd:import namespace="71af3243-3dd4-4a8d-8c0d-dd76da1f02a5"/>
@@ -22630,6 +22597,15 @@
 </ct:contentTypeSchema>
 </file>
 
+<file path=customXml/item2.xml><?xml version="1.0" encoding="utf-8"?>
+<?mso-contentType ?>
+<FormTemplates xmlns="http://schemas.microsoft.com/sharepoint/v3/contenttype/forms">
+  <Display>DocumentLibraryForm</Display>
+  <Edit>DocumentLibraryForm</Edit>
+  <New>DocumentLibraryForm</New>
+</FormTemplates>
+</file>
+
 <file path=customXml/item3.xml><?xml version="1.0" encoding="utf-8"?>
 <p:properties xmlns:p="http://schemas.microsoft.com/office/2006/metadata/properties" xmlns:xsi="http://www.w3.org/2001/XMLSchema-instance" xmlns:pc="http://schemas.microsoft.com/office/infopath/2007/PartnerControls">
   <documentManagement>
@@ -22639,14 +22615,6 @@
 </file>
 
 <file path=customXml/itemProps1.xml><?xml version="1.0" encoding="utf-8"?>
-<ds:datastoreItem xmlns:ds="http://schemas.openxmlformats.org/officeDocument/2006/customXml" ds:itemID="{D1CAB62D-49E5-4271-85C6-1466970BAB69}">
-  <ds:schemaRefs>
-    <ds:schemaRef ds:uri="http://schemas.microsoft.com/sharepoint/v3/contenttype/forms"/>
-  </ds:schemaRefs>
-</ds:datastoreItem>
-</file>
-
-<file path=customXml/itemProps2.xml><?xml version="1.0" encoding="utf-8"?>
 <ds:datastoreItem xmlns:ds="http://schemas.openxmlformats.org/officeDocument/2006/customXml" ds:itemID="{D5A32ED2-6DBA-4E14-851E-DE5772C902F3}">
   <ds:schemaRefs>
     <ds:schemaRef ds:uri="http://schemas.microsoft.com/office/2006/metadata/contentType"/>
@@ -22665,6 +22633,14 @@
 </ds:datastoreItem>
 </file>
 
+<file path=customXml/itemProps2.xml><?xml version="1.0" encoding="utf-8"?>
+<ds:datastoreItem xmlns:ds="http://schemas.openxmlformats.org/officeDocument/2006/customXml" ds:itemID="{D1CAB62D-49E5-4271-85C6-1466970BAB69}">
+  <ds:schemaRefs>
+    <ds:schemaRef ds:uri="http://schemas.microsoft.com/sharepoint/v3/contenttype/forms"/>
+  </ds:schemaRefs>
+</ds:datastoreItem>
+</file>
+
 <file path=customXml/itemProps3.xml><?xml version="1.0" encoding="utf-8"?>
 <ds:datastoreItem xmlns:ds="http://schemas.openxmlformats.org/officeDocument/2006/customXml" ds:itemID="{AA7F0652-397B-4F71-B75E-207A80EB2786}">
   <ds:schemaRefs>

</xml_diff>

<commit_message>
PPT update to 99%
</commit_message>
<xml_diff>
--- a/Case_Presentation_1/ppt/case1.pptx
+++ b/Case_Presentation_1/ppt/case1.pptx
@@ -5795,7 +5795,7 @@
                 <a16:creationId xmlns:a16="http://schemas.microsoft.com/office/drawing/2014/main" id="{683F1FFD-1AA8-4EC2-97B9-FEC7564F489B}"/>
               </a:ext>
               <a:ext uri="{C183D7F6-B498-43B3-948B-1728B52AA6E4}">
-                <adec:decorative xmlns="" xmlns:adec="http://schemas.microsoft.com/office/drawing/2017/decorative" val="1"/>
+                <adec:decorative xmlns:adec="http://schemas.microsoft.com/office/drawing/2017/decorative" xmlns="" val="1"/>
               </a:ext>
             </a:extLst>
           </p:cNvPr>
@@ -5893,7 +5893,7 @@
                 <a16:creationId xmlns:a16="http://schemas.microsoft.com/office/drawing/2014/main" id="{8FF0F8A7-C9E3-49D9-A67E-09FF582C7821}"/>
               </a:ext>
               <a:ext uri="{C183D7F6-B498-43B3-948B-1728B52AA6E4}">
-                <adec:decorative xmlns="" xmlns:adec="http://schemas.microsoft.com/office/drawing/2017/decorative" val="1"/>
+                <adec:decorative xmlns:adec="http://schemas.microsoft.com/office/drawing/2017/decorative" xmlns="" val="1"/>
               </a:ext>
             </a:extLst>
           </p:cNvPr>
@@ -6159,7 +6159,7 @@
                 <a16:creationId xmlns:a16="http://schemas.microsoft.com/office/drawing/2014/main" id="{A4274C20-A98B-4AC3-B16A-B7F41CB582DC}"/>
               </a:ext>
               <a:ext uri="{C183D7F6-B498-43B3-948B-1728B52AA6E4}">
-                <adec:decorative xmlns="" xmlns:adec="http://schemas.microsoft.com/office/drawing/2017/decorative" val="1"/>
+                <adec:decorative xmlns:adec="http://schemas.microsoft.com/office/drawing/2017/decorative" xmlns="" val="1"/>
               </a:ext>
             </a:extLst>
           </p:cNvPr>
@@ -6190,7 +6190,7 @@
                   <a16:creationId xmlns:a16="http://schemas.microsoft.com/office/drawing/2014/main" id="{43ECC69B-2243-424A-8237-CF490F8B06C1}"/>
                 </a:ext>
                 <a:ext uri="{C183D7F6-B498-43B3-948B-1728B52AA6E4}">
-                  <adec:decorative xmlns="" xmlns:adec="http://schemas.microsoft.com/office/drawing/2017/decorative" val="1"/>
+                  <adec:decorative xmlns:adec="http://schemas.microsoft.com/office/drawing/2017/decorative" xmlns="" val="1"/>
                 </a:ext>
               </a:extLst>
             </p:cNvPr>
@@ -6242,7 +6242,7 @@
                   <a16:creationId xmlns:a16="http://schemas.microsoft.com/office/drawing/2014/main" id="{6D2EA3B9-3D17-4510-8464-E74F67267C00}"/>
                 </a:ext>
                 <a:ext uri="{C183D7F6-B498-43B3-948B-1728B52AA6E4}">
-                  <adec:decorative xmlns="" xmlns:adec="http://schemas.microsoft.com/office/drawing/2017/decorative" val="1"/>
+                  <adec:decorative xmlns:adec="http://schemas.microsoft.com/office/drawing/2017/decorative" xmlns="" val="1"/>
                 </a:ext>
               </a:extLst>
             </p:cNvPr>
@@ -6294,7 +6294,7 @@
                   <a16:creationId xmlns:a16="http://schemas.microsoft.com/office/drawing/2014/main" id="{AA5DFA43-F31D-4C31-8826-6B40A21CF9AD}"/>
                 </a:ext>
                 <a:ext uri="{C183D7F6-B498-43B3-948B-1728B52AA6E4}">
-                  <adec:decorative xmlns="" xmlns:adec="http://schemas.microsoft.com/office/drawing/2017/decorative" val="1"/>
+                  <adec:decorative xmlns:adec="http://schemas.microsoft.com/office/drawing/2017/decorative" xmlns="" val="1"/>
                 </a:ext>
               </a:extLst>
             </p:cNvPr>
@@ -14286,6 +14286,13 @@
   <p:clrMapOvr>
     <a:masterClrMapping/>
   </p:clrMapOvr>
+  <p:timing>
+    <p:tnLst>
+      <p:par>
+        <p:cTn id="1" dur="indefinite" restart="never" nodeType="tmRoot"/>
+      </p:par>
+    </p:tnLst>
+  </p:timing>
 </p:sld>
 </file>
 
@@ -15002,7 +15009,7 @@
         <p:spPr>
           <a:xfrm>
             <a:off x="474742" y="3277585"/>
-            <a:ext cx="4729500" cy="338554"/>
+            <a:ext cx="4729500" cy="584775"/>
           </a:xfrm>
           <a:prstGeom prst="rect">
             <a:avLst/>
@@ -15015,9 +15022,21 @@
           <a:lstStyle/>
           <a:p>
             <a:r>
-              <a:rPr lang="zh-TW" altLang="en-US" sz="1600" dirty="0"/>
-              <a:t>https://github.com/frankye1000/NYCU-DigitalMedicine</a:t>
-            </a:r>
+              <a:rPr lang="zh-TW" altLang="en-US" sz="1600" dirty="0">
+                <a:hlinkClick r:id="rId2"/>
+              </a:rPr>
+              <a:t>https://github.com/frankye1000/NYCU-DigitalMedicin</a:t>
+            </a:r>
+            <a:r>
+              <a:rPr lang="zh-TW" altLang="en-US" sz="1600" dirty="0" smtClean="0">
+                <a:hlinkClick r:id="rId2"/>
+              </a:rPr>
+              <a:t>e</a:t>
+            </a:r>
+            <a:endParaRPr lang="en-US" altLang="zh-TW" sz="1600" dirty="0"/>
+          </a:p>
+          <a:p>
+            <a:endParaRPr lang="en-US" altLang="zh-TW" sz="1600" dirty="0" smtClean="0"/>
           </a:p>
         </p:txBody>
       </p:sp>
@@ -15129,22 +15148,22 @@
       </p:grpSp>
       <p:pic>
         <p:nvPicPr>
-          <p:cNvPr id="3" name="圖片 2"/>
+          <p:cNvPr id="4" name="圖片 3"/>
           <p:cNvPicPr>
             <a:picLocks noChangeAspect="1"/>
           </p:cNvPicPr>
           <p:nvPr/>
         </p:nvPicPr>
         <p:blipFill>
-          <a:blip r:embed="rId2"/>
+          <a:blip r:embed="rId3"/>
           <a:stretch>
             <a:fillRect/>
           </a:stretch>
         </p:blipFill>
         <p:spPr>
           <a:xfrm>
-            <a:off x="5939893" y="2019993"/>
-            <a:ext cx="4736160" cy="4775488"/>
+            <a:off x="5843215" y="2077163"/>
+            <a:ext cx="4281686" cy="4549291"/>
           </a:xfrm>
           <a:prstGeom prst="rect">
             <a:avLst/>
@@ -15161,6 +15180,13 @@
   <p:clrMapOvr>
     <a:masterClrMapping/>
   </p:clrMapOvr>
+  <p:timing>
+    <p:tnLst>
+      <p:par>
+        <p:cTn id="1" dur="indefinite" restart="never" nodeType="tmRoot"/>
+      </p:par>
+    </p:tnLst>
+  </p:timing>
 </p:sld>
 </file>
 
@@ -15221,6 +15247,13 @@
   <p:clrMapOvr>
     <a:masterClrMapping/>
   </p:clrMapOvr>
+  <p:timing>
+    <p:tnLst>
+      <p:par>
+        <p:cTn id="1" dur="indefinite" restart="never" nodeType="tmRoot"/>
+      </p:par>
+    </p:tnLst>
+  </p:timing>
 </p:sld>
 </file>
 
@@ -15798,6 +15831,13 @@
   <p:clrMapOvr>
     <a:masterClrMapping/>
   </p:clrMapOvr>
+  <p:timing>
+    <p:tnLst>
+      <p:par>
+        <p:cTn id="1" dur="indefinite" restart="never" nodeType="tmRoot"/>
+      </p:par>
+    </p:tnLst>
+  </p:timing>
 </p:sld>
 </file>
 
@@ -16316,6 +16356,13 @@
   <p:clrMapOvr>
     <a:masterClrMapping/>
   </p:clrMapOvr>
+  <p:timing>
+    <p:tnLst>
+      <p:par>
+        <p:cTn id="1" dur="indefinite" restart="never" nodeType="tmRoot"/>
+      </p:par>
+    </p:tnLst>
+  </p:timing>
 </p:sld>
 </file>
 
@@ -16376,6 +16423,13 @@
   <p:clrMapOvr>
     <a:masterClrMapping/>
   </p:clrMapOvr>
+  <p:timing>
+    <p:tnLst>
+      <p:par>
+        <p:cTn id="1" dur="indefinite" restart="never" nodeType="tmRoot"/>
+      </p:par>
+    </p:tnLst>
+  </p:timing>
 </p:sld>
 </file>
 
@@ -16855,6 +16909,13 @@
   <p:clrMapOvr>
     <a:masterClrMapping/>
   </p:clrMapOvr>
+  <p:timing>
+    <p:tnLst>
+      <p:par>
+        <p:cTn id="1" dur="indefinite" restart="never" nodeType="tmRoot"/>
+      </p:par>
+    </p:tnLst>
+  </p:timing>
 </p:sld>
 </file>
 
@@ -22935,15 +22996,6 @@
 </file>
 
 <file path=customXml/item1.xml><?xml version="1.0" encoding="utf-8"?>
-<?mso-contentType ?>
-<FormTemplates xmlns="http://schemas.microsoft.com/sharepoint/v3/contenttype/forms">
-  <Display>DocumentLibraryForm</Display>
-  <Edit>DocumentLibraryForm</Edit>
-  <New>DocumentLibraryForm</New>
-</FormTemplates>
-</file>
-
-<file path=customXml/item2.xml><?xml version="1.0" encoding="utf-8"?>
 <ct:contentTypeSchema xmlns:ct="http://schemas.microsoft.com/office/2006/metadata/contentType" xmlns:ma="http://schemas.microsoft.com/office/2006/metadata/properties/metaAttributes" ct:_="" ma:_="" ma:contentTypeName="Document" ma:contentTypeID="0x01010079F111ED35F8CC479449609E8A0923A6" ma:contentTypeVersion="11" ma:contentTypeDescription="Create a new document." ma:contentTypeScope="" ma:versionID="9677210f24a1be23c92c90fd886aa0aa">
   <xsd:schema xmlns:xsd="http://www.w3.org/2001/XMLSchema" xmlns:xs="http://www.w3.org/2001/XMLSchema" xmlns:p="http://schemas.microsoft.com/office/2006/metadata/properties" xmlns:ns2="71af3243-3dd4-4a8d-8c0d-dd76da1f02a5" xmlns:ns3="16c05727-aa75-4e4a-9b5f-8a80a1165891" targetNamespace="http://schemas.microsoft.com/office/2006/metadata/properties" ma:root="true" ma:fieldsID="60e05723c5c1908df1a1a4ebf11d344e" ns2:_="" ns3:_="">
     <xsd:import namespace="71af3243-3dd4-4a8d-8c0d-dd76da1f02a5"/>
@@ -23154,6 +23206,15 @@
 </ct:contentTypeSchema>
 </file>
 
+<file path=customXml/item2.xml><?xml version="1.0" encoding="utf-8"?>
+<?mso-contentType ?>
+<FormTemplates xmlns="http://schemas.microsoft.com/sharepoint/v3/contenttype/forms">
+  <Display>DocumentLibraryForm</Display>
+  <Edit>DocumentLibraryForm</Edit>
+  <New>DocumentLibraryForm</New>
+</FormTemplates>
+</file>
+
 <file path=customXml/item3.xml><?xml version="1.0" encoding="utf-8"?>
 <p:properties xmlns:p="http://schemas.microsoft.com/office/2006/metadata/properties" xmlns:xsi="http://www.w3.org/2001/XMLSchema-instance" xmlns:pc="http://schemas.microsoft.com/office/infopath/2007/PartnerControls">
   <documentManagement>
@@ -23163,14 +23224,6 @@
 </file>
 
 <file path=customXml/itemProps1.xml><?xml version="1.0" encoding="utf-8"?>
-<ds:datastoreItem xmlns:ds="http://schemas.openxmlformats.org/officeDocument/2006/customXml" ds:itemID="{D1CAB62D-49E5-4271-85C6-1466970BAB69}">
-  <ds:schemaRefs>
-    <ds:schemaRef ds:uri="http://schemas.microsoft.com/sharepoint/v3/contenttype/forms"/>
-  </ds:schemaRefs>
-</ds:datastoreItem>
-</file>
-
-<file path=customXml/itemProps2.xml><?xml version="1.0" encoding="utf-8"?>
 <ds:datastoreItem xmlns:ds="http://schemas.openxmlformats.org/officeDocument/2006/customXml" ds:itemID="{D5A32ED2-6DBA-4E14-851E-DE5772C902F3}">
   <ds:schemaRefs>
     <ds:schemaRef ds:uri="http://schemas.microsoft.com/office/2006/metadata/contentType"/>
@@ -23189,6 +23242,14 @@
 </ds:datastoreItem>
 </file>
 
+<file path=customXml/itemProps2.xml><?xml version="1.0" encoding="utf-8"?>
+<ds:datastoreItem xmlns:ds="http://schemas.openxmlformats.org/officeDocument/2006/customXml" ds:itemID="{D1CAB62D-49E5-4271-85C6-1466970BAB69}">
+  <ds:schemaRefs>
+    <ds:schemaRef ds:uri="http://schemas.microsoft.com/sharepoint/v3/contenttype/forms"/>
+  </ds:schemaRefs>
+</ds:datastoreItem>
+</file>
+
 <file path=customXml/itemProps3.xml><?xml version="1.0" encoding="utf-8"?>
 <ds:datastoreItem xmlns:ds="http://schemas.openxmlformats.org/officeDocument/2006/customXml" ds:itemID="{AA7F0652-397B-4F71-B75E-207A80EB2786}">
   <ds:schemaRefs>

</xml_diff>

<commit_message>
try add train dataset to training model but not good
</commit_message>
<xml_diff>
--- a/Case_Presentation_1/ppt/case1.pptx
+++ b/Case_Presentation_1/ppt/case1.pptx
@@ -9625,18 +9625,18 @@
           <a:lstStyle/>
           <a:p>
             <a:r>
-              <a:rPr lang="en-US" altLang="zh-TW" sz="1600" dirty="0" err="1">
+              <a:rPr lang="en-US" altLang="zh-TW" sz="1600" dirty="0" smtClean="0">
                 <a:latin typeface="Microsoft JhengHei UI" panose="020B0604030504040204" pitchFamily="34" charset="-120"/>
                 <a:ea typeface="Microsoft JhengHei UI" panose="020B0604030504040204" pitchFamily="34" charset="-120"/>
               </a:rPr>
-              <a:t>XGBoost</a:t>
+              <a:t>XGboost </a:t>
             </a:r>
             <a:r>
               <a:rPr lang="en-US" altLang="zh-TW" sz="1600" dirty="0">
                 <a:latin typeface="Microsoft JhengHei UI" panose="020B0604030504040204" pitchFamily="34" charset="-120"/>
                 <a:ea typeface="Microsoft JhengHei UI" panose="020B0604030504040204" pitchFamily="34" charset="-120"/>
               </a:rPr>
-              <a:t> (Extreme Gradient Boosting) is a Gradient Boosted Tree (GBDT) that keeps the original model unchanged every time, and adds a new function to the model to correct the error of the previous tree to improve the overall model. Mainly used to solve the problem of supervision is learning, can be used for classification can also be used for regression </a:t>
+              <a:t>(Extreme Gradient Boosting) is a Gradient Boosted Tree (GBDT) that keeps the original model unchanged every time, and adds a new function to the model to correct the error of the previous tree to improve the overall model. Mainly used to solve the problem of supervision is learning, can be used for classification can also be used for regression </a:t>
             </a:r>
             <a:r>
               <a:rPr lang="en-US" altLang="zh-TW" sz="1600" dirty="0" smtClean="0">
@@ -9678,21 +9678,21 @@
                 <a:latin typeface="Microsoft JhengHei UI" panose="020B0604030504040204" pitchFamily="34" charset="-120"/>
                 <a:ea typeface="Microsoft JhengHei UI" panose="020B0604030504040204" pitchFamily="34" charset="-120"/>
               </a:rPr>
-              <a:t>Naive </a:t>
-            </a:r>
-            <a:r>
-              <a:rPr lang="en-US" altLang="zh-TW" sz="1600" dirty="0" err="1">
+              <a:t>Naive B</a:t>
+            </a:r>
+            <a:r>
+              <a:rPr lang="en-US" altLang="zh-TW" sz="1600" dirty="0" smtClean="0">
                 <a:latin typeface="Microsoft JhengHei UI" panose="020B0604030504040204" pitchFamily="34" charset="-120"/>
                 <a:ea typeface="Microsoft JhengHei UI" panose="020B0604030504040204" pitchFamily="34" charset="-120"/>
               </a:rPr>
-              <a:t>bayes</a:t>
+              <a:t>ayes </a:t>
             </a:r>
             <a:r>
               <a:rPr lang="en-US" altLang="zh-TW" sz="1600" dirty="0">
                 <a:latin typeface="Microsoft JhengHei UI" panose="020B0604030504040204" pitchFamily="34" charset="-120"/>
                 <a:ea typeface="Microsoft JhengHei UI" panose="020B0604030504040204" pitchFamily="34" charset="-120"/>
               </a:rPr>
-              <a:t> is a classification model based on calculating the </a:t>
+              <a:t>is a classification model based on calculating the </a:t>
             </a:r>
             <a:r>
               <a:rPr lang="en-US" altLang="zh-TW" sz="1600" dirty="0">
@@ -13641,8 +13641,8 @@
           <a:lstStyle/>
           <a:p>
             <a:r>
-              <a:rPr lang="en-US" altLang="zh-TW" dirty="0" err="1" smtClean="0"/>
-              <a:t>conciusion</a:t>
+              <a:rPr lang="en-US" altLang="zh-TW" dirty="0" smtClean="0"/>
+              <a:t>concLusion</a:t>
             </a:r>
             <a:endParaRPr lang="zh-TW" altLang="en-US" dirty="0"/>
           </a:p>
@@ -17738,7 +17738,7 @@
         </p:nvSpPr>
         <p:spPr>
           <a:xfrm>
-            <a:off x="1766446" y="2624719"/>
+            <a:off x="1764395" y="2624719"/>
             <a:ext cx="960129" cy="590204"/>
           </a:xfrm>
           <a:prstGeom prst="roundRect">
@@ -18057,7 +18057,7 @@
         <p:spPr>
           <a:xfrm flipV="1">
             <a:off x="1517070" y="2919821"/>
-            <a:ext cx="249376" cy="899079"/>
+            <a:ext cx="247325" cy="899079"/>
           </a:xfrm>
           <a:prstGeom prst="straightConnector1">
             <a:avLst/>
@@ -18179,8 +18179,8 @@
         </p:nvCxnSpPr>
         <p:spPr>
           <a:xfrm>
-            <a:off x="2726575" y="2919821"/>
-            <a:ext cx="276130" cy="837576"/>
+            <a:off x="2724524" y="2919821"/>
+            <a:ext cx="278181" cy="837576"/>
           </a:xfrm>
           <a:prstGeom prst="straightConnector1">
             <a:avLst/>
@@ -18772,7 +18772,7 @@
             <a:pPr algn="ctr"/>
             <a:r>
               <a:rPr lang="en-US" altLang="zh-TW" sz="1400" dirty="0" smtClean="0"/>
-              <a:t>Data</a:t>
+              <a:t>Data(10%)</a:t>
             </a:r>
             <a:endParaRPr lang="zh-TW" altLang="en-US" sz="1400" dirty="0"/>
           </a:p>

</xml_diff>